<commit_message>
pattern links didn't work, some more rewording
</commit_message>
<xml_diff>
--- a/docs/help/NL.pptx
+++ b/docs/help/NL.pptx
@@ -214,7 +214,7 @@
           <a:p>
             <a:fld id="{191DB269-8995-49D8-A4B0-9411C7010620}" type="datetimeFigureOut">
               <a:rPr lang="nl-NL" smtClean="0"/>
-              <a:t>24-3-2018</a:t>
+              <a:t>25-3-2018</a:t>
             </a:fld>
             <a:endParaRPr lang="nl-NL"/>
           </a:p>
@@ -379,7 +379,7 @@
           <a:p>
             <a:fld id="{A74490FB-0058-431C-B3E7-EBBA4B708E40}" type="datetimeFigureOut">
               <a:rPr lang="nl-NL" smtClean="0"/>
-              <a:t>24-3-2018</a:t>
+              <a:t>25-3-2018</a:t>
             </a:fld>
             <a:endParaRPr lang="nl-NL"/>
           </a:p>
@@ -890,8 +890,17 @@
               <a:rPr lang="nl-NL" baseline="0" dirty="0" smtClean="0">
                 <a:effectLst/>
               </a:rPr>
-              <a:t>In diverse online archieven beschikbaar</a:t>
-            </a:r>
+              <a:t>In diverse online archieven </a:t>
+            </a:r>
+            <a:r>
+              <a:rPr lang="nl-NL" baseline="0" dirty="0" smtClean="0">
+                <a:effectLst/>
+              </a:rPr>
+              <a:t>beschikbaar, het copyright is verlopen.</a:t>
+            </a:r>
+            <a:endParaRPr lang="nl-NL" baseline="0" dirty="0" smtClean="0">
+              <a:effectLst/>
+            </a:endParaRPr>
           </a:p>
           <a:p>
             <a:endParaRPr lang="nl-NL" baseline="0" dirty="0" smtClean="0">
@@ -1168,7 +1177,19 @@
               <a:rPr lang="nl-NL" dirty="0" smtClean="0">
                 <a:effectLst/>
               </a:rPr>
-              <a:t> animatie in de help pagina’s laat de transformatie van de ene variant naar de andere zien.</a:t>
+              <a:t> animatie in </a:t>
+            </a:r>
+            <a:r>
+              <a:rPr lang="nl-NL" dirty="0" smtClean="0">
+                <a:effectLst/>
+              </a:rPr>
+              <a:t>een van de </a:t>
+            </a:r>
+            <a:r>
+              <a:rPr lang="nl-NL" dirty="0" smtClean="0">
+                <a:effectLst/>
+              </a:rPr>
+              <a:t>help pagina’s laat de transformatie van de ene variant naar de andere zien.</a:t>
             </a:r>
             <a:endParaRPr lang="nl-NL" baseline="0" dirty="0" smtClean="0">
               <a:effectLst/>
@@ -1309,30 +1330,15 @@
               <a:rPr lang="nl-NL" i="1" strike="noStrike" baseline="0" dirty="0" smtClean="0">
                 <a:effectLst/>
               </a:rPr>
-              <a:t>Vraag en </a:t>
-            </a:r>
+              <a:t>Vraag en antwoord:</a:t>
+            </a:r>
+          </a:p>
+          <a:p>
             <a:r>
               <a:rPr lang="nl-NL" i="1" strike="noStrike" baseline="0" dirty="0" smtClean="0">
                 <a:effectLst/>
               </a:rPr>
-              <a:t>antwoord:</a:t>
-            </a:r>
-            <a:endParaRPr lang="nl-NL" i="1" strike="noStrike" baseline="0" dirty="0" smtClean="0">
-              <a:effectLst/>
-            </a:endParaRPr>
-          </a:p>
-          <a:p>
-            <a:r>
-              <a:rPr lang="nl-NL" i="1" strike="noStrike" baseline="0" dirty="0" smtClean="0">
-                <a:effectLst/>
-              </a:rPr>
-              <a:t>Hoeveel </a:t>
-            </a:r>
-            <a:r>
-              <a:rPr lang="nl-NL" i="1" strike="noStrike" baseline="0" dirty="0" smtClean="0">
-                <a:effectLst/>
-              </a:rPr>
-              <a:t>voorbeelden zijn er?</a:t>
+              <a:t>Hoeveel voorbeelden zijn er?</a:t>
             </a:r>
           </a:p>
           <a:p>
@@ -1498,66 +1504,13 @@
               <a:rPr lang="nl-NL" baseline="0" dirty="0" smtClean="0">
                 <a:effectLst/>
               </a:rPr>
-              <a:t>Zwarte gegevens worden ingevuld op </a:t>
+              <a:t>Downloaden </a:t>
             </a:r>
             <a:r>
               <a:rPr lang="nl-NL" baseline="0" dirty="0" smtClean="0">
                 <a:effectLst/>
               </a:rPr>
-              <a:t>de hoofdpagina </a:t>
-            </a:r>
-            <a:r>
-              <a:rPr lang="nl-NL" baseline="0" dirty="0" smtClean="0">
-                <a:effectLst/>
-              </a:rPr>
-              <a:t>waar je slagen kunt kiezen</a:t>
-            </a:r>
-          </a:p>
-          <a:p>
-            <a:pPr marL="0" marR="0" indent="0" algn="l" defTabSz="914400" rtl="0" eaLnBrk="1" fontAlgn="auto" latinLnBrk="0" hangingPunct="1">
-              <a:lnSpc>
-                <a:spcPct val="100000"/>
-              </a:lnSpc>
-              <a:spcBef>
-                <a:spcPts val="0"/>
-              </a:spcBef>
-              <a:spcAft>
-                <a:spcPts val="0"/>
-              </a:spcAft>
-              <a:buClrTx/>
-              <a:buSzTx/>
-              <a:buFontTx/>
-              <a:buNone/>
-              <a:tabLst/>
-              <a:defRPr/>
-            </a:pPr>
-            <a:endParaRPr lang="nl-NL" baseline="0" dirty="0" smtClean="0">
-              <a:effectLst/>
-            </a:endParaRPr>
-          </a:p>
-          <a:p>
-            <a:pPr marL="0" marR="0" indent="0" algn="l" defTabSz="914400" rtl="0" eaLnBrk="1" fontAlgn="auto" latinLnBrk="0" hangingPunct="1">
-              <a:lnSpc>
-                <a:spcPct val="100000"/>
-              </a:lnSpc>
-              <a:spcBef>
-                <a:spcPts val="0"/>
-              </a:spcBef>
-              <a:spcAft>
-                <a:spcPts val="0"/>
-              </a:spcAft>
-              <a:buClrTx/>
-              <a:buSzTx/>
-              <a:buFontTx/>
-              <a:buNone/>
-              <a:tabLst/>
-              <a:defRPr/>
-            </a:pPr>
-            <a:r>
-              <a:rPr lang="nl-NL" baseline="0" dirty="0" smtClean="0">
-                <a:effectLst/>
-              </a:rPr>
-              <a:t>Downloaden en </a:t>
+              <a:t>en </a:t>
             </a:r>
             <a:r>
               <a:rPr lang="nl-NL" baseline="0" dirty="0" err="1" smtClean="0">
@@ -1779,13 +1732,7 @@
               <a:rPr lang="nl-NL" dirty="0" smtClean="0">
                 <a:effectLst/>
               </a:rPr>
-              <a:t>Bovenste rij afbeeldingen wat </a:t>
-            </a:r>
-            <a:r>
-              <a:rPr lang="nl-NL" dirty="0" smtClean="0">
-                <a:effectLst/>
-              </a:rPr>
-              <a:t>je</a:t>
+              <a:t>Bovenste rij afbeeldingen wat je</a:t>
             </a:r>
             <a:r>
               <a:rPr lang="nl-NL" baseline="0" dirty="0" smtClean="0">
@@ -1803,56 +1750,32 @@
               <a:rPr lang="nl-NL" baseline="0" dirty="0" smtClean="0">
                 <a:effectLst/>
               </a:rPr>
-              <a:t> </a:t>
-            </a:r>
+              <a:t> krijgt.</a:t>
+            </a:r>
+          </a:p>
+          <a:p>
             <a:r>
               <a:rPr lang="nl-NL" baseline="0" dirty="0" smtClean="0">
                 <a:effectLst/>
               </a:rPr>
-              <a:t>krijgt.</a:t>
-            </a:r>
+              <a:t>Er telkens onder wat je misschien wilt hebben, of een tussenstap.</a:t>
+            </a:r>
+          </a:p>
+          <a:p>
+            <a:r>
+              <a:rPr lang="nl-NL" baseline="0" dirty="0" smtClean="0">
+                <a:effectLst/>
+              </a:rPr>
+              <a:t>Linksonder als in: Kant uit Vlaanderen en ‘s Gravenmoer.</a:t>
+            </a:r>
+          </a:p>
+          <a:p>
             <a:endParaRPr lang="nl-NL" baseline="0" dirty="0" smtClean="0">
               <a:effectLst/>
             </a:endParaRPr>
           </a:p>
           <a:p>
             <a:r>
-              <a:rPr lang="nl-NL" baseline="0" dirty="0" smtClean="0">
-                <a:effectLst/>
-              </a:rPr>
-              <a:t>Er telkens onder </a:t>
-            </a:r>
-            <a:r>
-              <a:rPr lang="nl-NL" baseline="0" dirty="0" smtClean="0">
-                <a:effectLst/>
-              </a:rPr>
-              <a:t>wat je misschien wilt hebben, of een </a:t>
-            </a:r>
-            <a:r>
-              <a:rPr lang="nl-NL" baseline="0" dirty="0" smtClean="0">
-                <a:effectLst/>
-              </a:rPr>
-              <a:t>tussenstap.</a:t>
-            </a:r>
-            <a:endParaRPr lang="nl-NL" baseline="0" dirty="0" smtClean="0">
-              <a:effectLst/>
-            </a:endParaRPr>
-          </a:p>
-          <a:p>
-            <a:r>
-              <a:rPr lang="nl-NL" baseline="0" dirty="0" smtClean="0">
-                <a:effectLst/>
-              </a:rPr>
-              <a:t>Linksonder als in: Kant uit Vlaanderen en ‘s Gravenmoer.</a:t>
-            </a:r>
-          </a:p>
-          <a:p>
-            <a:endParaRPr lang="nl-NL" baseline="0" dirty="0" smtClean="0">
-              <a:effectLst/>
-            </a:endParaRPr>
-          </a:p>
-          <a:p>
-            <a:r>
               <a:rPr lang="nl-NL" i="1" baseline="0" dirty="0" smtClean="0">
                 <a:effectLst/>
               </a:rPr>
@@ -1860,9 +1783,56 @@
             </a:r>
           </a:p>
           <a:p>
-            <a:endParaRPr lang="nl-NL" i="1" baseline="0" dirty="0" smtClean="0">
-              <a:effectLst/>
-            </a:endParaRPr>
+            <a:pPr lvl="1"/>
+            <a:r>
+              <a:rPr lang="nl-NL" i="0" dirty="0" smtClean="0">
+                <a:effectLst/>
+                <a:latin typeface="Consolas" panose="020B0609020204030204" pitchFamily="49" charset="0"/>
+                <a:cs typeface="Consolas" panose="020B0609020204030204" pitchFamily="49" charset="0"/>
+              </a:rPr>
+              <a:t>-</a:t>
+            </a:r>
+            <a:r>
+              <a:rPr lang="nl-NL" i="0" dirty="0" smtClean="0">
+                <a:effectLst/>
+                <a:latin typeface="Consolas" panose="020B0609020204030204" pitchFamily="49" charset="0"/>
+                <a:cs typeface="Consolas" panose="020B0609020204030204" pitchFamily="49" charset="0"/>
+              </a:rPr>
+              <a:t>5--</a:t>
+            </a:r>
+          </a:p>
+          <a:p>
+            <a:pPr lvl="1"/>
+            <a:r>
+              <a:rPr lang="nl-NL" i="0" dirty="0" smtClean="0">
+                <a:effectLst/>
+                <a:latin typeface="Consolas" panose="020B0609020204030204" pitchFamily="49" charset="0"/>
+                <a:cs typeface="Consolas" panose="020B0609020204030204" pitchFamily="49" charset="0"/>
+              </a:rPr>
+              <a:t>B-C-</a:t>
+            </a:r>
+          </a:p>
+          <a:p>
+            <a:pPr lvl="1"/>
+            <a:r>
+              <a:rPr lang="nl-NL" i="0" dirty="0" smtClean="0">
+                <a:effectLst/>
+                <a:latin typeface="Consolas" panose="020B0609020204030204" pitchFamily="49" charset="0"/>
+                <a:cs typeface="Consolas" panose="020B0609020204030204" pitchFamily="49" charset="0"/>
+              </a:rPr>
+              <a:t>-5-5</a:t>
+            </a:r>
+          </a:p>
+          <a:p>
+            <a:pPr lvl="1"/>
+            <a:r>
+              <a:rPr lang="nl-NL" i="0" dirty="0" smtClean="0">
+                <a:effectLst/>
+                <a:latin typeface="Consolas" panose="020B0609020204030204" pitchFamily="49" charset="0"/>
+                <a:cs typeface="Consolas" panose="020B0609020204030204" pitchFamily="49" charset="0"/>
+              </a:rPr>
+              <a:t>5-5-</a:t>
+            </a:r>
           </a:p>
           <a:p>
             <a:pPr marL="0" marR="0" indent="0" algn="l" defTabSz="914400" rtl="0" eaLnBrk="1" fontAlgn="auto" latinLnBrk="0" hangingPunct="1">
@@ -1883,12 +1853,135 @@
               <a:defRPr/>
             </a:pPr>
             <a:r>
-              <a:rPr lang="nl-NL" dirty="0" smtClean="0">
-                <a:hlinkClick r:id="rId3"/>
-              </a:rPr>
-              <a:t>https://d-bl.github.io/GroundForge/index.html?m=-5--%0AB-C-%0A-5-5%0A5-5-%3Bbricks%3B17%3B19%3B0%3B0&amp;s1=ct b1%3Dctptct d1%3Dctptct A2%3Dctpl C2%3Dctpr A4%3Dctl C4%3Dctr D1%3Dctptctt&amp;s2=&amp;s3=</a:t>
-            </a:r>
-            <a:endParaRPr lang="nl-NL" dirty="0" smtClean="0"/>
+              <a:rPr lang="nl-NL" i="1" baseline="0" dirty="0" err="1" smtClean="0">
+                <a:effectLst/>
+              </a:rPr>
+              <a:t>Brick</a:t>
+            </a:r>
+            <a:r>
+              <a:rPr lang="nl-NL" i="1" baseline="0" dirty="0" smtClean="0">
+                <a:effectLst/>
+              </a:rPr>
+              <a:t> (baksteen); </a:t>
+            </a:r>
+            <a:r>
+              <a:rPr lang="nl-NL" i="1" baseline="0" dirty="0" err="1" smtClean="0">
+                <a:effectLst/>
+              </a:rPr>
+              <a:t>Stitches</a:t>
+            </a:r>
+            <a:r>
+              <a:rPr lang="nl-NL" i="1" baseline="0" dirty="0" smtClean="0">
+                <a:effectLst/>
+              </a:rPr>
+              <a:t> (s</a:t>
+            </a:r>
+            <a:r>
+              <a:rPr lang="nl-NL" i="1" dirty="0" smtClean="0">
+                <a:effectLst/>
+              </a:rPr>
+              <a:t>lagen): </a:t>
+            </a:r>
+            <a:r>
+              <a:rPr lang="nl-NL" i="1" dirty="0" err="1" smtClean="0">
+                <a:effectLst/>
+              </a:rPr>
+              <a:t>ct</a:t>
+            </a:r>
+            <a:r>
+              <a:rPr lang="nl-NL" i="1" dirty="0" smtClean="0">
+                <a:effectLst/>
+              </a:rPr>
+              <a:t> b1=</a:t>
+            </a:r>
+            <a:r>
+              <a:rPr lang="nl-NL" i="1" dirty="0" err="1" smtClean="0">
+                <a:effectLst/>
+              </a:rPr>
+              <a:t>ctptct</a:t>
+            </a:r>
+            <a:r>
+              <a:rPr lang="nl-NL" i="1" dirty="0" smtClean="0">
+                <a:effectLst/>
+              </a:rPr>
+              <a:t> d1=</a:t>
+            </a:r>
+            <a:r>
+              <a:rPr lang="nl-NL" i="1" dirty="0" err="1" smtClean="0">
+                <a:effectLst/>
+              </a:rPr>
+              <a:t>ctptct</a:t>
+            </a:r>
+            <a:r>
+              <a:rPr lang="nl-NL" i="1" dirty="0" smtClean="0">
+                <a:effectLst/>
+              </a:rPr>
+              <a:t> A2=</a:t>
+            </a:r>
+            <a:r>
+              <a:rPr lang="nl-NL" i="1" dirty="0" err="1" smtClean="0">
+                <a:effectLst/>
+              </a:rPr>
+              <a:t>ctpl</a:t>
+            </a:r>
+            <a:r>
+              <a:rPr lang="nl-NL" i="1" dirty="0" smtClean="0">
+                <a:effectLst/>
+              </a:rPr>
+              <a:t> C2=</a:t>
+            </a:r>
+            <a:r>
+              <a:rPr lang="nl-NL" i="1" dirty="0" err="1" smtClean="0">
+                <a:effectLst/>
+              </a:rPr>
+              <a:t>ctpr</a:t>
+            </a:r>
+            <a:r>
+              <a:rPr lang="nl-NL" i="1" dirty="0" smtClean="0">
+                <a:effectLst/>
+              </a:rPr>
+              <a:t> A4=</a:t>
+            </a:r>
+            <a:r>
+              <a:rPr lang="nl-NL" i="1" dirty="0" err="1" smtClean="0">
+                <a:effectLst/>
+              </a:rPr>
+              <a:t>ctl</a:t>
+            </a:r>
+            <a:r>
+              <a:rPr lang="nl-NL" i="1" dirty="0" smtClean="0">
+                <a:effectLst/>
+              </a:rPr>
+              <a:t> C4=ctr D1=</a:t>
+            </a:r>
+            <a:r>
+              <a:rPr lang="nl-NL" i="1" dirty="0" err="1" smtClean="0">
+                <a:effectLst/>
+              </a:rPr>
+              <a:t>ctptctt</a:t>
+            </a:r>
+            <a:endParaRPr lang="nl-NL" i="1" dirty="0" smtClean="0">
+              <a:effectLst/>
+            </a:endParaRPr>
+          </a:p>
+          <a:p>
+            <a:endParaRPr lang="nl-NL" i="1" dirty="0" smtClean="0">
+              <a:effectLst/>
+            </a:endParaRPr>
+          </a:p>
+          <a:p>
+            <a:r>
+              <a:rPr lang="nl-NL" i="1" dirty="0" smtClean="0">
+                <a:effectLst/>
+              </a:rPr>
+              <a:t>Alle </a:t>
+            </a:r>
+            <a:r>
+              <a:rPr lang="nl-NL" i="1" dirty="0" smtClean="0">
+                <a:effectLst/>
+              </a:rPr>
+              <a:t>draden zwart, 7 en 10 rood</a:t>
+            </a:r>
           </a:p>
           <a:p>
             <a:endParaRPr lang="nl-NL" i="1" baseline="0" dirty="0" smtClean="0">
@@ -1897,166 +1990,16 @@
           </a:p>
           <a:p>
             <a:r>
-              <a:rPr lang="nl-NL" i="1" baseline="0" dirty="0" err="1" smtClean="0">
-                <a:effectLst/>
-              </a:rPr>
-              <a:t>Brick</a:t>
-            </a:r>
-            <a:r>
               <a:rPr lang="nl-NL" i="1" baseline="0" dirty="0" smtClean="0">
                 <a:effectLst/>
               </a:rPr>
-              <a:t> (baksteen)</a:t>
-            </a:r>
-          </a:p>
-          <a:p>
-            <a:r>
-              <a:rPr lang="nl-NL" i="0" dirty="0" smtClean="0">
-                <a:effectLst/>
-                <a:latin typeface="Consolas" panose="020B0609020204030204" pitchFamily="49" charset="0"/>
-                <a:cs typeface="Consolas" panose="020B0609020204030204" pitchFamily="49" charset="0"/>
-              </a:rPr>
-              <a:t>-5--</a:t>
-            </a:r>
-          </a:p>
-          <a:p>
-            <a:r>
-              <a:rPr lang="nl-NL" i="0" dirty="0" smtClean="0">
-                <a:effectLst/>
-                <a:latin typeface="Consolas" panose="020B0609020204030204" pitchFamily="49" charset="0"/>
-                <a:cs typeface="Consolas" panose="020B0609020204030204" pitchFamily="49" charset="0"/>
-              </a:rPr>
-              <a:t>B-C-</a:t>
-            </a:r>
-          </a:p>
-          <a:p>
-            <a:r>
-              <a:rPr lang="nl-NL" i="0" dirty="0" smtClean="0">
-                <a:effectLst/>
-                <a:latin typeface="Consolas" panose="020B0609020204030204" pitchFamily="49" charset="0"/>
-                <a:cs typeface="Consolas" panose="020B0609020204030204" pitchFamily="49" charset="0"/>
-              </a:rPr>
-              <a:t>-5-5</a:t>
-            </a:r>
-          </a:p>
-          <a:p>
-            <a:r>
-              <a:rPr lang="nl-NL" i="0" dirty="0" smtClean="0">
-                <a:effectLst/>
-                <a:latin typeface="Consolas" panose="020B0609020204030204" pitchFamily="49" charset="0"/>
-                <a:cs typeface="Consolas" panose="020B0609020204030204" pitchFamily="49" charset="0"/>
-              </a:rPr>
-              <a:t>5-5-</a:t>
-            </a:r>
-          </a:p>
-          <a:p>
-            <a:endParaRPr lang="nl-NL" i="1" dirty="0" smtClean="0">
-              <a:effectLst/>
-            </a:endParaRPr>
-          </a:p>
-          <a:p>
-            <a:r>
-              <a:rPr lang="nl-NL" i="1" dirty="0" smtClean="0">
-                <a:effectLst/>
-              </a:rPr>
-              <a:t>Slagen: </a:t>
-            </a:r>
-            <a:r>
-              <a:rPr lang="nl-NL" i="1" dirty="0" err="1" smtClean="0">
-                <a:effectLst/>
-              </a:rPr>
-              <a:t>ct</a:t>
-            </a:r>
-            <a:r>
-              <a:rPr lang="nl-NL" i="1" dirty="0" smtClean="0">
-                <a:effectLst/>
-              </a:rPr>
-              <a:t> b1=</a:t>
-            </a:r>
-            <a:r>
-              <a:rPr lang="nl-NL" i="1" dirty="0" err="1" smtClean="0">
-                <a:effectLst/>
-              </a:rPr>
-              <a:t>ctptct</a:t>
-            </a:r>
-            <a:r>
-              <a:rPr lang="nl-NL" i="1" dirty="0" smtClean="0">
-                <a:effectLst/>
-              </a:rPr>
-              <a:t> d1=</a:t>
-            </a:r>
-            <a:r>
-              <a:rPr lang="nl-NL" i="1" dirty="0" err="1" smtClean="0">
-                <a:effectLst/>
-              </a:rPr>
-              <a:t>ctptct</a:t>
-            </a:r>
-            <a:r>
-              <a:rPr lang="nl-NL" i="1" dirty="0" smtClean="0">
-                <a:effectLst/>
-              </a:rPr>
-              <a:t> A2=</a:t>
-            </a:r>
-            <a:r>
-              <a:rPr lang="nl-NL" i="1" dirty="0" err="1" smtClean="0">
-                <a:effectLst/>
-              </a:rPr>
-              <a:t>ctpl</a:t>
-            </a:r>
-            <a:r>
-              <a:rPr lang="nl-NL" i="1" dirty="0" smtClean="0">
-                <a:effectLst/>
-              </a:rPr>
-              <a:t> C2=</a:t>
-            </a:r>
-            <a:r>
-              <a:rPr lang="nl-NL" i="1" dirty="0" err="1" smtClean="0">
-                <a:effectLst/>
-              </a:rPr>
-              <a:t>ctpr</a:t>
-            </a:r>
-            <a:r>
-              <a:rPr lang="nl-NL" i="1" dirty="0" smtClean="0">
-                <a:effectLst/>
-              </a:rPr>
-              <a:t> A4=</a:t>
-            </a:r>
-            <a:r>
-              <a:rPr lang="nl-NL" i="1" dirty="0" err="1" smtClean="0">
-                <a:effectLst/>
-              </a:rPr>
-              <a:t>ctl</a:t>
-            </a:r>
-            <a:r>
-              <a:rPr lang="nl-NL" i="1" dirty="0" smtClean="0">
-                <a:effectLst/>
-              </a:rPr>
-              <a:t> C4=ctr D1=</a:t>
-            </a:r>
-            <a:r>
-              <a:rPr lang="nl-NL" i="1" dirty="0" err="1" smtClean="0">
-                <a:effectLst/>
-              </a:rPr>
-              <a:t>ctptctt</a:t>
-            </a:r>
-            <a:endParaRPr lang="nl-NL" i="1" dirty="0" smtClean="0">
-              <a:effectLst/>
-            </a:endParaRPr>
-          </a:p>
-          <a:p>
-            <a:r>
-              <a:rPr lang="nl-NL" i="1" dirty="0" smtClean="0">
-                <a:effectLst/>
-              </a:rPr>
-              <a:t>Alle draden zwart, 7 en 10 rood</a:t>
-            </a:r>
-          </a:p>
-          <a:p>
+              <a:t>Probeer </a:t>
+            </a:r>
             <a:r>
               <a:rPr lang="nl-NL" i="1" baseline="0" dirty="0" smtClean="0">
                 <a:effectLst/>
               </a:rPr>
-              <a:t>Probeer ook eens een dubbelle  </a:t>
+              <a:t>ook eens een dubbelle  </a:t>
             </a:r>
             <a:r>
               <a:rPr lang="nl-NL" i="1" baseline="0" dirty="0" err="1" smtClean="0">
@@ -2461,30 +2404,23 @@
           </a:p>
           <a:p>
             <a:r>
-              <a:rPr lang="nl-NL" i="1" baseline="0" dirty="0" smtClean="0">
-                <a:effectLst/>
-              </a:rPr>
-              <a:t>Vraag en antwoord:</a:t>
-            </a:r>
-            <a:endParaRPr lang="nl-NL" i="1" baseline="0" dirty="0">
-              <a:effectLst/>
-            </a:endParaRPr>
-          </a:p>
-          <a:p>
-            <a:r>
-              <a:rPr lang="nl-NL" i="1" dirty="0" smtClean="0"/>
-              <a:t>Horizontale of verticale verbinding zijn één of twee hokjes lang.</a:t>
-            </a:r>
-          </a:p>
-          <a:p>
-            <a:r>
-              <a:rPr lang="nl-NL" i="1" dirty="0" smtClean="0"/>
+              <a:rPr lang="nl-NL" i="0" dirty="0" smtClean="0"/>
+              <a:t>Horizontale </a:t>
+            </a:r>
+            <a:r>
+              <a:rPr lang="nl-NL" i="0" dirty="0" smtClean="0"/>
+              <a:t>of verticale verbinding zijn één of twee hokjes lang.</a:t>
+            </a:r>
+          </a:p>
+          <a:p>
+            <a:r>
+              <a:rPr lang="nl-NL" i="0" dirty="0" smtClean="0"/>
               <a:t>Diagonale verbindingen zijn altijd één hokje.</a:t>
             </a:r>
           </a:p>
           <a:p>
             <a:r>
-              <a:rPr lang="nl-NL" i="1" dirty="0" smtClean="0"/>
+              <a:rPr lang="nl-NL" i="0" dirty="0" smtClean="0"/>
               <a:t>Boven (C) en (B) is eigenlijk ook nog een (-) nodig</a:t>
             </a:r>
           </a:p>
@@ -3306,67 +3242,58 @@
           </a:p>
           <a:p>
             <a:r>
-              <a:rPr lang="nl-NL" i="1" dirty="0"/>
-              <a:t>Vragen en antwoorden</a:t>
-            </a:r>
-          </a:p>
-          <a:p>
-            <a:endParaRPr lang="nl-NL" i="1" dirty="0"/>
-          </a:p>
-          <a:p>
-            <a:r>
-              <a:rPr lang="nl-NL" i="1" dirty="0"/>
+              <a:rPr lang="nl-NL" i="0" dirty="0" smtClean="0"/>
               <a:t>Icoontjes </a:t>
             </a:r>
             <a:r>
-              <a:rPr lang="nl-NL" i="1" dirty="0" smtClean="0"/>
+              <a:rPr lang="nl-NL" i="0" dirty="0" smtClean="0"/>
               <a:t>in de voetregel van de hoofdpagina geven </a:t>
             </a:r>
             <a:r>
-              <a:rPr lang="nl-NL" i="1" dirty="0"/>
+              <a:rPr lang="nl-NL" i="0" dirty="0"/>
               <a:t>aan hoe geschikt bepaalde browsers en apparaten zijn</a:t>
             </a:r>
           </a:p>
           <a:p>
-            <a:endParaRPr lang="nl-NL" i="1" dirty="0"/>
-          </a:p>
-          <a:p>
-            <a:r>
-              <a:rPr lang="nl-NL" i="1" dirty="0"/>
+            <a:endParaRPr lang="nl-NL" i="0" dirty="0"/>
+          </a:p>
+          <a:p>
+            <a:r>
+              <a:rPr lang="nl-NL" i="0" dirty="0"/>
               <a:t>Aanraakschermen hebben geen muis voor help-info als je ergens boven zweeft</a:t>
             </a:r>
           </a:p>
           <a:p>
             <a:r>
-              <a:rPr lang="nl-NL" i="1" dirty="0"/>
+              <a:rPr lang="nl-NL" i="0" dirty="0"/>
               <a:t>Internet Explorer (11) heeft een bug waardoor je gekke effecten krijgt.</a:t>
             </a:r>
           </a:p>
           <a:p>
-            <a:endParaRPr lang="nl-NL" i="1" dirty="0"/>
-          </a:p>
-          <a:p>
-            <a:r>
-              <a:rPr lang="nl-NL" i="1" dirty="0"/>
+            <a:endParaRPr lang="nl-NL" i="0" dirty="0"/>
+          </a:p>
+          <a:p>
+            <a:r>
+              <a:rPr lang="nl-NL" i="0" dirty="0"/>
               <a:t>Release </a:t>
             </a:r>
             <a:r>
-              <a:rPr lang="nl-NL" i="1" dirty="0" err="1"/>
+              <a:rPr lang="nl-NL" i="0" dirty="0" err="1"/>
               <a:t>notes</a:t>
             </a:r>
             <a:r>
-              <a:rPr lang="nl-NL" i="1" dirty="0"/>
+              <a:rPr lang="nl-NL" i="0" dirty="0"/>
               <a:t> somt van tijd tot tijd de wijzigingen op</a:t>
             </a:r>
           </a:p>
           <a:p>
             <a:r>
-              <a:rPr lang="nl-NL" i="1" dirty="0"/>
+              <a:rPr lang="nl-NL" i="0" dirty="0"/>
               <a:t>Is zelden helemaal bij</a:t>
             </a:r>
           </a:p>
           <a:p>
-            <a:endParaRPr lang="nl-NL" strike="sngStrike" dirty="0" smtClean="0"/>
+            <a:endParaRPr lang="nl-NL" i="0" strike="sngStrike" dirty="0" smtClean="0"/>
           </a:p>
         </p:txBody>
       </p:sp>
@@ -3587,27 +3514,11 @@
             </a:pPr>
             <a:r>
               <a:rPr lang="nl-NL" dirty="0" smtClean="0"/>
-              <a:t>Kantklossen was vaak een oefenonderwerp om nieuwe programmeertalen onder de knie te krijgen</a:t>
-            </a:r>
-            <a:r>
-              <a:rPr lang="nl-NL" dirty="0" smtClean="0"/>
-              <a:t>. Rode </a:t>
-            </a:r>
-            <a:r>
-              <a:rPr lang="nl-NL" dirty="0" smtClean="0"/>
-              <a:t>draad daarbij: draad schema’s genereren uit paar schema’s</a:t>
-            </a:r>
-            <a:r>
-              <a:rPr lang="nl-NL" dirty="0" smtClean="0"/>
-              <a:t>. </a:t>
+              <a:t>Kantklossen was vaak een oefenonderwerp om nieuwe programmeertalen onder de knie te krijgen. Rode draad daarbij: draad schema’s genereren uit paar schema’s. </a:t>
             </a:r>
             <a:r>
               <a:rPr lang="nl-NL" baseline="0" dirty="0" smtClean="0"/>
-              <a:t>Doel</a:t>
-            </a:r>
-            <a:r>
-              <a:rPr lang="nl-NL" baseline="0" dirty="0" smtClean="0"/>
-              <a:t>: effect voor contrasterende draden onderzoeken</a:t>
+              <a:t>Doel: effect voor contrasterende draden onderzoeken</a:t>
             </a:r>
           </a:p>
           <a:p>
@@ -3630,11 +3541,7 @@
           <a:p>
             <a:r>
               <a:rPr lang="nl-NL" i="0" dirty="0" smtClean="0"/>
-              <a:t>In </a:t>
-            </a:r>
-            <a:r>
-              <a:rPr lang="nl-NL" i="0" dirty="0" smtClean="0"/>
-              <a:t>de marge van de help pagina vind je de link NL om de presentatie na te lezen</a:t>
+              <a:t>In de marge van de help pagina vind je de link NL om de presentatie na te lezen</a:t>
             </a:r>
           </a:p>
           <a:p>
@@ -3643,13 +3550,8 @@
           <a:p>
             <a:r>
               <a:rPr lang="nl-NL" i="1" dirty="0" smtClean="0"/>
-              <a:t>Vraag en </a:t>
-            </a:r>
-            <a:r>
-              <a:rPr lang="nl-NL" i="1" dirty="0" smtClean="0"/>
-              <a:t>antwoord:</a:t>
-            </a:r>
-            <a:endParaRPr lang="nl-NL" i="1" dirty="0" smtClean="0"/>
+              <a:t>Vraag en antwoord:</a:t>
+            </a:r>
           </a:p>
           <a:p>
             <a:r>
@@ -3763,67 +3665,78 @@
           <a:p>
             <a:r>
               <a:rPr lang="nl-NL" i="1" dirty="0" smtClean="0"/>
-              <a:t>De schermafdrukken gemaakt met:</a:t>
-            </a:r>
-          </a:p>
-          <a:p>
+              <a:t>De schermafdrukken </a:t>
+            </a:r>
+            <a:r>
+              <a:rPr lang="nl-NL" i="1" dirty="0" smtClean="0"/>
+              <a:t>zijn gemaakt op de hoofdpagina gemaakt </a:t>
+            </a:r>
+            <a:r>
+              <a:rPr lang="nl-NL" i="1" dirty="0" smtClean="0"/>
+              <a:t>met</a:t>
+            </a:r>
+            <a:r>
+              <a:rPr lang="nl-NL" i="1" dirty="0" smtClean="0"/>
+              <a:t>:</a:t>
+            </a:r>
+          </a:p>
+          <a:p>
+            <a:pPr lvl="1"/>
             <a:r>
               <a:rPr lang="nl-NL" i="1" dirty="0" smtClean="0">
-                <a:hlinkClick r:id="rId3"/>
-              </a:rPr>
-              <a:t>https</a:t>
-            </a:r>
+                <a:latin typeface="Consolas" panose="020B0609020204030204" pitchFamily="49" charset="0"/>
+                <a:cs typeface="Consolas" panose="020B0609020204030204" pitchFamily="49" charset="0"/>
+              </a:rPr>
+              <a:t>B-C-</a:t>
+            </a:r>
+          </a:p>
+          <a:p>
+            <a:pPr lvl="1"/>
             <a:r>
               <a:rPr lang="nl-NL" i="1" dirty="0" smtClean="0">
-                <a:hlinkClick r:id="rId3"/>
-              </a:rPr>
-              <a:t>://d-bl.github.io/GroundForge/index.html?m=B-C-%0A---5%0AC-B-%0A-5--%3Bchecker%3B22%3B9%3B1%3B0&amp;s1=ct%20A2%3Dcttct%20C4%3Dctct&amp;s2=cross%3Dctc%20twist%3Dctc&amp;s3</a:t>
-            </a:r>
+                <a:latin typeface="Consolas" panose="020B0609020204030204" pitchFamily="49" charset="0"/>
+                <a:cs typeface="Consolas" panose="020B0609020204030204" pitchFamily="49" charset="0"/>
+              </a:rPr>
+              <a:t>---5</a:t>
+            </a:r>
+          </a:p>
+          <a:p>
+            <a:pPr lvl="1"/>
+            <a:r>
+              <a:rPr lang="nl-NL" i="1" dirty="0" smtClean="0">
+                <a:latin typeface="Consolas" panose="020B0609020204030204" pitchFamily="49" charset="0"/>
+                <a:cs typeface="Consolas" panose="020B0609020204030204" pitchFamily="49" charset="0"/>
+              </a:rPr>
+              <a:t>C-B-</a:t>
+            </a:r>
+          </a:p>
+          <a:p>
+            <a:pPr lvl="1"/>
+            <a:r>
+              <a:rPr lang="nl-NL" i="1" dirty="0" smtClean="0">
+                <a:latin typeface="Consolas" panose="020B0609020204030204" pitchFamily="49" charset="0"/>
+                <a:cs typeface="Consolas" panose="020B0609020204030204" pitchFamily="49" charset="0"/>
+              </a:rPr>
+              <a:t>-5—</a:t>
+            </a:r>
+          </a:p>
+          <a:p>
             <a:r>
               <a:rPr lang="nl-NL" i="1" dirty="0" smtClean="0"/>
-              <a:t>= </a:t>
-            </a:r>
-          </a:p>
-          <a:p>
+              <a:t>Checker (schaakbord); </a:t>
+            </a:r>
+            <a:r>
+              <a:rPr lang="nl-NL" i="1" dirty="0" err="1" smtClean="0"/>
+              <a:t>Stitches</a:t>
+            </a:r>
             <a:r>
               <a:rPr lang="nl-NL" i="1" dirty="0" smtClean="0"/>
-              <a:t>Met </a:t>
-            </a:r>
-            <a:r>
-              <a:rPr lang="nl-NL" i="1" dirty="0" smtClean="0"/>
-              <a:t>de kleur voor omkeerslag </a:t>
-            </a:r>
-            <a:r>
-              <a:rPr lang="nl-NL" i="1" baseline="0" dirty="0" smtClean="0"/>
-              <a:t> even vals gespeeld met </a:t>
-            </a:r>
-            <a:r>
-              <a:rPr lang="nl-NL" i="1" baseline="0" dirty="0" err="1" smtClean="0"/>
-              <a:t>ctctc</a:t>
-            </a:r>
-            <a:r>
-              <a:rPr lang="nl-NL" i="1" baseline="0" dirty="0" smtClean="0"/>
-              <a:t> in de parentekening,</a:t>
-            </a:r>
-            <a:endParaRPr lang="nl-NL" i="1" dirty="0" smtClean="0"/>
-          </a:p>
-          <a:p>
-            <a:r>
-              <a:rPr lang="nl-NL" i="1" dirty="0" smtClean="0"/>
-              <a:t> zie </a:t>
-            </a:r>
-            <a:r>
-              <a:rPr lang="nl-NL" i="1" dirty="0" smtClean="0">
-                <a:hlinkClick r:id="rId4"/>
-              </a:rPr>
-              <a:t>https://github.com/d-bl/GroundForge/pull/106</a:t>
-            </a:r>
-            <a:r>
-              <a:rPr lang="nl-NL" i="1" dirty="0" smtClean="0"/>
-              <a:t> </a:t>
-            </a:r>
-          </a:p>
-          <a:p>
+              <a:t> (slagen): ct,A2=cttct,C4=</a:t>
+            </a:r>
+            <a:r>
+              <a:rPr lang="nl-NL" i="1" dirty="0" err="1" smtClean="0"/>
+              <a:t>ctct</a:t>
+            </a:r>
             <a:endParaRPr lang="nl-NL" i="1" dirty="0" smtClean="0"/>
           </a:p>
         </p:txBody>
@@ -4024,40 +3937,16 @@
               <a:rPr lang="nl-NL" i="1" dirty="0" smtClean="0">
                 <a:sym typeface="Wingdings" panose="05000000000000000000" pitchFamily="2" charset="2"/>
               </a:rPr>
-              <a:t>Vraag en </a:t>
-            </a:r>
+              <a:t>Vraag en antwoord:</a:t>
+            </a:r>
+          </a:p>
+          <a:p>
             <a:r>
               <a:rPr lang="nl-NL" i="1" dirty="0" smtClean="0">
                 <a:sym typeface="Wingdings" panose="05000000000000000000" pitchFamily="2" charset="2"/>
               </a:rPr>
-              <a:t>antwoord:</a:t>
-            </a:r>
-            <a:endParaRPr lang="nl-NL" i="1" dirty="0" smtClean="0">
-              <a:sym typeface="Wingdings" panose="05000000000000000000" pitchFamily="2" charset="2"/>
-            </a:endParaRPr>
-          </a:p>
-          <a:p>
-            <a:r>
-              <a:rPr lang="nl-NL" i="1" dirty="0" smtClean="0">
-                <a:sym typeface="Wingdings" panose="05000000000000000000" pitchFamily="2" charset="2"/>
-              </a:rPr>
-              <a:t>Waarom </a:t>
-            </a:r>
-            <a:r>
-              <a:rPr lang="nl-NL" i="1" dirty="0" smtClean="0">
-                <a:sym typeface="Wingdings" panose="05000000000000000000" pitchFamily="2" charset="2"/>
-              </a:rPr>
-              <a:t>in het </a:t>
-            </a:r>
-            <a:r>
-              <a:rPr lang="nl-NL" i="1" dirty="0" smtClean="0">
-                <a:sym typeface="Wingdings" panose="05000000000000000000" pitchFamily="2" charset="2"/>
-              </a:rPr>
-              <a:t>Engels?</a:t>
-            </a:r>
-            <a:endParaRPr lang="nl-NL" i="1" dirty="0" smtClean="0">
-              <a:sym typeface="Wingdings" panose="05000000000000000000" pitchFamily="2" charset="2"/>
-            </a:endParaRPr>
+              <a:t>Waarom in het Engels?</a:t>
+            </a:r>
           </a:p>
           <a:p>
             <a:pPr marL="171450" indent="-171450">
@@ -4530,39 +4419,40 @@
           <a:bodyPr/>
           <a:lstStyle/>
           <a:p>
+            <a:pPr marL="0" marR="0" indent="0" algn="l" defTabSz="914400" rtl="0" eaLnBrk="1" fontAlgn="auto" latinLnBrk="0" hangingPunct="1">
+              <a:lnSpc>
+                <a:spcPct val="100000"/>
+              </a:lnSpc>
+              <a:spcBef>
+                <a:spcPts val="0"/>
+              </a:spcBef>
+              <a:spcAft>
+                <a:spcPts val="0"/>
+              </a:spcAft>
+              <a:buClrTx/>
+              <a:buSzTx/>
+              <a:buFontTx/>
+              <a:buNone/>
+              <a:tabLst/>
+              <a:defRPr/>
+            </a:pPr>
             <a:r>
               <a:rPr lang="nl-NL" baseline="0" dirty="0" smtClean="0">
                 <a:effectLst/>
               </a:rPr>
-              <a:t>De gekozen slagen worden ingevuld in het “</a:t>
-            </a:r>
-            <a:r>
-              <a:rPr lang="nl-NL" baseline="0" dirty="0" err="1" smtClean="0">
-                <a:effectLst/>
-              </a:rPr>
-              <a:t>stitches</a:t>
-            </a:r>
-            <a:r>
-              <a:rPr lang="nl-NL" baseline="0" dirty="0" smtClean="0">
-                <a:effectLst/>
-              </a:rPr>
-              <a:t>” veld op de vorige dia.</a:t>
-            </a:r>
-          </a:p>
-          <a:p>
-            <a:r>
-              <a:rPr lang="nl-NL" baseline="0" dirty="0" smtClean="0">
-                <a:effectLst/>
-              </a:rPr>
-              <a:t>Let op: het hele patroon wordt opnieuw ingevuld,</a:t>
-            </a:r>
-          </a:p>
-          <a:p>
-            <a:r>
-              <a:rPr lang="nl-NL" baseline="0" dirty="0" smtClean="0">
-                <a:effectLst/>
-              </a:rPr>
-              <a:t> dus niet om te variëren op de aangeboden voorbeelden.</a:t>
+              <a:t>Het gekozen patroon bepaalt hoe de rest van het formulier er uit ziet:</a:t>
+            </a:r>
+          </a:p>
+          <a:p>
+            <a:r>
+              <a:rPr lang="nl-NL" dirty="0" smtClean="0"/>
+              <a:t>Linker voorbeeld: bekende om-en-om zonder spelden</a:t>
+            </a:r>
+          </a:p>
+          <a:p>
+            <a:r>
+              <a:rPr lang="nl-NL" dirty="0" smtClean="0"/>
+              <a:t>Rechter voorbeeld: komt verderop op een verrassende manier terug</a:t>
             </a:r>
           </a:p>
           <a:p>
@@ -4575,7 +4465,63 @@
               <a:rPr lang="nl-NL" baseline="0" dirty="0" smtClean="0">
                 <a:effectLst/>
               </a:rPr>
-              <a:t>Het gekozen patroon bepaalt hoe de rest van het formulier er uit ziet.</a:t>
+              <a:t>De </a:t>
+            </a:r>
+            <a:r>
+              <a:rPr lang="nl-NL" baseline="0" dirty="0" smtClean="0">
+                <a:effectLst/>
+              </a:rPr>
+              <a:t>gekozen slagen worden ingevuld in het “</a:t>
+            </a:r>
+            <a:r>
+              <a:rPr lang="nl-NL" baseline="0" dirty="0" err="1" smtClean="0">
+                <a:effectLst/>
+              </a:rPr>
+              <a:t>stitches</a:t>
+            </a:r>
+            <a:r>
+              <a:rPr lang="nl-NL" baseline="0" dirty="0" smtClean="0">
+                <a:effectLst/>
+              </a:rPr>
+              <a:t>” (slagen) </a:t>
+            </a:r>
+            <a:r>
+              <a:rPr lang="nl-NL" baseline="0" dirty="0" smtClean="0">
+                <a:effectLst/>
+              </a:rPr>
+              <a:t>veld op de vorige dia.</a:t>
+            </a:r>
+          </a:p>
+          <a:p>
+            <a:r>
+              <a:rPr lang="nl-NL" baseline="0" dirty="0" smtClean="0">
+                <a:effectLst/>
+              </a:rPr>
+              <a:t>Let op: het hele patroon wordt opnieuw ingevuld</a:t>
+            </a:r>
+            <a:r>
+              <a:rPr lang="nl-NL" baseline="0" dirty="0" smtClean="0">
+                <a:effectLst/>
+              </a:rPr>
+              <a:t>, dit formulier dus </a:t>
+            </a:r>
+            <a:r>
+              <a:rPr lang="nl-NL" baseline="0" dirty="0" smtClean="0">
+                <a:effectLst/>
+              </a:rPr>
+              <a:t>niet </a:t>
+            </a:r>
+            <a:r>
+              <a:rPr lang="nl-NL" baseline="0" dirty="0" smtClean="0">
+                <a:effectLst/>
+              </a:rPr>
+              <a:t>gebruiken om </a:t>
+            </a:r>
+            <a:r>
+              <a:rPr lang="nl-NL" baseline="0" dirty="0" smtClean="0">
+                <a:effectLst/>
+              </a:rPr>
+              <a:t>te variëren op de aangeboden voorbeelden.</a:t>
             </a:r>
           </a:p>
           <a:p>
@@ -4583,27 +4529,16 @@
           </a:p>
           <a:p>
             <a:r>
-              <a:rPr lang="nl-NL" dirty="0"/>
-              <a:t>Linker voorbeeld: bekende om-en-om zonder spelden</a:t>
-            </a:r>
-          </a:p>
-          <a:p>
-            <a:r>
-              <a:rPr lang="nl-NL" dirty="0"/>
-              <a:t>Rechter voorbeeld: komt verderop op een verrassende manier terug</a:t>
-            </a:r>
-          </a:p>
-          <a:p>
-            <a:endParaRPr lang="nl-NL" baseline="0" dirty="0" smtClean="0">
-              <a:effectLst/>
-            </a:endParaRPr>
-          </a:p>
-          <a:p>
-            <a:r>
               <a:rPr lang="nl-NL" baseline="0" dirty="0" smtClean="0">
                 <a:effectLst/>
               </a:rPr>
-              <a:t>Een spiekbriefje laat de code en afbeelding zien van minder triviale (= </a:t>
+              <a:t>Een </a:t>
+            </a:r>
+            <a:r>
+              <a:rPr lang="nl-NL" baseline="0" dirty="0" smtClean="0">
+                <a:effectLst/>
+              </a:rPr>
+              <a:t>spiekbriefje laat de code en afbeelding zien van minder triviale (= </a:t>
             </a:r>
             <a:r>
               <a:rPr lang="nl-NL" baseline="0" dirty="0" err="1" smtClean="0">
@@ -4883,31 +4818,65 @@
               <a:rPr lang="nl-NL" dirty="0" smtClean="0">
                 <a:effectLst/>
               </a:rPr>
-              <a:t>Verschillende (groepen) voorbeeld pagina’s (om het parameters-formulier in te vullen)</a:t>
-            </a:r>
-          </a:p>
-          <a:p>
+              <a:t>Verschillende (groepen) voorbeeld </a:t>
+            </a:r>
+            <a:r>
+              <a:rPr lang="nl-NL" dirty="0" smtClean="0">
+                <a:effectLst/>
+              </a:rPr>
+              <a:t>pagina’s. Links op deze pagina vullen het </a:t>
+            </a:r>
+            <a:r>
+              <a:rPr lang="nl-NL" dirty="0" smtClean="0">
+                <a:effectLst/>
+              </a:rPr>
+              <a:t>parameters-formulier in </a:t>
+            </a:r>
+            <a:r>
+              <a:rPr lang="nl-NL" dirty="0" smtClean="0">
+                <a:effectLst/>
+              </a:rPr>
+              <a:t>van de hoofdpagina.</a:t>
+            </a:r>
             <a:endParaRPr lang="nl-NL" dirty="0" smtClean="0">
               <a:effectLst/>
             </a:endParaRPr>
           </a:p>
           <a:p>
-            <a:r>
-              <a:rPr lang="nl-NL" dirty="0" smtClean="0">
-                <a:effectLst/>
-              </a:rPr>
-              <a:t>Elke groep heeft een eigen invalshoek</a:t>
-            </a:r>
-          </a:p>
-          <a:p>
             <a:endParaRPr lang="nl-NL" dirty="0" smtClean="0">
               <a:effectLst/>
             </a:endParaRPr>
           </a:p>
           <a:p>
             <a:r>
+              <a:rPr lang="nl-NL" dirty="0" smtClean="0">
+                <a:effectLst/>
+              </a:rPr>
+              <a:t>Elke groep heeft een eigen </a:t>
+            </a:r>
+            <a:r>
+              <a:rPr lang="nl-NL" dirty="0" smtClean="0">
+                <a:effectLst/>
+              </a:rPr>
+              <a:t>invalshoek.</a:t>
+            </a:r>
+            <a:endParaRPr lang="nl-NL" dirty="0" smtClean="0">
+              <a:effectLst/>
+            </a:endParaRPr>
+          </a:p>
+          <a:p>
+            <a:endParaRPr lang="nl-NL" dirty="0" smtClean="0">
+              <a:effectLst/>
+            </a:endParaRPr>
+          </a:p>
+          <a:p>
+            <a:r>
               <a:rPr lang="nl-NL" dirty="0" smtClean="0"/>
-              <a:t>Droste heeft een paar voorbeelden waarvan al wel slagen zijn ingevuld</a:t>
+              <a:t>Droste heeft een paar voorbeelden waarvan al wel slagen zijn </a:t>
+            </a:r>
+            <a:r>
+              <a:rPr lang="nl-NL" dirty="0" smtClean="0"/>
+              <a:t>ingevuld.</a:t>
             </a:r>
             <a:endParaRPr lang="nl-NL" dirty="0" smtClean="0">
               <a:effectLst/>
@@ -5132,7 +5101,7 @@
           <a:p>
             <a:fld id="{E342A075-9761-4F6D-8E62-693B12E2A93F}" type="datetime1">
               <a:rPr lang="nl-NL" smtClean="0"/>
-              <a:t>24-3-2018</a:t>
+              <a:t>25-3-2018</a:t>
             </a:fld>
             <a:endParaRPr lang="nl-NL"/>
           </a:p>
@@ -5309,7 +5278,7 @@
           <a:p>
             <a:fld id="{95274BD6-6047-4BE7-A11A-799C5C07C1B9}" type="datetime1">
               <a:rPr lang="nl-NL" smtClean="0"/>
-              <a:t>24-3-2018</a:t>
+              <a:t>25-3-2018</a:t>
             </a:fld>
             <a:endParaRPr lang="nl-NL"/>
           </a:p>
@@ -5489,7 +5458,7 @@
           <a:p>
             <a:fld id="{6C2C6073-FF99-4CA4-ADF2-53D139284B0F}" type="datetime1">
               <a:rPr lang="nl-NL" smtClean="0"/>
-              <a:t>24-3-2018</a:t>
+              <a:t>25-3-2018</a:t>
             </a:fld>
             <a:endParaRPr lang="nl-NL"/>
           </a:p>
@@ -5659,7 +5628,7 @@
           <a:p>
             <a:fld id="{BB83D81E-96EF-4290-8170-748ADAD06D81}" type="datetime1">
               <a:rPr lang="nl-NL" smtClean="0"/>
-              <a:t>24-3-2018</a:t>
+              <a:t>25-3-2018</a:t>
             </a:fld>
             <a:endParaRPr lang="nl-NL"/>
           </a:p>
@@ -5912,7 +5881,7 @@
           <a:p>
             <a:fld id="{C0420608-9111-4307-BDC9-D2BB0906472C}" type="datetime1">
               <a:rPr lang="nl-NL" smtClean="0"/>
-              <a:t>24-3-2018</a:t>
+              <a:t>25-3-2018</a:t>
             </a:fld>
             <a:endParaRPr lang="nl-NL"/>
           </a:p>
@@ -6200,7 +6169,7 @@
           <a:p>
             <a:fld id="{A84E908B-0185-4D61-A5D9-DBFFD136706E}" type="datetime1">
               <a:rPr lang="nl-NL" smtClean="0"/>
-              <a:t>24-3-2018</a:t>
+              <a:t>25-3-2018</a:t>
             </a:fld>
             <a:endParaRPr lang="nl-NL"/>
           </a:p>
@@ -6622,7 +6591,7 @@
           <a:p>
             <a:fld id="{AF24CBA6-5F96-4BD7-976F-CDF48F991EB6}" type="datetime1">
               <a:rPr lang="nl-NL" smtClean="0"/>
-              <a:t>24-3-2018</a:t>
+              <a:t>25-3-2018</a:t>
             </a:fld>
             <a:endParaRPr lang="nl-NL"/>
           </a:p>
@@ -6740,7 +6709,7 @@
           <a:p>
             <a:fld id="{8CA878B4-84FD-4284-B7D0-09A954965A10}" type="datetime1">
               <a:rPr lang="nl-NL" smtClean="0"/>
-              <a:t>24-3-2018</a:t>
+              <a:t>25-3-2018</a:t>
             </a:fld>
             <a:endParaRPr lang="nl-NL"/>
           </a:p>
@@ -6835,7 +6804,7 @@
           <a:p>
             <a:fld id="{8F1648B1-A544-4058-8476-7C7A9902FE15}" type="datetime1">
               <a:rPr lang="nl-NL" smtClean="0"/>
-              <a:t>24-3-2018</a:t>
+              <a:t>25-3-2018</a:t>
             </a:fld>
             <a:endParaRPr lang="nl-NL"/>
           </a:p>
@@ -7112,7 +7081,7 @@
           <a:p>
             <a:fld id="{D039C4CF-B57B-4F53-B350-F1468F1E8012}" type="datetime1">
               <a:rPr lang="nl-NL" smtClean="0"/>
-              <a:t>24-3-2018</a:t>
+              <a:t>25-3-2018</a:t>
             </a:fld>
             <a:endParaRPr lang="nl-NL"/>
           </a:p>
@@ -7369,7 +7338,7 @@
           <a:p>
             <a:fld id="{CF8B7C30-20C8-4009-AD9C-ED95D216EDC4}" type="datetime1">
               <a:rPr lang="nl-NL" smtClean="0"/>
-              <a:t>24-3-2018</a:t>
+              <a:t>25-3-2018</a:t>
             </a:fld>
             <a:endParaRPr lang="nl-NL"/>
           </a:p>
@@ -7582,7 +7551,7 @@
           <a:p>
             <a:fld id="{9D082795-9F52-4849-A817-AF0180A2A2B3}" type="datetime1">
               <a:rPr lang="nl-NL" smtClean="0"/>
-              <a:t>24-3-2018</a:t>
+              <a:t>25-3-2018</a:t>
             </a:fld>
             <a:endParaRPr lang="nl-NL"/>
           </a:p>
@@ -8110,20 +8079,17 @@
           <a:p>
             <a:r>
               <a:rPr lang="nl-NL" dirty="0" smtClean="0"/>
-              <a:t/>
+              <a:t>Door</a:t>
+            </a:r>
+            <a:r>
+              <a:rPr lang="nl-NL" dirty="0" smtClean="0"/>
+              <a:t> Joke Pol</a:t>
             </a:r>
             <a:br>
               <a:rPr lang="nl-NL" dirty="0" smtClean="0"/>
             </a:br>
             <a:r>
               <a:rPr lang="nl-NL" dirty="0" smtClean="0"/>
-              <a:t>Door Joke Pol</a:t>
-            </a:r>
-            <a:br>
-              <a:rPr lang="nl-NL" dirty="0" smtClean="0"/>
-            </a:br>
-            <a:r>
-              <a:rPr lang="nl-NL" dirty="0" smtClean="0"/>
               <a:t>met een inleiding door Marian Tempels</a:t>
             </a:r>
           </a:p>
@@ -8134,7 +8100,7 @@
           <p:cNvPr id="5" name="Tijdelijke aanduiding voor datum 3">
             <a:extLst>
               <a:ext uri="{FF2B5EF4-FFF2-40B4-BE49-F238E27FC236}">
-                <a16:creationId xmlns="" xmlns:a16="http://schemas.microsoft.com/office/drawing/2014/main" id="{B7CD71F2-4AB3-4F82-AC95-779059F13195}"/>
+                <a16:creationId xmlns:a16="http://schemas.microsoft.com/office/drawing/2014/main" xmlns="" id="{B7CD71F2-4AB3-4F82-AC95-779059F13195}"/>
               </a:ext>
             </a:extLst>
           </p:cNvPr>
@@ -8157,7 +8123,7 @@
           <a:p>
             <a:fld id="{C6166A56-2601-4E37-8D8D-05C0420DE125}" type="datetime1">
               <a:rPr lang="nl-NL" smtClean="0"/>
-              <a:t>24-3-2018</a:t>
+              <a:t>25-3-2018</a:t>
             </a:fld>
             <a:endParaRPr lang="nl-NL"/>
           </a:p>
@@ -8168,7 +8134,7 @@
           <p:cNvPr id="6" name="Tijdelijke aanduiding voor voettekst 4">
             <a:extLst>
               <a:ext uri="{FF2B5EF4-FFF2-40B4-BE49-F238E27FC236}">
-                <a16:creationId xmlns="" xmlns:a16="http://schemas.microsoft.com/office/drawing/2014/main" id="{5C6A8BCE-5EC6-40B9-9E2B-345894DAE8ED}"/>
+                <a16:creationId xmlns:a16="http://schemas.microsoft.com/office/drawing/2014/main" xmlns="" id="{5C6A8BCE-5EC6-40B9-9E2B-345894DAE8ED}"/>
               </a:ext>
             </a:extLst>
           </p:cNvPr>
@@ -11997,7 +11963,7 @@
           <p:cNvPr id="4" name="Tijdelijke aanduiding voor datum 3">
             <a:extLst>
               <a:ext uri="{FF2B5EF4-FFF2-40B4-BE49-F238E27FC236}">
-                <a16:creationId xmlns="" xmlns:a16="http://schemas.microsoft.com/office/drawing/2014/main" id="{B7CD71F2-4AB3-4F82-AC95-779059F13195}"/>
+                <a16:creationId xmlns:a16="http://schemas.microsoft.com/office/drawing/2014/main" xmlns="" id="{B7CD71F2-4AB3-4F82-AC95-779059F13195}"/>
               </a:ext>
             </a:extLst>
           </p:cNvPr>
@@ -12015,7 +11981,7 @@
           <a:p>
             <a:fld id="{C6166A56-2601-4E37-8D8D-05C0420DE125}" type="datetime1">
               <a:rPr lang="nl-NL" smtClean="0"/>
-              <a:t>24-3-2018</a:t>
+              <a:t>25-3-2018</a:t>
             </a:fld>
             <a:endParaRPr lang="nl-NL"/>
           </a:p>
@@ -12026,7 +11992,7 @@
           <p:cNvPr id="5" name="Tijdelijke aanduiding voor voettekst 4">
             <a:extLst>
               <a:ext uri="{FF2B5EF4-FFF2-40B4-BE49-F238E27FC236}">
-                <a16:creationId xmlns="" xmlns:a16="http://schemas.microsoft.com/office/drawing/2014/main" id="{5C6A8BCE-5EC6-40B9-9E2B-345894DAE8ED}"/>
+                <a16:creationId xmlns:a16="http://schemas.microsoft.com/office/drawing/2014/main" xmlns="" id="{5C6A8BCE-5EC6-40B9-9E2B-345894DAE8ED}"/>
               </a:ext>
             </a:extLst>
           </p:cNvPr>
@@ -12058,7 +12024,7 @@
           <p:cNvPr id="6" name="Tijdelijke aanduiding voor dianummer 5">
             <a:extLst>
               <a:ext uri="{FF2B5EF4-FFF2-40B4-BE49-F238E27FC236}">
-                <a16:creationId xmlns="" xmlns:a16="http://schemas.microsoft.com/office/drawing/2014/main" id="{CA89F1FE-B156-4B88-A6EE-ED53A7D070D3}"/>
+                <a16:creationId xmlns:a16="http://schemas.microsoft.com/office/drawing/2014/main" xmlns="" id="{CA89F1FE-B156-4B88-A6EE-ED53A7D070D3}"/>
               </a:ext>
             </a:extLst>
           </p:cNvPr>
@@ -12087,7 +12053,7 @@
           <p:cNvPr id="7" name="Tekstvak 6">
             <a:extLst>
               <a:ext uri="{FF2B5EF4-FFF2-40B4-BE49-F238E27FC236}">
-                <a16:creationId xmlns="" xmlns:a16="http://schemas.microsoft.com/office/drawing/2014/main" id="{BADB2CDB-D341-4825-AB3C-E755C562780A}"/>
+                <a16:creationId xmlns:a16="http://schemas.microsoft.com/office/drawing/2014/main" xmlns="" id="{BADB2CDB-D341-4825-AB3C-E755C562780A}"/>
               </a:ext>
             </a:extLst>
           </p:cNvPr>
@@ -12122,7 +12088,7 @@
           <p:cNvPr id="15" name="Afbeelding 14">
             <a:extLst>
               <a:ext uri="{FF2B5EF4-FFF2-40B4-BE49-F238E27FC236}">
-                <a16:creationId xmlns="" xmlns:a16="http://schemas.microsoft.com/office/drawing/2014/main" id="{00DBD524-F9AF-4170-A579-42F81C9F3E72}"/>
+                <a16:creationId xmlns:a16="http://schemas.microsoft.com/office/drawing/2014/main" xmlns="" id="{00DBD524-F9AF-4170-A579-42F81C9F3E72}"/>
               </a:ext>
             </a:extLst>
           </p:cNvPr>
@@ -12164,7 +12130,7 @@
           <p:cNvPr id="16" name="Afbeelding 15">
             <a:extLst>
               <a:ext uri="{FF2B5EF4-FFF2-40B4-BE49-F238E27FC236}">
-                <a16:creationId xmlns="" xmlns:a16="http://schemas.microsoft.com/office/drawing/2014/main" id="{8C41FFC2-0B1C-4E68-BD67-E008982928E5}"/>
+                <a16:creationId xmlns:a16="http://schemas.microsoft.com/office/drawing/2014/main" xmlns="" id="{8C41FFC2-0B1C-4E68-BD67-E008982928E5}"/>
               </a:ext>
             </a:extLst>
           </p:cNvPr>
@@ -12206,7 +12172,7 @@
           <p:cNvPr id="9" name="Afbeelding 8">
             <a:extLst>
               <a:ext uri="{FF2B5EF4-FFF2-40B4-BE49-F238E27FC236}">
-                <a16:creationId xmlns="" xmlns:a16="http://schemas.microsoft.com/office/drawing/2014/main" id="{5DE4EEAD-DD96-4122-84AD-FBDDE0A36FF4}"/>
+                <a16:creationId xmlns:a16="http://schemas.microsoft.com/office/drawing/2014/main" xmlns="" id="{5DE4EEAD-DD96-4122-84AD-FBDDE0A36FF4}"/>
               </a:ext>
             </a:extLst>
           </p:cNvPr>
@@ -12248,7 +12214,7 @@
           <p:cNvPr id="10" name="Afbeelding 9">
             <a:extLst>
               <a:ext uri="{FF2B5EF4-FFF2-40B4-BE49-F238E27FC236}">
-                <a16:creationId xmlns="" xmlns:a16="http://schemas.microsoft.com/office/drawing/2014/main" id="{3092549D-0E93-4713-845E-5D6321646A4A}"/>
+                <a16:creationId xmlns:a16="http://schemas.microsoft.com/office/drawing/2014/main" xmlns="" id="{3092549D-0E93-4713-845E-5D6321646A4A}"/>
               </a:ext>
             </a:extLst>
           </p:cNvPr>
@@ -12289,7 +12255,7 @@
           <p:cNvPr id="11" name="Afbeelding 10">
             <a:extLst>
               <a:ext uri="{FF2B5EF4-FFF2-40B4-BE49-F238E27FC236}">
-                <a16:creationId xmlns="" xmlns:a16="http://schemas.microsoft.com/office/drawing/2014/main" id="{C3507EFA-9F14-4A89-AA69-4191C5CC0E66}"/>
+                <a16:creationId xmlns:a16="http://schemas.microsoft.com/office/drawing/2014/main" xmlns="" id="{C3507EFA-9F14-4A89-AA69-4191C5CC0E66}"/>
               </a:ext>
             </a:extLst>
           </p:cNvPr>
@@ -12331,7 +12297,7 @@
           <p:cNvPr id="13" name="Afbeelding 12">
             <a:extLst>
               <a:ext uri="{FF2B5EF4-FFF2-40B4-BE49-F238E27FC236}">
-                <a16:creationId xmlns="" xmlns:a16="http://schemas.microsoft.com/office/drawing/2014/main" id="{B7BFBCB6-EBF7-40E5-B7C9-0DFFE6CFC8BB}"/>
+                <a16:creationId xmlns:a16="http://schemas.microsoft.com/office/drawing/2014/main" xmlns="" id="{B7BFBCB6-EBF7-40E5-B7C9-0DFFE6CFC8BB}"/>
               </a:ext>
             </a:extLst>
           </p:cNvPr>
@@ -13191,7 +13157,7 @@
           <p:cNvPr id="11" name="Afbeelding 10">
             <a:extLst>
               <a:ext uri="{FF2B5EF4-FFF2-40B4-BE49-F238E27FC236}">
-                <a16:creationId xmlns="" xmlns:a16="http://schemas.microsoft.com/office/drawing/2014/main" id="{079EDC35-E36A-4C9A-8D8D-78C350138DFB}"/>
+                <a16:creationId xmlns:a16="http://schemas.microsoft.com/office/drawing/2014/main" xmlns="" id="{079EDC35-E36A-4C9A-8D8D-78C350138DFB}"/>
               </a:ext>
             </a:extLst>
           </p:cNvPr>
@@ -13233,7 +13199,7 @@
           <p:cNvPr id="2" name="Tijdelijke aanduiding voor datum 1">
             <a:extLst>
               <a:ext uri="{FF2B5EF4-FFF2-40B4-BE49-F238E27FC236}">
-                <a16:creationId xmlns="" xmlns:a16="http://schemas.microsoft.com/office/drawing/2014/main" id="{15CB3411-7651-4941-ABB4-C1822AEDE56A}"/>
+                <a16:creationId xmlns:a16="http://schemas.microsoft.com/office/drawing/2014/main" xmlns="" id="{15CB3411-7651-4941-ABB4-C1822AEDE56A}"/>
               </a:ext>
             </a:extLst>
           </p:cNvPr>
@@ -13251,7 +13217,7 @@
           <a:p>
             <a:fld id="{B71AFF58-8559-4CE0-AA20-9C6B842D93B4}" type="datetime1">
               <a:rPr lang="nl-NL" smtClean="0"/>
-              <a:t>24-3-2018</a:t>
+              <a:t>25-3-2018</a:t>
             </a:fld>
             <a:endParaRPr lang="nl-NL"/>
           </a:p>
@@ -13262,7 +13228,7 @@
           <p:cNvPr id="3" name="Tijdelijke aanduiding voor voettekst 2">
             <a:extLst>
               <a:ext uri="{FF2B5EF4-FFF2-40B4-BE49-F238E27FC236}">
-                <a16:creationId xmlns="" xmlns:a16="http://schemas.microsoft.com/office/drawing/2014/main" id="{CA7752E9-23DD-4D98-8613-77598C2CCFA4}"/>
+                <a16:creationId xmlns:a16="http://schemas.microsoft.com/office/drawing/2014/main" xmlns="" id="{CA7752E9-23DD-4D98-8613-77598C2CCFA4}"/>
               </a:ext>
             </a:extLst>
           </p:cNvPr>
@@ -13290,7 +13256,7 @@
           <p:cNvPr id="4" name="Tijdelijke aanduiding voor dianummer 3">
             <a:extLst>
               <a:ext uri="{FF2B5EF4-FFF2-40B4-BE49-F238E27FC236}">
-                <a16:creationId xmlns="" xmlns:a16="http://schemas.microsoft.com/office/drawing/2014/main" id="{91A3FFEC-B94C-4127-8949-077FA303049A}"/>
+                <a16:creationId xmlns:a16="http://schemas.microsoft.com/office/drawing/2014/main" xmlns="" id="{91A3FFEC-B94C-4127-8949-077FA303049A}"/>
               </a:ext>
             </a:extLst>
           </p:cNvPr>
@@ -13319,7 +13285,7 @@
           <p:cNvPr id="7" name="Tekstvak 6">
             <a:extLst>
               <a:ext uri="{FF2B5EF4-FFF2-40B4-BE49-F238E27FC236}">
-                <a16:creationId xmlns="" xmlns:a16="http://schemas.microsoft.com/office/drawing/2014/main" id="{46BAFBC1-2E76-4BCA-B53E-B93C723EF38D}"/>
+                <a16:creationId xmlns:a16="http://schemas.microsoft.com/office/drawing/2014/main" xmlns="" id="{46BAFBC1-2E76-4BCA-B53E-B93C723EF38D}"/>
               </a:ext>
             </a:extLst>
           </p:cNvPr>
@@ -13360,7 +13326,7 @@
           <p:cNvPr id="8" name="Tekstvak 7">
             <a:extLst>
               <a:ext uri="{FF2B5EF4-FFF2-40B4-BE49-F238E27FC236}">
-                <a16:creationId xmlns="" xmlns:a16="http://schemas.microsoft.com/office/drawing/2014/main" id="{FF9E01FC-F7F7-4EB0-8160-945FD3F4E9EC}"/>
+                <a16:creationId xmlns:a16="http://schemas.microsoft.com/office/drawing/2014/main" xmlns="" id="{FF9E01FC-F7F7-4EB0-8160-945FD3F4E9EC}"/>
               </a:ext>
             </a:extLst>
           </p:cNvPr>
@@ -13405,7 +13371,7 @@
           <p:cNvPr id="5" name="Afbeelding 4">
             <a:extLst>
               <a:ext uri="{FF2B5EF4-FFF2-40B4-BE49-F238E27FC236}">
-                <a16:creationId xmlns="" xmlns:a16="http://schemas.microsoft.com/office/drawing/2014/main" id="{98E5EE79-D9A2-4BE2-BCBA-F998B1D99F3C}"/>
+                <a16:creationId xmlns:a16="http://schemas.microsoft.com/office/drawing/2014/main" xmlns="" id="{98E5EE79-D9A2-4BE2-BCBA-F998B1D99F3C}"/>
               </a:ext>
             </a:extLst>
           </p:cNvPr>
@@ -13447,7 +13413,7 @@
           <p:cNvPr id="6" name="Afbeelding 5">
             <a:extLst>
               <a:ext uri="{FF2B5EF4-FFF2-40B4-BE49-F238E27FC236}">
-                <a16:creationId xmlns="" xmlns:a16="http://schemas.microsoft.com/office/drawing/2014/main" id="{D0408053-BC3B-46A5-86F6-8EE0C92F7B7D}"/>
+                <a16:creationId xmlns:a16="http://schemas.microsoft.com/office/drawing/2014/main" xmlns="" id="{D0408053-BC3B-46A5-86F6-8EE0C92F7B7D}"/>
               </a:ext>
             </a:extLst>
           </p:cNvPr>
@@ -13743,7 +13709,9 @@
         </p:nvSpPr>
         <p:spPr/>
         <p:txBody>
-          <a:bodyPr/>
+          <a:bodyPr>
+            <a:normAutofit/>
+          </a:bodyPr>
           <a:lstStyle/>
           <a:p>
             <a:pPr marL="0" indent="0">

</xml_diff>

<commit_message>
[tik] -> numbered images on a slide
</commit_message>
<xml_diff>
--- a/docs/help/NL.pptx
+++ b/docs/help/NL.pptx
@@ -3085,20 +3085,50 @@
           <a:p>
             <a:r>
               <a:rPr lang="nl-NL" dirty="0"/>
-              <a:t>Met het programma gaat dit in het kort als volgt: je kiest uit de voorbeelden de grond waarmee je aan de slag wilt. Bijvoorbeeld de Parijse Grond. [tik]</a:t>
-            </a:r>
+              <a:t>Met het programma gaat dit in het kort als volgt: je kiest uit de voorbeelden de grond waarmee je aan de slag wilt. Bijvoorbeeld de Parijse Grond. </a:t>
+            </a:r>
+            <a:r>
+              <a:rPr lang="nl-NL" b="1" dirty="0" smtClean="0"/>
+              <a:t>[1]</a:t>
+            </a:r>
+            <a:endParaRPr lang="nl-NL" b="1" dirty="0"/>
           </a:p>
           <a:p>
             <a:r>
               <a:rPr lang="nl-NL" dirty="0"/>
-              <a:t>De computer vertaalt dit in een rijtje letters en cijfers – anders snapt hij het niet.</a:t>
-            </a:r>
-          </a:p>
-          <a:p>
+              <a:t>De computer vertaalt dit in een rijtje letters en </a:t>
+            </a:r>
+            <a:r>
+              <a:rPr lang="nl-NL" dirty="0" smtClean="0"/>
+              <a:t>cijfers – </a:t>
+            </a:r>
             <a:r>
               <a:rPr lang="nl-NL" dirty="0"/>
-              <a:t>Vervolgens vul je de slagen in, ook met letters zodat de computer het snapt.  Kies vervolgens voor SHOW …. [tik]</a:t>
-            </a:r>
+              <a:t>anders snapt hij het niet.</a:t>
+            </a:r>
+          </a:p>
+          <a:p>
+            <a:r>
+              <a:rPr lang="nl-NL" dirty="0"/>
+              <a:t>Vervolgens vul je </a:t>
+            </a:r>
+            <a:r>
+              <a:rPr lang="nl-NL" baseline="0" dirty="0" smtClean="0"/>
+              <a:t>beginletters van slagen in die zowel voor de computer als mensen begrijpelijk zijn. </a:t>
+            </a:r>
+            <a:r>
+              <a:rPr lang="nl-NL" dirty="0" smtClean="0"/>
+              <a:t>Kies </a:t>
+            </a:r>
+            <a:r>
+              <a:rPr lang="nl-NL" dirty="0"/>
+              <a:t>vervolgens voor SHOW …. </a:t>
+            </a:r>
+            <a:r>
+              <a:rPr lang="nl-NL" b="1" dirty="0" smtClean="0"/>
+              <a:t>[2]</a:t>
+            </a:r>
+            <a:endParaRPr lang="nl-NL" b="1" dirty="0"/>
           </a:p>
           <a:p>
             <a:endParaRPr lang="nl-NL" dirty="0"/>
@@ -3106,14 +3136,21 @@
           <a:p>
             <a:r>
               <a:rPr lang="nl-NL" dirty="0"/>
-              <a:t>…. En dan verschijnt dit plaatje.</a:t>
-            </a:r>
-          </a:p>
-          <a:p>
+              <a:t>…. En dan verschijnt dit plaatje</a:t>
+            </a:r>
+            <a:r>
+              <a:rPr lang="nl-NL" dirty="0" smtClean="0"/>
+              <a:t>. Het </a:t>
+            </a:r>
             <a:r>
               <a:rPr lang="nl-NL" dirty="0"/>
-              <a:t>Het leuke is, dat je kan spelen met de slagen. Bijvoorbeeld, hoe ziet het de Parijse grond er uit in alles netslag? [tik]</a:t>
-            </a:r>
+              <a:t>leuke is, dat je kan spelen met de slagen. Bijvoorbeeld, hoe ziet het de Parijse grond er uit in alles netslag? </a:t>
+            </a:r>
+            <a:r>
+              <a:rPr lang="nl-NL" b="1" dirty="0" smtClean="0"/>
+              <a:t>[3+4]</a:t>
+            </a:r>
+            <a:endParaRPr lang="nl-NL" b="1" dirty="0"/>
           </a:p>
           <a:p>
             <a:endParaRPr lang="nl-NL" dirty="0"/>
@@ -3121,8 +3158,17 @@
           <a:p>
             <a:r>
               <a:rPr lang="nl-NL" dirty="0"/>
-              <a:t>Voor iemand als ik, die het leuk vind om te stoeien met de slagen is dit een prachtig hulpmiddel. Waar ik eerst voor alle variaties klosjes moest wikkelen, krijg ik nu met een paar drukken op de knop een idee van hoe mijn bedenksels er uit gaan zien. Bijvoorbeeld: [tik].</a:t>
-            </a:r>
+              <a:t>Voor iemand als ik, die het leuk vind om te stoeien met de slagen is dit een prachtig hulpmiddel. Waar ik eerst voor alle variaties klosjes moest wikkelen, krijg ik nu met een paar drukken op de knop een idee van hoe mijn bedenksels er uit gaan zien. Bijvoorbeeld: </a:t>
+            </a:r>
+            <a:r>
+              <a:rPr lang="nl-NL" b="1" dirty="0" smtClean="0"/>
+              <a:t>[5+6]</a:t>
+            </a:r>
+            <a:r>
+              <a:rPr lang="nl-NL" dirty="0" smtClean="0"/>
+              <a:t>.</a:t>
+            </a:r>
+            <a:endParaRPr lang="nl-NL" dirty="0"/>
           </a:p>
           <a:p>
             <a:endParaRPr lang="nl-NL" dirty="0"/>
@@ -3384,14 +3430,35 @@
           <a:p>
             <a:r>
               <a:rPr lang="nl-NL" dirty="0"/>
-              <a:t>Bij het programma van Joke heb ik een aantal pagina’s gemaakt met voorbeelden. Zoals deze.</a:t>
-            </a:r>
-          </a:p>
-          <a:p>
+              <a:t>Bij het programma van Joke heb ik een aantal pagina’s gemaakt met voorbeelden. </a:t>
+            </a:r>
+            <a:endParaRPr lang="nl-NL" dirty="0" smtClean="0"/>
+          </a:p>
+          <a:p>
+            <a:endParaRPr lang="nl-NL" dirty="0" smtClean="0"/>
+          </a:p>
+          <a:p>
+            <a:r>
+              <a:rPr lang="nl-NL" dirty="0" smtClean="0"/>
+              <a:t>Zoals deze:</a:t>
+            </a:r>
+            <a:r>
+              <a:rPr lang="nl-NL" baseline="0" dirty="0" smtClean="0"/>
+              <a:t> </a:t>
+            </a:r>
+            <a:r>
+              <a:rPr lang="nl-NL" dirty="0" smtClean="0"/>
+              <a:t>kies </a:t>
+            </a:r>
             <a:r>
               <a:rPr lang="nl-NL" dirty="0"/>
-              <a:t>Kies bijvoorbeeld voor de Kleine sneeuwvlok, onderin, dan is [tik] dit het resultaat.</a:t>
-            </a:r>
+              <a:t>bijvoorbeeld voor de Kleine </a:t>
+            </a:r>
+            <a:r>
+              <a:rPr lang="nl-NL" dirty="0" smtClean="0"/>
+              <a:t>sneeuwvlok.</a:t>
+            </a:r>
+            <a:endParaRPr lang="nl-NL" dirty="0"/>
           </a:p>
         </p:txBody>
       </p:sp>
@@ -11983,7 +12050,7 @@
               <a:rPr lang="nl-NL" smtClean="0"/>
               <a:t>25-3-2018</a:t>
             </a:fld>
-            <a:endParaRPr lang="nl-NL"/>
+            <a:endParaRPr lang="nl-NL" dirty="0"/>
           </a:p>
         </p:txBody>
       </p:sp>
@@ -12127,131 +12194,6 @@
       </p:pic>
       <p:pic>
         <p:nvPicPr>
-          <p:cNvPr id="16" name="Afbeelding 15">
-            <a:extLst>
-              <a:ext uri="{FF2B5EF4-FFF2-40B4-BE49-F238E27FC236}">
-                <a16:creationId xmlns:a16="http://schemas.microsoft.com/office/drawing/2014/main" xmlns="" id="{8C41FFC2-0B1C-4E68-BD67-E008982928E5}"/>
-              </a:ext>
-            </a:extLst>
-          </p:cNvPr>
-          <p:cNvPicPr>
-            <a:picLocks noChangeAspect="1"/>
-          </p:cNvPicPr>
-          <p:nvPr/>
-        </p:nvPicPr>
-        <p:blipFill>
-          <a:blip r:embed="rId4"/>
-          <a:stretch>
-            <a:fillRect/>
-          </a:stretch>
-        </p:blipFill>
-        <p:spPr>
-          <a:xfrm>
-            <a:off x="1066319" y="1758871"/>
-            <a:ext cx="1867169" cy="1860524"/>
-          </a:xfrm>
-          <a:prstGeom prst="rect">
-            <a:avLst/>
-          </a:prstGeom>
-          <a:ln>
-            <a:solidFill>
-              <a:srgbClr val="002060"/>
-            </a:solidFill>
-          </a:ln>
-          <a:effectLst>
-            <a:outerShdw blurRad="50800" dist="38100" dir="2700000" algn="tl" rotWithShape="0">
-              <a:prstClr val="black">
-                <a:alpha val="40000"/>
-              </a:prstClr>
-            </a:outerShdw>
-          </a:effectLst>
-        </p:spPr>
-      </p:pic>
-      <p:pic>
-        <p:nvPicPr>
-          <p:cNvPr id="9" name="Afbeelding 8">
-            <a:extLst>
-              <a:ext uri="{FF2B5EF4-FFF2-40B4-BE49-F238E27FC236}">
-                <a16:creationId xmlns:a16="http://schemas.microsoft.com/office/drawing/2014/main" xmlns="" id="{5DE4EEAD-DD96-4122-84AD-FBDDE0A36FF4}"/>
-              </a:ext>
-            </a:extLst>
-          </p:cNvPr>
-          <p:cNvPicPr>
-            <a:picLocks noChangeAspect="1"/>
-          </p:cNvPicPr>
-          <p:nvPr/>
-        </p:nvPicPr>
-        <p:blipFill>
-          <a:blip r:embed="rId5"/>
-          <a:stretch>
-            <a:fillRect/>
-          </a:stretch>
-        </p:blipFill>
-        <p:spPr>
-          <a:xfrm>
-            <a:off x="2388099" y="2225408"/>
-            <a:ext cx="4020062" cy="1851664"/>
-          </a:xfrm>
-          <a:prstGeom prst="rect">
-            <a:avLst/>
-          </a:prstGeom>
-          <a:ln>
-            <a:solidFill>
-              <a:srgbClr val="002060"/>
-            </a:solidFill>
-          </a:ln>
-          <a:effectLst>
-            <a:outerShdw blurRad="50800" dist="38100" dir="2700000" algn="tl" rotWithShape="0">
-              <a:prstClr val="black">
-                <a:alpha val="40000"/>
-              </a:prstClr>
-            </a:outerShdw>
-          </a:effectLst>
-        </p:spPr>
-      </p:pic>
-      <p:pic>
-        <p:nvPicPr>
-          <p:cNvPr id="10" name="Afbeelding 9">
-            <a:extLst>
-              <a:ext uri="{FF2B5EF4-FFF2-40B4-BE49-F238E27FC236}">
-                <a16:creationId xmlns:a16="http://schemas.microsoft.com/office/drawing/2014/main" xmlns="" id="{3092549D-0E93-4713-845E-5D6321646A4A}"/>
-              </a:ext>
-            </a:extLst>
-          </p:cNvPr>
-          <p:cNvPicPr>
-            <a:picLocks noChangeAspect="1"/>
-          </p:cNvPicPr>
-          <p:nvPr/>
-        </p:nvPicPr>
-        <p:blipFill rotWithShape="1">
-          <a:blip r:embed="rId6"/>
-          <a:srcRect l="50890" t="48611" r="18858" b="32222"/>
-          <a:stretch/>
-        </p:blipFill>
-        <p:spPr>
-          <a:xfrm>
-            <a:off x="4707182" y="2664298"/>
-            <a:ext cx="4020062" cy="1910194"/>
-          </a:xfrm>
-          <a:prstGeom prst="rect">
-            <a:avLst/>
-          </a:prstGeom>
-          <a:ln>
-            <a:solidFill>
-              <a:srgbClr val="002060"/>
-            </a:solidFill>
-          </a:ln>
-          <a:effectLst>
-            <a:outerShdw blurRad="50800" dist="38100" dir="2700000" algn="tl" rotWithShape="0">
-              <a:prstClr val="black">
-                <a:alpha val="40000"/>
-              </a:prstClr>
-            </a:outerShdw>
-          </a:effectLst>
-        </p:spPr>
-      </p:pic>
-      <p:pic>
-        <p:nvPicPr>
           <p:cNvPr id="11" name="Afbeelding 10">
             <a:extLst>
               <a:ext uri="{FF2B5EF4-FFF2-40B4-BE49-F238E27FC236}">
@@ -12265,7 +12207,7 @@
           <p:nvPr/>
         </p:nvPicPr>
         <p:blipFill>
-          <a:blip r:embed="rId7"/>
+          <a:blip r:embed="rId4"/>
           <a:stretch>
             <a:fillRect/>
           </a:stretch>
@@ -12307,7 +12249,7 @@
           <p:nvPr/>
         </p:nvPicPr>
         <p:blipFill rotWithShape="1">
-          <a:blip r:embed="rId8"/>
+          <a:blip r:embed="rId5"/>
           <a:srcRect l="52118" t="56162" r="17629" b="25170"/>
           <a:stretch/>
         </p:blipFill>
@@ -12333,6 +12275,725 @@
           </a:effectLst>
         </p:spPr>
       </p:pic>
+      <p:pic>
+        <p:nvPicPr>
+          <p:cNvPr id="9" name="Afbeelding 8">
+            <a:extLst>
+              <a:ext uri="{FF2B5EF4-FFF2-40B4-BE49-F238E27FC236}">
+                <a16:creationId xmlns:a16="http://schemas.microsoft.com/office/drawing/2014/main" xmlns="" id="{5DE4EEAD-DD96-4122-84AD-FBDDE0A36FF4}"/>
+              </a:ext>
+            </a:extLst>
+          </p:cNvPr>
+          <p:cNvPicPr>
+            <a:picLocks noChangeAspect="1"/>
+          </p:cNvPicPr>
+          <p:nvPr/>
+        </p:nvPicPr>
+        <p:blipFill>
+          <a:blip r:embed="rId6"/>
+          <a:stretch>
+            <a:fillRect/>
+          </a:stretch>
+        </p:blipFill>
+        <p:spPr>
+          <a:xfrm>
+            <a:off x="971279" y="1512936"/>
+            <a:ext cx="4020062" cy="1851664"/>
+          </a:xfrm>
+          <a:prstGeom prst="rect">
+            <a:avLst/>
+          </a:prstGeom>
+          <a:ln>
+            <a:solidFill>
+              <a:srgbClr val="002060"/>
+            </a:solidFill>
+          </a:ln>
+          <a:effectLst>
+            <a:outerShdw blurRad="50800" dist="38100" dir="2700000" algn="tl" rotWithShape="0">
+              <a:prstClr val="black">
+                <a:alpha val="40000"/>
+              </a:prstClr>
+            </a:outerShdw>
+          </a:effectLst>
+        </p:spPr>
+      </p:pic>
+      <p:sp>
+        <p:nvSpPr>
+          <p:cNvPr id="3" name="Rechthoek 2"/>
+          <p:cNvSpPr/>
+          <p:nvPr/>
+        </p:nvSpPr>
+        <p:spPr>
+          <a:xfrm>
+            <a:off x="251520" y="1486519"/>
+            <a:ext cx="461869" cy="923330"/>
+          </a:xfrm>
+          <a:prstGeom prst="rect">
+            <a:avLst/>
+          </a:prstGeom>
+          <a:noFill/>
+        </p:spPr>
+        <p:txBody>
+          <a:bodyPr wrap="square" lIns="91440" tIns="45720" rIns="91440" bIns="45720">
+            <a:spAutoFit/>
+          </a:bodyPr>
+          <a:lstStyle/>
+          <a:p>
+            <a:pPr algn="ctr"/>
+            <a:r>
+              <a:rPr lang="nl-NL" sz="5400" b="1" cap="none" spc="0" dirty="0" smtClean="0">
+                <a:ln w="10541" cmpd="sng">
+                  <a:solidFill>
+                    <a:schemeClr val="accent1">
+                      <a:shade val="88000"/>
+                      <a:satMod val="110000"/>
+                    </a:schemeClr>
+                  </a:solidFill>
+                  <a:prstDash val="solid"/>
+                </a:ln>
+                <a:gradFill>
+                  <a:gsLst>
+                    <a:gs pos="0">
+                      <a:schemeClr val="accent1">
+                        <a:tint val="40000"/>
+                        <a:satMod val="250000"/>
+                      </a:schemeClr>
+                    </a:gs>
+                    <a:gs pos="9000">
+                      <a:schemeClr val="accent1">
+                        <a:tint val="52000"/>
+                        <a:satMod val="300000"/>
+                      </a:schemeClr>
+                    </a:gs>
+                    <a:gs pos="50000">
+                      <a:schemeClr val="accent1">
+                        <a:shade val="20000"/>
+                        <a:satMod val="300000"/>
+                      </a:schemeClr>
+                    </a:gs>
+                    <a:gs pos="79000">
+                      <a:schemeClr val="accent1">
+                        <a:tint val="52000"/>
+                        <a:satMod val="300000"/>
+                      </a:schemeClr>
+                    </a:gs>
+                    <a:gs pos="100000">
+                      <a:schemeClr val="accent1">
+                        <a:tint val="40000"/>
+                        <a:satMod val="250000"/>
+                      </a:schemeClr>
+                    </a:gs>
+                  </a:gsLst>
+                  <a:lin ang="5400000"/>
+                </a:gradFill>
+                <a:effectLst/>
+              </a:rPr>
+              <a:t>1</a:t>
+            </a:r>
+          </a:p>
+        </p:txBody>
+      </p:sp>
+      <p:sp>
+        <p:nvSpPr>
+          <p:cNvPr id="18" name="Rechthoek 17"/>
+          <p:cNvSpPr/>
+          <p:nvPr/>
+        </p:nvSpPr>
+        <p:spPr>
+          <a:xfrm>
+            <a:off x="971279" y="2821854"/>
+            <a:ext cx="468394" cy="923330"/>
+          </a:xfrm>
+          <a:prstGeom prst="rect">
+            <a:avLst/>
+          </a:prstGeom>
+          <a:noFill/>
+        </p:spPr>
+        <p:txBody>
+          <a:bodyPr wrap="square" lIns="91440" tIns="45720" rIns="91440" bIns="45720">
+            <a:spAutoFit/>
+          </a:bodyPr>
+          <a:lstStyle/>
+          <a:p>
+            <a:pPr algn="ctr"/>
+            <a:r>
+              <a:rPr lang="nl-NL" sz="5400" b="1" dirty="0">
+                <a:ln w="10541" cmpd="sng">
+                  <a:solidFill>
+                    <a:schemeClr val="accent1">
+                      <a:shade val="88000"/>
+                      <a:satMod val="110000"/>
+                    </a:schemeClr>
+                  </a:solidFill>
+                  <a:prstDash val="solid"/>
+                </a:ln>
+                <a:gradFill>
+                  <a:gsLst>
+                    <a:gs pos="0">
+                      <a:schemeClr val="accent1">
+                        <a:tint val="40000"/>
+                        <a:satMod val="250000"/>
+                      </a:schemeClr>
+                    </a:gs>
+                    <a:gs pos="9000">
+                      <a:schemeClr val="accent1">
+                        <a:tint val="52000"/>
+                        <a:satMod val="300000"/>
+                      </a:schemeClr>
+                    </a:gs>
+                    <a:gs pos="50000">
+                      <a:schemeClr val="accent1">
+                        <a:shade val="20000"/>
+                        <a:satMod val="300000"/>
+                      </a:schemeClr>
+                    </a:gs>
+                    <a:gs pos="79000">
+                      <a:schemeClr val="accent1">
+                        <a:tint val="52000"/>
+                        <a:satMod val="300000"/>
+                      </a:schemeClr>
+                    </a:gs>
+                    <a:gs pos="100000">
+                      <a:schemeClr val="accent1">
+                        <a:tint val="40000"/>
+                        <a:satMod val="250000"/>
+                      </a:schemeClr>
+                    </a:gs>
+                  </a:gsLst>
+                  <a:lin ang="5400000"/>
+                </a:gradFill>
+              </a:rPr>
+              <a:t>2</a:t>
+            </a:r>
+            <a:endParaRPr lang="nl-NL" sz="5400" b="1" cap="none" spc="0" dirty="0" smtClean="0">
+              <a:ln w="10541" cmpd="sng">
+                <a:solidFill>
+                  <a:schemeClr val="accent1">
+                    <a:shade val="88000"/>
+                    <a:satMod val="110000"/>
+                  </a:schemeClr>
+                </a:solidFill>
+                <a:prstDash val="solid"/>
+              </a:ln>
+              <a:gradFill>
+                <a:gsLst>
+                  <a:gs pos="0">
+                    <a:schemeClr val="accent1">
+                      <a:tint val="40000"/>
+                      <a:satMod val="250000"/>
+                    </a:schemeClr>
+                  </a:gs>
+                  <a:gs pos="9000">
+                    <a:schemeClr val="accent1">
+                      <a:tint val="52000"/>
+                      <a:satMod val="300000"/>
+                    </a:schemeClr>
+                  </a:gs>
+                  <a:gs pos="50000">
+                    <a:schemeClr val="accent1">
+                      <a:shade val="20000"/>
+                      <a:satMod val="300000"/>
+                    </a:schemeClr>
+                  </a:gs>
+                  <a:gs pos="79000">
+                    <a:schemeClr val="accent1">
+                      <a:tint val="52000"/>
+                      <a:satMod val="300000"/>
+                    </a:schemeClr>
+                  </a:gs>
+                  <a:gs pos="100000">
+                    <a:schemeClr val="accent1">
+                      <a:tint val="40000"/>
+                      <a:satMod val="250000"/>
+                    </a:schemeClr>
+                  </a:gs>
+                </a:gsLst>
+                <a:lin ang="5400000"/>
+              </a:gradFill>
+              <a:effectLst/>
+            </a:endParaRPr>
+          </a:p>
+        </p:txBody>
+      </p:sp>
+      <p:sp>
+        <p:nvSpPr>
+          <p:cNvPr id="19" name="Rechthoek 18"/>
+          <p:cNvSpPr/>
+          <p:nvPr/>
+        </p:nvSpPr>
+        <p:spPr>
+          <a:xfrm>
+            <a:off x="332277" y="5589240"/>
+            <a:ext cx="468394" cy="923330"/>
+          </a:xfrm>
+          <a:prstGeom prst="rect">
+            <a:avLst/>
+          </a:prstGeom>
+          <a:noFill/>
+        </p:spPr>
+        <p:txBody>
+          <a:bodyPr wrap="square" lIns="91440" tIns="45720" rIns="91440" bIns="45720">
+            <a:spAutoFit/>
+          </a:bodyPr>
+          <a:lstStyle/>
+          <a:p>
+            <a:pPr algn="ctr"/>
+            <a:r>
+              <a:rPr lang="nl-NL" sz="5400" b="1" cap="none" spc="0" dirty="0" smtClean="0">
+                <a:ln w="10541" cmpd="sng">
+                  <a:solidFill>
+                    <a:schemeClr val="accent1">
+                      <a:shade val="88000"/>
+                      <a:satMod val="110000"/>
+                    </a:schemeClr>
+                  </a:solidFill>
+                  <a:prstDash val="solid"/>
+                </a:ln>
+                <a:gradFill>
+                  <a:gsLst>
+                    <a:gs pos="0">
+                      <a:schemeClr val="accent1">
+                        <a:tint val="40000"/>
+                        <a:satMod val="250000"/>
+                      </a:schemeClr>
+                    </a:gs>
+                    <a:gs pos="9000">
+                      <a:schemeClr val="accent1">
+                        <a:tint val="52000"/>
+                        <a:satMod val="300000"/>
+                      </a:schemeClr>
+                    </a:gs>
+                    <a:gs pos="50000">
+                      <a:schemeClr val="accent1">
+                        <a:shade val="20000"/>
+                        <a:satMod val="300000"/>
+                      </a:schemeClr>
+                    </a:gs>
+                    <a:gs pos="79000">
+                      <a:schemeClr val="accent1">
+                        <a:tint val="52000"/>
+                        <a:satMod val="300000"/>
+                      </a:schemeClr>
+                    </a:gs>
+                    <a:gs pos="100000">
+                      <a:schemeClr val="accent1">
+                        <a:tint val="40000"/>
+                        <a:satMod val="250000"/>
+                      </a:schemeClr>
+                    </a:gs>
+                  </a:gsLst>
+                  <a:lin ang="5400000"/>
+                </a:gradFill>
+                <a:effectLst/>
+              </a:rPr>
+              <a:t>5</a:t>
+            </a:r>
+          </a:p>
+        </p:txBody>
+      </p:sp>
+      <p:sp>
+        <p:nvSpPr>
+          <p:cNvPr id="20" name="Rechthoek 19"/>
+          <p:cNvSpPr/>
+          <p:nvPr/>
+        </p:nvSpPr>
+        <p:spPr>
+          <a:xfrm>
+            <a:off x="4567355" y="5517232"/>
+            <a:ext cx="472245" cy="923330"/>
+          </a:xfrm>
+          <a:prstGeom prst="rect">
+            <a:avLst/>
+          </a:prstGeom>
+          <a:noFill/>
+        </p:spPr>
+        <p:txBody>
+          <a:bodyPr wrap="square" lIns="91440" tIns="45720" rIns="91440" bIns="45720">
+            <a:spAutoFit/>
+          </a:bodyPr>
+          <a:lstStyle/>
+          <a:p>
+            <a:pPr algn="ctr"/>
+            <a:r>
+              <a:rPr lang="nl-NL" sz="5400" b="1" dirty="0">
+                <a:ln w="10541" cmpd="sng">
+                  <a:solidFill>
+                    <a:schemeClr val="accent1">
+                      <a:shade val="88000"/>
+                      <a:satMod val="110000"/>
+                    </a:schemeClr>
+                  </a:solidFill>
+                  <a:prstDash val="solid"/>
+                </a:ln>
+                <a:gradFill>
+                  <a:gsLst>
+                    <a:gs pos="0">
+                      <a:schemeClr val="accent1">
+                        <a:tint val="40000"/>
+                        <a:satMod val="250000"/>
+                      </a:schemeClr>
+                    </a:gs>
+                    <a:gs pos="9000">
+                      <a:schemeClr val="accent1">
+                        <a:tint val="52000"/>
+                        <a:satMod val="300000"/>
+                      </a:schemeClr>
+                    </a:gs>
+                    <a:gs pos="50000">
+                      <a:schemeClr val="accent1">
+                        <a:shade val="20000"/>
+                        <a:satMod val="300000"/>
+                      </a:schemeClr>
+                    </a:gs>
+                    <a:gs pos="79000">
+                      <a:schemeClr val="accent1">
+                        <a:tint val="52000"/>
+                        <a:satMod val="300000"/>
+                      </a:schemeClr>
+                    </a:gs>
+                    <a:gs pos="100000">
+                      <a:schemeClr val="accent1">
+                        <a:tint val="40000"/>
+                        <a:satMod val="250000"/>
+                      </a:schemeClr>
+                    </a:gs>
+                  </a:gsLst>
+                  <a:lin ang="5400000"/>
+                </a:gradFill>
+              </a:rPr>
+              <a:t>6</a:t>
+            </a:r>
+            <a:endParaRPr lang="nl-NL" sz="5400" b="1" cap="none" spc="0" dirty="0" smtClean="0">
+              <a:ln w="10541" cmpd="sng">
+                <a:solidFill>
+                  <a:schemeClr val="accent1">
+                    <a:shade val="88000"/>
+                    <a:satMod val="110000"/>
+                  </a:schemeClr>
+                </a:solidFill>
+                <a:prstDash val="solid"/>
+              </a:ln>
+              <a:gradFill>
+                <a:gsLst>
+                  <a:gs pos="0">
+                    <a:schemeClr val="accent1">
+                      <a:tint val="40000"/>
+                      <a:satMod val="250000"/>
+                    </a:schemeClr>
+                  </a:gs>
+                  <a:gs pos="9000">
+                    <a:schemeClr val="accent1">
+                      <a:tint val="52000"/>
+                      <a:satMod val="300000"/>
+                    </a:schemeClr>
+                  </a:gs>
+                  <a:gs pos="50000">
+                    <a:schemeClr val="accent1">
+                      <a:shade val="20000"/>
+                      <a:satMod val="300000"/>
+                    </a:schemeClr>
+                  </a:gs>
+                  <a:gs pos="79000">
+                    <a:schemeClr val="accent1">
+                      <a:tint val="52000"/>
+                      <a:satMod val="300000"/>
+                    </a:schemeClr>
+                  </a:gs>
+                  <a:gs pos="100000">
+                    <a:schemeClr val="accent1">
+                      <a:tint val="40000"/>
+                      <a:satMod val="250000"/>
+                    </a:schemeClr>
+                  </a:gs>
+                </a:gsLst>
+                <a:lin ang="5400000"/>
+              </a:gradFill>
+              <a:effectLst/>
+            </a:endParaRPr>
+          </a:p>
+        </p:txBody>
+      </p:sp>
+      <p:pic>
+        <p:nvPicPr>
+          <p:cNvPr id="16" name="Afbeelding 15">
+            <a:extLst>
+              <a:ext uri="{FF2B5EF4-FFF2-40B4-BE49-F238E27FC236}">
+                <a16:creationId xmlns:a16="http://schemas.microsoft.com/office/drawing/2014/main" xmlns="" id="{8C41FFC2-0B1C-4E68-BD67-E008982928E5}"/>
+              </a:ext>
+            </a:extLst>
+          </p:cNvPr>
+          <p:cNvPicPr>
+            <a:picLocks noChangeAspect="1"/>
+          </p:cNvPicPr>
+          <p:nvPr/>
+        </p:nvPicPr>
+        <p:blipFill>
+          <a:blip r:embed="rId7"/>
+          <a:stretch>
+            <a:fillRect/>
+          </a:stretch>
+        </p:blipFill>
+        <p:spPr>
+          <a:xfrm>
+            <a:off x="3280895" y="1793716"/>
+            <a:ext cx="1867169" cy="1860524"/>
+          </a:xfrm>
+          <a:prstGeom prst="rect">
+            <a:avLst/>
+          </a:prstGeom>
+          <a:ln>
+            <a:solidFill>
+              <a:srgbClr val="002060"/>
+            </a:solidFill>
+          </a:ln>
+          <a:effectLst>
+            <a:outerShdw blurRad="50800" dist="38100" dir="2700000" algn="tl" rotWithShape="0">
+              <a:prstClr val="black">
+                <a:alpha val="40000"/>
+              </a:prstClr>
+            </a:outerShdw>
+          </a:effectLst>
+        </p:spPr>
+      </p:pic>
+      <p:sp>
+        <p:nvSpPr>
+          <p:cNvPr id="17" name="Rechthoek 16"/>
+          <p:cNvSpPr/>
+          <p:nvPr/>
+        </p:nvSpPr>
+        <p:spPr>
+          <a:xfrm>
+            <a:off x="3281577" y="3081734"/>
+            <a:ext cx="468394" cy="923330"/>
+          </a:xfrm>
+          <a:prstGeom prst="rect">
+            <a:avLst/>
+          </a:prstGeom>
+          <a:noFill/>
+        </p:spPr>
+        <p:txBody>
+          <a:bodyPr wrap="square" lIns="91440" tIns="45720" rIns="91440" bIns="45720">
+            <a:spAutoFit/>
+          </a:bodyPr>
+          <a:lstStyle/>
+          <a:p>
+            <a:pPr algn="ctr"/>
+            <a:r>
+              <a:rPr lang="nl-NL" sz="5400" b="1" cap="none" spc="0" dirty="0" smtClean="0">
+                <a:ln w="10541" cmpd="sng">
+                  <a:solidFill>
+                    <a:schemeClr val="accent1">
+                      <a:shade val="88000"/>
+                      <a:satMod val="110000"/>
+                    </a:schemeClr>
+                  </a:solidFill>
+                  <a:prstDash val="solid"/>
+                </a:ln>
+                <a:gradFill>
+                  <a:gsLst>
+                    <a:gs pos="0">
+                      <a:schemeClr val="accent1">
+                        <a:tint val="40000"/>
+                        <a:satMod val="250000"/>
+                      </a:schemeClr>
+                    </a:gs>
+                    <a:gs pos="9000">
+                      <a:schemeClr val="accent1">
+                        <a:tint val="52000"/>
+                        <a:satMod val="300000"/>
+                      </a:schemeClr>
+                    </a:gs>
+                    <a:gs pos="50000">
+                      <a:schemeClr val="accent1">
+                        <a:shade val="20000"/>
+                        <a:satMod val="300000"/>
+                      </a:schemeClr>
+                    </a:gs>
+                    <a:gs pos="79000">
+                      <a:schemeClr val="accent1">
+                        <a:tint val="52000"/>
+                        <a:satMod val="300000"/>
+                      </a:schemeClr>
+                    </a:gs>
+                    <a:gs pos="100000">
+                      <a:schemeClr val="accent1">
+                        <a:tint val="40000"/>
+                        <a:satMod val="250000"/>
+                      </a:schemeClr>
+                    </a:gs>
+                  </a:gsLst>
+                  <a:lin ang="5400000"/>
+                </a:gradFill>
+                <a:effectLst/>
+              </a:rPr>
+              <a:t>3</a:t>
+            </a:r>
+          </a:p>
+        </p:txBody>
+      </p:sp>
+      <p:pic>
+        <p:nvPicPr>
+          <p:cNvPr id="10" name="Afbeelding 9">
+            <a:extLst>
+              <a:ext uri="{FF2B5EF4-FFF2-40B4-BE49-F238E27FC236}">
+                <a16:creationId xmlns:a16="http://schemas.microsoft.com/office/drawing/2014/main" xmlns="" id="{3092549D-0E93-4713-845E-5D6321646A4A}"/>
+              </a:ext>
+            </a:extLst>
+          </p:cNvPr>
+          <p:cNvPicPr>
+            <a:picLocks noChangeAspect="1"/>
+          </p:cNvPicPr>
+          <p:nvPr/>
+        </p:nvPicPr>
+        <p:blipFill rotWithShape="1">
+          <a:blip r:embed="rId8"/>
+          <a:srcRect l="50890" t="48611" r="18858" b="32222"/>
+          <a:stretch/>
+        </p:blipFill>
+        <p:spPr>
+          <a:xfrm>
+            <a:off x="4572000" y="1938132"/>
+            <a:ext cx="4020062" cy="1910194"/>
+          </a:xfrm>
+          <a:prstGeom prst="rect">
+            <a:avLst/>
+          </a:prstGeom>
+          <a:ln>
+            <a:solidFill>
+              <a:srgbClr val="002060"/>
+            </a:solidFill>
+          </a:ln>
+          <a:effectLst>
+            <a:outerShdw blurRad="50800" dist="38100" dir="2700000" algn="tl" rotWithShape="0">
+              <a:prstClr val="black">
+                <a:alpha val="40000"/>
+              </a:prstClr>
+            </a:outerShdw>
+          </a:effectLst>
+        </p:spPr>
+      </p:pic>
+      <p:sp>
+        <p:nvSpPr>
+          <p:cNvPr id="14" name="Rechthoek 13"/>
+          <p:cNvSpPr/>
+          <p:nvPr/>
+        </p:nvSpPr>
+        <p:spPr>
+          <a:xfrm>
+            <a:off x="4610783" y="3279328"/>
+            <a:ext cx="468394" cy="923330"/>
+          </a:xfrm>
+          <a:prstGeom prst="rect">
+            <a:avLst/>
+          </a:prstGeom>
+          <a:noFill/>
+        </p:spPr>
+        <p:txBody>
+          <a:bodyPr wrap="square" lIns="91440" tIns="45720" rIns="91440" bIns="45720">
+            <a:spAutoFit/>
+          </a:bodyPr>
+          <a:lstStyle/>
+          <a:p>
+            <a:pPr algn="ctr"/>
+            <a:r>
+              <a:rPr lang="nl-NL" sz="5400" b="1" dirty="0">
+                <a:ln w="10541" cmpd="sng">
+                  <a:solidFill>
+                    <a:schemeClr val="accent1">
+                      <a:shade val="88000"/>
+                      <a:satMod val="110000"/>
+                    </a:schemeClr>
+                  </a:solidFill>
+                  <a:prstDash val="solid"/>
+                </a:ln>
+                <a:gradFill>
+                  <a:gsLst>
+                    <a:gs pos="0">
+                      <a:schemeClr val="accent1">
+                        <a:tint val="40000"/>
+                        <a:satMod val="250000"/>
+                      </a:schemeClr>
+                    </a:gs>
+                    <a:gs pos="9000">
+                      <a:schemeClr val="accent1">
+                        <a:tint val="52000"/>
+                        <a:satMod val="300000"/>
+                      </a:schemeClr>
+                    </a:gs>
+                    <a:gs pos="50000">
+                      <a:schemeClr val="accent1">
+                        <a:shade val="20000"/>
+                        <a:satMod val="300000"/>
+                      </a:schemeClr>
+                    </a:gs>
+                    <a:gs pos="79000">
+                      <a:schemeClr val="accent1">
+                        <a:tint val="52000"/>
+                        <a:satMod val="300000"/>
+                      </a:schemeClr>
+                    </a:gs>
+                    <a:gs pos="100000">
+                      <a:schemeClr val="accent1">
+                        <a:tint val="40000"/>
+                        <a:satMod val="250000"/>
+                      </a:schemeClr>
+                    </a:gs>
+                  </a:gsLst>
+                  <a:lin ang="5400000"/>
+                </a:gradFill>
+              </a:rPr>
+              <a:t>4</a:t>
+            </a:r>
+            <a:endParaRPr lang="nl-NL" sz="5400" b="1" cap="none" spc="0" dirty="0" smtClean="0">
+              <a:ln w="10541" cmpd="sng">
+                <a:solidFill>
+                  <a:schemeClr val="accent1">
+                    <a:shade val="88000"/>
+                    <a:satMod val="110000"/>
+                  </a:schemeClr>
+                </a:solidFill>
+                <a:prstDash val="solid"/>
+              </a:ln>
+              <a:gradFill>
+                <a:gsLst>
+                  <a:gs pos="0">
+                    <a:schemeClr val="accent1">
+                      <a:tint val="40000"/>
+                      <a:satMod val="250000"/>
+                    </a:schemeClr>
+                  </a:gs>
+                  <a:gs pos="9000">
+                    <a:schemeClr val="accent1">
+                      <a:tint val="52000"/>
+                      <a:satMod val="300000"/>
+                    </a:schemeClr>
+                  </a:gs>
+                  <a:gs pos="50000">
+                    <a:schemeClr val="accent1">
+                      <a:shade val="20000"/>
+                      <a:satMod val="300000"/>
+                    </a:schemeClr>
+                  </a:gs>
+                  <a:gs pos="79000">
+                    <a:schemeClr val="accent1">
+                      <a:tint val="52000"/>
+                      <a:satMod val="300000"/>
+                    </a:schemeClr>
+                  </a:gs>
+                  <a:gs pos="100000">
+                    <a:schemeClr val="accent1">
+                      <a:tint val="40000"/>
+                      <a:satMod val="250000"/>
+                    </a:schemeClr>
+                  </a:gs>
+                </a:gsLst>
+                <a:lin ang="5400000"/>
+              </a:gradFill>
+              <a:effectLst/>
+            </a:endParaRPr>
+          </a:p>
+        </p:txBody>
+      </p:sp>
     </p:spTree>
     <p:extLst>
       <p:ext uri="{BB962C8B-B14F-4D97-AF65-F5344CB8AC3E}">
@@ -12364,7 +13025,7 @@
                             </p:stCondLst>
                             <p:childTnLst>
                               <p:par>
-                                <p:cTn id="5" presetID="2" presetClass="entr" presetSubtype="4" fill="hold" nodeType="clickEffect">
+                                <p:cTn id="5" presetID="1" presetClass="entr" presetSubtype="0" fill="hold" nodeType="clickEffect">
                                   <p:stCondLst>
                                     <p:cond delay="0"/>
                                   </p:stCondLst>
@@ -12387,52 +13048,33 @@
                                         <p:strVal val="visible"/>
                                       </p:to>
                                     </p:set>
-                                    <p:anim calcmode="lin" valueType="num">
-                                      <p:cBhvr additive="base">
-                                        <p:cTn id="7" dur="500" fill="hold"/>
+                                  </p:childTnLst>
+                                </p:cTn>
+                              </p:par>
+                              <p:par>
+                                <p:cTn id="7" presetID="1" presetClass="entr" presetSubtype="0" fill="hold" grpId="0" nodeType="withEffect">
+                                  <p:stCondLst>
+                                    <p:cond delay="0"/>
+                                  </p:stCondLst>
+                                  <p:childTnLst>
+                                    <p:set>
+                                      <p:cBhvr>
+                                        <p:cTn id="8" dur="1" fill="hold">
+                                          <p:stCondLst>
+                                            <p:cond delay="0"/>
+                                          </p:stCondLst>
+                                        </p:cTn>
                                         <p:tgtEl>
-                                          <p:spTgt spid="15"/>
+                                          <p:spTgt spid="3"/>
                                         </p:tgtEl>
                                         <p:attrNameLst>
-                                          <p:attrName>ppt_x</p:attrName>
+                                          <p:attrName>style.visibility</p:attrName>
                                         </p:attrNameLst>
                                       </p:cBhvr>
-                                      <p:tavLst>
-                                        <p:tav tm="0">
-                                          <p:val>
-                                            <p:strVal val="#ppt_x"/>
-                                          </p:val>
-                                        </p:tav>
-                                        <p:tav tm="100000">
-                                          <p:val>
-                                            <p:strVal val="#ppt_x"/>
-                                          </p:val>
-                                        </p:tav>
-                                      </p:tavLst>
-                                    </p:anim>
-                                    <p:anim calcmode="lin" valueType="num">
-                                      <p:cBhvr additive="base">
-                                        <p:cTn id="8" dur="500" fill="hold"/>
-                                        <p:tgtEl>
-                                          <p:spTgt spid="15"/>
-                                        </p:tgtEl>
-                                        <p:attrNameLst>
-                                          <p:attrName>ppt_y</p:attrName>
-                                        </p:attrNameLst>
-                                      </p:cBhvr>
-                                      <p:tavLst>
-                                        <p:tav tm="0">
-                                          <p:val>
-                                            <p:strVal val="1+#ppt_h/2"/>
-                                          </p:val>
-                                        </p:tav>
-                                        <p:tav tm="100000">
-                                          <p:val>
-                                            <p:strVal val="#ppt_y"/>
-                                          </p:val>
-                                        </p:tav>
-                                      </p:tavLst>
-                                    </p:anim>
+                                      <p:to>
+                                        <p:strVal val="visible"/>
+                                      </p:to>
+                                    </p:set>
                                   </p:childTnLst>
                                 </p:cTn>
                               </p:par>
@@ -12455,7 +13097,7 @@
                             </p:stCondLst>
                             <p:childTnLst>
                               <p:par>
-                                <p:cTn id="11" presetID="2" presetClass="entr" presetSubtype="4" fill="hold" nodeType="clickEffect">
+                                <p:cTn id="11" presetID="1" presetClass="entr" presetSubtype="0" fill="hold" grpId="0" nodeType="clickEffect">
                                   <p:stCondLst>
                                     <p:cond delay="0"/>
                                   </p:stCondLst>
@@ -12463,6 +13105,33 @@
                                     <p:set>
                                       <p:cBhvr>
                                         <p:cTn id="12" dur="1" fill="hold">
+                                          <p:stCondLst>
+                                            <p:cond delay="0"/>
+                                          </p:stCondLst>
+                                        </p:cTn>
+                                        <p:tgtEl>
+                                          <p:spTgt spid="18"/>
+                                        </p:tgtEl>
+                                        <p:attrNameLst>
+                                          <p:attrName>style.visibility</p:attrName>
+                                        </p:attrNameLst>
+                                      </p:cBhvr>
+                                      <p:to>
+                                        <p:strVal val="visible"/>
+                                      </p:to>
+                                    </p:set>
+                                  </p:childTnLst>
+                                </p:cTn>
+                              </p:par>
+                              <p:par>
+                                <p:cTn id="13" presetID="1" presetClass="entr" presetSubtype="0" fill="hold" nodeType="withEffect">
+                                  <p:stCondLst>
+                                    <p:cond delay="0"/>
+                                  </p:stCondLst>
+                                  <p:childTnLst>
+                                    <p:set>
+                                      <p:cBhvr>
+                                        <p:cTn id="14" dur="1" fill="hold">
                                           <p:stCondLst>
                                             <p:cond delay="0"/>
                                           </p:stCondLst>
@@ -12478,52 +13147,6 @@
                                         <p:strVal val="visible"/>
                                       </p:to>
                                     </p:set>
-                                    <p:anim calcmode="lin" valueType="num">
-                                      <p:cBhvr additive="base">
-                                        <p:cTn id="13" dur="500" fill="hold"/>
-                                        <p:tgtEl>
-                                          <p:spTgt spid="9"/>
-                                        </p:tgtEl>
-                                        <p:attrNameLst>
-                                          <p:attrName>ppt_x</p:attrName>
-                                        </p:attrNameLst>
-                                      </p:cBhvr>
-                                      <p:tavLst>
-                                        <p:tav tm="0">
-                                          <p:val>
-                                            <p:strVal val="#ppt_x"/>
-                                          </p:val>
-                                        </p:tav>
-                                        <p:tav tm="100000">
-                                          <p:val>
-                                            <p:strVal val="#ppt_x"/>
-                                          </p:val>
-                                        </p:tav>
-                                      </p:tavLst>
-                                    </p:anim>
-                                    <p:anim calcmode="lin" valueType="num">
-                                      <p:cBhvr additive="base">
-                                        <p:cTn id="14" dur="500" fill="hold"/>
-                                        <p:tgtEl>
-                                          <p:spTgt spid="9"/>
-                                        </p:tgtEl>
-                                        <p:attrNameLst>
-                                          <p:attrName>ppt_y</p:attrName>
-                                        </p:attrNameLst>
-                                      </p:cBhvr>
-                                      <p:tavLst>
-                                        <p:tav tm="0">
-                                          <p:val>
-                                            <p:strVal val="1+#ppt_h/2"/>
-                                          </p:val>
-                                        </p:tav>
-                                        <p:tav tm="100000">
-                                          <p:val>
-                                            <p:strVal val="#ppt_y"/>
-                                          </p:val>
-                                        </p:tav>
-                                      </p:tavLst>
-                                    </p:anim>
                                   </p:childTnLst>
                                 </p:cTn>
                               </p:par>
@@ -12546,7 +13169,7 @@
                             </p:stCondLst>
                             <p:childTnLst>
                               <p:par>
-                                <p:cTn id="17" presetID="2" presetClass="entr" presetSubtype="4" fill="hold" nodeType="clickEffect">
+                                <p:cTn id="17" presetID="1" presetClass="entr" presetSubtype="0" fill="hold" grpId="0" nodeType="clickEffect">
                                   <p:stCondLst>
                                     <p:cond delay="0"/>
                                   </p:stCondLst>
@@ -12554,6 +13177,33 @@
                                     <p:set>
                                       <p:cBhvr>
                                         <p:cTn id="18" dur="1" fill="hold">
+                                          <p:stCondLst>
+                                            <p:cond delay="0"/>
+                                          </p:stCondLst>
+                                        </p:cTn>
+                                        <p:tgtEl>
+                                          <p:spTgt spid="17"/>
+                                        </p:tgtEl>
+                                        <p:attrNameLst>
+                                          <p:attrName>style.visibility</p:attrName>
+                                        </p:attrNameLst>
+                                      </p:cBhvr>
+                                      <p:to>
+                                        <p:strVal val="visible"/>
+                                      </p:to>
+                                    </p:set>
+                                  </p:childTnLst>
+                                </p:cTn>
+                              </p:par>
+                              <p:par>
+                                <p:cTn id="19" presetID="1" presetClass="entr" presetSubtype="0" fill="hold" nodeType="withEffect">
+                                  <p:stCondLst>
+                                    <p:cond delay="0"/>
+                                  </p:stCondLst>
+                                  <p:childTnLst>
+                                    <p:set>
+                                      <p:cBhvr>
+                                        <p:cTn id="20" dur="1" fill="hold">
                                           <p:stCondLst>
                                             <p:cond delay="0"/>
                                           </p:stCondLst>
@@ -12569,64 +13219,63 @@
                                         <p:strVal val="visible"/>
                                       </p:to>
                                     </p:set>
-                                    <p:anim calcmode="lin" valueType="num">
-                                      <p:cBhvr additive="base">
-                                        <p:cTn id="19" dur="500" fill="hold"/>
-                                        <p:tgtEl>
-                                          <p:spTgt spid="16"/>
-                                        </p:tgtEl>
-                                        <p:attrNameLst>
-                                          <p:attrName>ppt_x</p:attrName>
-                                        </p:attrNameLst>
-                                      </p:cBhvr>
-                                      <p:tavLst>
-                                        <p:tav tm="0">
-                                          <p:val>
-                                            <p:strVal val="#ppt_x"/>
-                                          </p:val>
-                                        </p:tav>
-                                        <p:tav tm="100000">
-                                          <p:val>
-                                            <p:strVal val="#ppt_x"/>
-                                          </p:val>
-                                        </p:tav>
-                                      </p:tavLst>
-                                    </p:anim>
-                                    <p:anim calcmode="lin" valueType="num">
-                                      <p:cBhvr additive="base">
-                                        <p:cTn id="20" dur="500" fill="hold"/>
-                                        <p:tgtEl>
-                                          <p:spTgt spid="16"/>
-                                        </p:tgtEl>
-                                        <p:attrNameLst>
-                                          <p:attrName>ppt_y</p:attrName>
-                                        </p:attrNameLst>
-                                      </p:cBhvr>
-                                      <p:tavLst>
-                                        <p:tav tm="0">
-                                          <p:val>
-                                            <p:strVal val="1+#ppt_h/2"/>
-                                          </p:val>
-                                        </p:tav>
-                                        <p:tav tm="100000">
-                                          <p:val>
-                                            <p:strVal val="#ppt_y"/>
-                                          </p:val>
-                                        </p:tav>
-                                      </p:tavLst>
-                                    </p:anim>
                                   </p:childTnLst>
                                 </p:cTn>
                               </p:par>
+                            </p:childTnLst>
+                          </p:cTn>
+                        </p:par>
+                      </p:childTnLst>
+                    </p:cTn>
+                  </p:par>
+                  <p:par>
+                    <p:cTn id="21" fill="hold">
+                      <p:stCondLst>
+                        <p:cond delay="indefinite"/>
+                      </p:stCondLst>
+                      <p:childTnLst>
+                        <p:par>
+                          <p:cTn id="22" fill="hold">
+                            <p:stCondLst>
+                              <p:cond delay="0"/>
+                            </p:stCondLst>
+                            <p:childTnLst>
                               <p:par>
-                                <p:cTn id="21" presetID="2" presetClass="entr" presetSubtype="4" fill="hold" nodeType="withEffect">
+                                <p:cTn id="23" presetID="1" presetClass="entr" presetSubtype="0" fill="hold" grpId="0" nodeType="clickEffect">
                                   <p:stCondLst>
                                     <p:cond delay="0"/>
                                   </p:stCondLst>
                                   <p:childTnLst>
                                     <p:set>
                                       <p:cBhvr>
-                                        <p:cTn id="22" dur="1" fill="hold">
+                                        <p:cTn id="24" dur="1" fill="hold">
+                                          <p:stCondLst>
+                                            <p:cond delay="0"/>
+                                          </p:stCondLst>
+                                        </p:cTn>
+                                        <p:tgtEl>
+                                          <p:spTgt spid="14"/>
+                                        </p:tgtEl>
+                                        <p:attrNameLst>
+                                          <p:attrName>style.visibility</p:attrName>
+                                        </p:attrNameLst>
+                                      </p:cBhvr>
+                                      <p:to>
+                                        <p:strVal val="visible"/>
+                                      </p:to>
+                                    </p:set>
+                                  </p:childTnLst>
+                                </p:cTn>
+                              </p:par>
+                              <p:par>
+                                <p:cTn id="25" presetID="1" presetClass="entr" presetSubtype="0" fill="hold" nodeType="withEffect">
+                                  <p:stCondLst>
+                                    <p:cond delay="0"/>
+                                  </p:stCondLst>
+                                  <p:childTnLst>
+                                    <p:set>
+                                      <p:cBhvr>
+                                        <p:cTn id="26" dur="1" fill="hold">
                                           <p:stCondLst>
                                             <p:cond delay="0"/>
                                           </p:stCondLst>
@@ -12642,52 +13291,6 @@
                                         <p:strVal val="visible"/>
                                       </p:to>
                                     </p:set>
-                                    <p:anim calcmode="lin" valueType="num">
-                                      <p:cBhvr additive="base">
-                                        <p:cTn id="23" dur="500" fill="hold"/>
-                                        <p:tgtEl>
-                                          <p:spTgt spid="10"/>
-                                        </p:tgtEl>
-                                        <p:attrNameLst>
-                                          <p:attrName>ppt_x</p:attrName>
-                                        </p:attrNameLst>
-                                      </p:cBhvr>
-                                      <p:tavLst>
-                                        <p:tav tm="0">
-                                          <p:val>
-                                            <p:strVal val="#ppt_x"/>
-                                          </p:val>
-                                        </p:tav>
-                                        <p:tav tm="100000">
-                                          <p:val>
-                                            <p:strVal val="#ppt_x"/>
-                                          </p:val>
-                                        </p:tav>
-                                      </p:tavLst>
-                                    </p:anim>
-                                    <p:anim calcmode="lin" valueType="num">
-                                      <p:cBhvr additive="base">
-                                        <p:cTn id="24" dur="500" fill="hold"/>
-                                        <p:tgtEl>
-                                          <p:spTgt spid="10"/>
-                                        </p:tgtEl>
-                                        <p:attrNameLst>
-                                          <p:attrName>ppt_y</p:attrName>
-                                        </p:attrNameLst>
-                                      </p:cBhvr>
-                                      <p:tavLst>
-                                        <p:tav tm="0">
-                                          <p:val>
-                                            <p:strVal val="1+#ppt_h/2"/>
-                                          </p:val>
-                                        </p:tav>
-                                        <p:tav tm="100000">
-                                          <p:val>
-                                            <p:strVal val="#ppt_y"/>
-                                          </p:val>
-                                        </p:tav>
-                                      </p:tavLst>
-                                    </p:anim>
                                   </p:childTnLst>
                                 </p:cTn>
                               </p:par>
@@ -12698,26 +13301,80 @@
                     </p:cTn>
                   </p:par>
                   <p:par>
-                    <p:cTn id="25" fill="hold">
+                    <p:cTn id="27" fill="hold">
                       <p:stCondLst>
                         <p:cond delay="indefinite"/>
                       </p:stCondLst>
                       <p:childTnLst>
                         <p:par>
-                          <p:cTn id="26" fill="hold">
+                          <p:cTn id="28" fill="hold">
                             <p:stCondLst>
                               <p:cond delay="0"/>
                             </p:stCondLst>
                             <p:childTnLst>
                               <p:par>
-                                <p:cTn id="27" presetID="2" presetClass="entr" presetSubtype="4" fill="hold" nodeType="clickEffect">
+                                <p:cTn id="29" presetID="1" presetClass="entr" presetSubtype="0" fill="hold" grpId="0" nodeType="clickEffect">
                                   <p:stCondLst>
                                     <p:cond delay="0"/>
                                   </p:stCondLst>
                                   <p:childTnLst>
                                     <p:set>
                                       <p:cBhvr>
-                                        <p:cTn id="28" dur="1" fill="hold">
+                                        <p:cTn id="30" dur="1" fill="hold">
+                                          <p:stCondLst>
+                                            <p:cond delay="0"/>
+                                          </p:stCondLst>
+                                        </p:cTn>
+                                        <p:tgtEl>
+                                          <p:spTgt spid="19"/>
+                                        </p:tgtEl>
+                                        <p:attrNameLst>
+                                          <p:attrName>style.visibility</p:attrName>
+                                        </p:attrNameLst>
+                                      </p:cBhvr>
+                                      <p:to>
+                                        <p:strVal val="visible"/>
+                                      </p:to>
+                                    </p:set>
+                                  </p:childTnLst>
+                                </p:cTn>
+                              </p:par>
+                              <p:par>
+                                <p:cTn id="31" presetID="1" presetClass="entr" presetSubtype="0" fill="hold" grpId="0" nodeType="withEffect">
+                                  <p:stCondLst>
+                                    <p:cond delay="0"/>
+                                  </p:stCondLst>
+                                  <p:childTnLst>
+                                    <p:set>
+                                      <p:cBhvr>
+                                        <p:cTn id="32" dur="1" fill="hold">
+                                          <p:stCondLst>
+                                            <p:cond delay="0"/>
+                                          </p:stCondLst>
+                                        </p:cTn>
+                                        <p:tgtEl>
+                                          <p:spTgt spid="20"/>
+                                        </p:tgtEl>
+                                        <p:attrNameLst>
+                                          <p:attrName>style.visibility</p:attrName>
+                                        </p:attrNameLst>
+                                      </p:cBhvr>
+                                      <p:to>
+                                        <p:strVal val="visible"/>
+                                      </p:to>
+                                    </p:set>
+                                  </p:childTnLst>
+                                </p:cTn>
+                              </p:par>
+                              <p:par>
+                                <p:cTn id="33" presetID="1" presetClass="entr" presetSubtype="0" fill="hold" nodeType="withEffect">
+                                  <p:stCondLst>
+                                    <p:cond delay="0"/>
+                                  </p:stCondLst>
+                                  <p:childTnLst>
+                                    <p:set>
+                                      <p:cBhvr>
+                                        <p:cTn id="34" dur="1" fill="hold">
                                           <p:stCondLst>
                                             <p:cond delay="0"/>
                                           </p:stCondLst>
@@ -12733,64 +13390,18 @@
                                         <p:strVal val="visible"/>
                                       </p:to>
                                     </p:set>
-                                    <p:anim calcmode="lin" valueType="num">
-                                      <p:cBhvr additive="base">
-                                        <p:cTn id="29" dur="500" fill="hold"/>
-                                        <p:tgtEl>
-                                          <p:spTgt spid="11"/>
-                                        </p:tgtEl>
-                                        <p:attrNameLst>
-                                          <p:attrName>ppt_x</p:attrName>
-                                        </p:attrNameLst>
-                                      </p:cBhvr>
-                                      <p:tavLst>
-                                        <p:tav tm="0">
-                                          <p:val>
-                                            <p:strVal val="#ppt_x"/>
-                                          </p:val>
-                                        </p:tav>
-                                        <p:tav tm="100000">
-                                          <p:val>
-                                            <p:strVal val="#ppt_x"/>
-                                          </p:val>
-                                        </p:tav>
-                                      </p:tavLst>
-                                    </p:anim>
-                                    <p:anim calcmode="lin" valueType="num">
-                                      <p:cBhvr additive="base">
-                                        <p:cTn id="30" dur="500" fill="hold"/>
-                                        <p:tgtEl>
-                                          <p:spTgt spid="11"/>
-                                        </p:tgtEl>
-                                        <p:attrNameLst>
-                                          <p:attrName>ppt_y</p:attrName>
-                                        </p:attrNameLst>
-                                      </p:cBhvr>
-                                      <p:tavLst>
-                                        <p:tav tm="0">
-                                          <p:val>
-                                            <p:strVal val="1+#ppt_h/2"/>
-                                          </p:val>
-                                        </p:tav>
-                                        <p:tav tm="100000">
-                                          <p:val>
-                                            <p:strVal val="#ppt_y"/>
-                                          </p:val>
-                                        </p:tav>
-                                      </p:tavLst>
-                                    </p:anim>
                                   </p:childTnLst>
                                 </p:cTn>
                               </p:par>
                               <p:par>
-                                <p:cTn id="31" presetID="2" presetClass="entr" presetSubtype="4" fill="hold" nodeType="withEffect">
+                                <p:cTn id="35" presetID="1" presetClass="entr" presetSubtype="0" fill="hold" nodeType="withEffect">
                                   <p:stCondLst>
                                     <p:cond delay="0"/>
                                   </p:stCondLst>
                                   <p:childTnLst>
                                     <p:set>
                                       <p:cBhvr>
-                                        <p:cTn id="32" dur="1" fill="hold">
+                                        <p:cTn id="36" dur="1" fill="hold">
                                           <p:stCondLst>
                                             <p:cond delay="0"/>
                                           </p:stCondLst>
@@ -12806,52 +13417,6 @@
                                         <p:strVal val="visible"/>
                                       </p:to>
                                     </p:set>
-                                    <p:anim calcmode="lin" valueType="num">
-                                      <p:cBhvr additive="base">
-                                        <p:cTn id="33" dur="500" fill="hold"/>
-                                        <p:tgtEl>
-                                          <p:spTgt spid="13"/>
-                                        </p:tgtEl>
-                                        <p:attrNameLst>
-                                          <p:attrName>ppt_x</p:attrName>
-                                        </p:attrNameLst>
-                                      </p:cBhvr>
-                                      <p:tavLst>
-                                        <p:tav tm="0">
-                                          <p:val>
-                                            <p:strVal val="#ppt_x"/>
-                                          </p:val>
-                                        </p:tav>
-                                        <p:tav tm="100000">
-                                          <p:val>
-                                            <p:strVal val="#ppt_x"/>
-                                          </p:val>
-                                        </p:tav>
-                                      </p:tavLst>
-                                    </p:anim>
-                                    <p:anim calcmode="lin" valueType="num">
-                                      <p:cBhvr additive="base">
-                                        <p:cTn id="34" dur="500" fill="hold"/>
-                                        <p:tgtEl>
-                                          <p:spTgt spid="13"/>
-                                        </p:tgtEl>
-                                        <p:attrNameLst>
-                                          <p:attrName>ppt_y</p:attrName>
-                                        </p:attrNameLst>
-                                      </p:cBhvr>
-                                      <p:tavLst>
-                                        <p:tav tm="0">
-                                          <p:val>
-                                            <p:strVal val="1+#ppt_h/2"/>
-                                          </p:val>
-                                        </p:tav>
-                                        <p:tav tm="100000">
-                                          <p:val>
-                                            <p:strVal val="#ppt_y"/>
-                                          </p:val>
-                                        </p:tav>
-                                      </p:tavLst>
-                                    </p:anim>
                                   </p:childTnLst>
                                 </p:cTn>
                               </p:par>
@@ -12882,6 +13447,14 @@
         </p:cTn>
       </p:par>
     </p:tnLst>
+    <p:bldLst>
+      <p:bldP spid="3" grpId="0"/>
+      <p:bldP spid="18" grpId="0"/>
+      <p:bldP spid="19" grpId="0"/>
+      <p:bldP spid="20" grpId="0"/>
+      <p:bldP spid="17" grpId="0"/>
+      <p:bldP spid="14" grpId="0"/>
+    </p:bldLst>
   </p:timing>
 </p:sld>
 </file>
@@ -13175,7 +13748,7 @@
         <p:spPr>
           <a:xfrm>
             <a:off x="251520" y="260648"/>
-            <a:ext cx="5166808" cy="5834378"/>
+            <a:ext cx="5292814" cy="5976664"/>
           </a:xfrm>
           <a:prstGeom prst="rect">
             <a:avLst/>
@@ -13294,8 +13867,8 @@
         </p:nvSpPr>
         <p:spPr>
           <a:xfrm>
-            <a:off x="5493433" y="2054055"/>
-            <a:ext cx="3422219" cy="584775"/>
+            <a:off x="5580113" y="2054055"/>
+            <a:ext cx="3468706" cy="584775"/>
           </a:xfrm>
           <a:prstGeom prst="rect">
             <a:avLst/>
@@ -13310,14 +13883,35 @@
           <a:p>
             <a:r>
               <a:rPr lang="nl-NL" sz="1600" dirty="0"/>
-              <a:t>Mijn pagina’s met voorbeelden:</a:t>
-            </a:r>
-          </a:p>
-          <a:p>
+              <a:t>P</a:t>
+            </a:r>
+            <a:r>
+              <a:rPr lang="nl-NL" sz="1600" dirty="0" smtClean="0"/>
+              <a:t>agina’s </a:t>
+            </a:r>
             <a:r>
               <a:rPr lang="nl-NL" sz="1600" dirty="0"/>
-              <a:t>https://maetempels.github.io/MAE-gf/</a:t>
-            </a:r>
+              <a:t>met voorbeelden:</a:t>
+            </a:r>
+          </a:p>
+          <a:p>
+            <a:r>
+              <a:rPr lang="nl-NL" sz="1600" dirty="0">
+                <a:hlinkClick r:id="rId4"/>
+              </a:rPr>
+              <a:t>https://maetempels.github.io/MAE-gf</a:t>
+            </a:r>
+            <a:r>
+              <a:rPr lang="nl-NL" sz="1600" dirty="0" smtClean="0">
+                <a:hlinkClick r:id="rId4"/>
+              </a:rPr>
+              <a:t>/</a:t>
+            </a:r>
+            <a:r>
+              <a:rPr lang="nl-NL" sz="1600" dirty="0" smtClean="0"/>
+              <a:t> </a:t>
+            </a:r>
+            <a:endParaRPr lang="nl-NL" sz="1600" dirty="0"/>
           </a:p>
         </p:txBody>
       </p:sp>
@@ -13335,8 +13929,8 @@
         </p:nvSpPr>
         <p:spPr>
           <a:xfrm>
-            <a:off x="5493432" y="1295870"/>
-            <a:ext cx="3116622" cy="584775"/>
+            <a:off x="5580112" y="1295870"/>
+            <a:ext cx="3163110" cy="584775"/>
           </a:xfrm>
           <a:prstGeom prst="rect">
             <a:avLst/>
@@ -13360,9 +13954,22 @@
           </a:p>
           <a:p>
             <a:r>
-              <a:rPr lang="nl-NL" sz="1600" dirty="0"/>
-              <a:t>https://d-bl.github.io/GroundForge</a:t>
-            </a:r>
+              <a:rPr lang="nl-NL" sz="1600" dirty="0">
+                <a:hlinkClick r:id="rId5"/>
+              </a:rPr>
+              <a:t>https://</a:t>
+            </a:r>
+            <a:r>
+              <a:rPr lang="nl-NL" sz="1600" dirty="0" smtClean="0">
+                <a:hlinkClick r:id="rId5"/>
+              </a:rPr>
+              <a:t>d-bl.github.io/GroundForge</a:t>
+            </a:r>
+            <a:r>
+              <a:rPr lang="nl-NL" sz="1600" dirty="0" smtClean="0"/>
+              <a:t> </a:t>
+            </a:r>
+            <a:endParaRPr lang="nl-NL" sz="1600" dirty="0"/>
           </a:p>
         </p:txBody>
       </p:sp>
@@ -13381,7 +13988,7 @@
           <p:nvPr/>
         </p:nvPicPr>
         <p:blipFill>
-          <a:blip r:embed="rId4"/>
+          <a:blip r:embed="rId6"/>
           <a:stretch>
             <a:fillRect/>
           </a:stretch>
@@ -13423,14 +14030,14 @@
           <p:nvPr/>
         </p:nvPicPr>
         <p:blipFill>
-          <a:blip r:embed="rId5"/>
+          <a:blip r:embed="rId7"/>
           <a:stretch>
             <a:fillRect/>
           </a:stretch>
         </p:blipFill>
         <p:spPr>
           <a:xfrm>
-            <a:off x="2308920" y="4242065"/>
+            <a:off x="3131840" y="4437112"/>
             <a:ext cx="4374616" cy="1633821"/>
           </a:xfrm>
           <a:prstGeom prst="rect">

</xml_diff>

<commit_message>
font size on slides
</commit_message>
<xml_diff>
--- a/docs/help/NL.pptx
+++ b/docs/help/NL.pptx
@@ -12129,8 +12129,8 @@
         </p:nvSpPr>
         <p:spPr>
           <a:xfrm>
-            <a:off x="2380087" y="409301"/>
-            <a:ext cx="5936329" cy="1077218"/>
+            <a:off x="2380087" y="197891"/>
+            <a:ext cx="5936329" cy="1200329"/>
           </a:xfrm>
           <a:prstGeom prst="rect">
             <a:avLst/>
@@ -12144,7 +12144,7 @@
           <a:lstStyle/>
           <a:p>
             <a:r>
-              <a:rPr lang="nl-NL" sz="3200" b="1" dirty="0"/>
+              <a:rPr lang="nl-NL" sz="3600" b="1" dirty="0"/>
               <a:t>Draadtekeningen laten maken DOOR de computer.</a:t>
             </a:r>
           </a:p>
@@ -12297,7 +12297,7 @@
         </p:blipFill>
         <p:spPr>
           <a:xfrm>
-            <a:off x="971279" y="1512936"/>
+            <a:off x="971279" y="1675382"/>
             <a:ext cx="4020062" cy="1851664"/>
           </a:xfrm>
           <a:prstGeom prst="rect">
@@ -12401,7 +12401,7 @@
         </p:nvSpPr>
         <p:spPr>
           <a:xfrm>
-            <a:off x="971279" y="2821854"/>
+            <a:off x="971279" y="2984300"/>
             <a:ext cx="468394" cy="923330"/>
           </a:xfrm>
           <a:prstGeom prst="rect">
@@ -12735,7 +12735,7 @@
         </p:blipFill>
         <p:spPr>
           <a:xfrm>
-            <a:off x="3280895" y="1793716"/>
+            <a:off x="3280895" y="1956162"/>
             <a:ext cx="1867169" cy="1860524"/>
           </a:xfrm>
           <a:prstGeom prst="rect">
@@ -12763,7 +12763,7 @@
         </p:nvSpPr>
         <p:spPr>
           <a:xfrm>
-            <a:off x="3281577" y="3081734"/>
+            <a:off x="3281577" y="3244180"/>
             <a:ext cx="468394" cy="923330"/>
           </a:xfrm>
           <a:prstGeom prst="rect">
@@ -12852,7 +12852,7 @@
         </p:blipFill>
         <p:spPr>
           <a:xfrm>
-            <a:off x="4572000" y="1938132"/>
+            <a:off x="4572000" y="2100578"/>
             <a:ext cx="4020062" cy="1910194"/>
           </a:xfrm>
           <a:prstGeom prst="rect">
@@ -12880,7 +12880,7 @@
         </p:nvSpPr>
         <p:spPr>
           <a:xfrm>
-            <a:off x="4610783" y="3279328"/>
+            <a:off x="4610783" y="3441774"/>
             <a:ext cx="468394" cy="923330"/>
           </a:xfrm>
           <a:prstGeom prst="rect">
@@ -13748,7 +13748,7 @@
         <p:spPr>
           <a:xfrm>
             <a:off x="251520" y="260648"/>
-            <a:ext cx="5292814" cy="5976664"/>
+            <a:ext cx="4400050" cy="4968552"/>
           </a:xfrm>
           <a:prstGeom prst="rect">
             <a:avLst/>
@@ -13855,68 +13855,6 @@
       </p:sp>
       <p:sp>
         <p:nvSpPr>
-          <p:cNvPr id="7" name="Tekstvak 6">
-            <a:extLst>
-              <a:ext uri="{FF2B5EF4-FFF2-40B4-BE49-F238E27FC236}">
-                <a16:creationId xmlns:a16="http://schemas.microsoft.com/office/drawing/2014/main" xmlns="" id="{46BAFBC1-2E76-4BCA-B53E-B93C723EF38D}"/>
-              </a:ext>
-            </a:extLst>
-          </p:cNvPr>
-          <p:cNvSpPr txBox="1"/>
-          <p:nvPr/>
-        </p:nvSpPr>
-        <p:spPr>
-          <a:xfrm>
-            <a:off x="5580113" y="2054055"/>
-            <a:ext cx="3468706" cy="584775"/>
-          </a:xfrm>
-          <a:prstGeom prst="rect">
-            <a:avLst/>
-          </a:prstGeom>
-          <a:noFill/>
-        </p:spPr>
-        <p:txBody>
-          <a:bodyPr wrap="none" rtlCol="0">
-            <a:spAutoFit/>
-          </a:bodyPr>
-          <a:lstStyle/>
-          <a:p>
-            <a:r>
-              <a:rPr lang="nl-NL" sz="1600" dirty="0"/>
-              <a:t>P</a:t>
-            </a:r>
-            <a:r>
-              <a:rPr lang="nl-NL" sz="1600" dirty="0" smtClean="0"/>
-              <a:t>agina’s </a:t>
-            </a:r>
-            <a:r>
-              <a:rPr lang="nl-NL" sz="1600" dirty="0"/>
-              <a:t>met voorbeelden:</a:t>
-            </a:r>
-          </a:p>
-          <a:p>
-            <a:r>
-              <a:rPr lang="nl-NL" sz="1600" dirty="0">
-                <a:hlinkClick r:id="rId4"/>
-              </a:rPr>
-              <a:t>https://maetempels.github.io/MAE-gf</a:t>
-            </a:r>
-            <a:r>
-              <a:rPr lang="nl-NL" sz="1600" dirty="0" smtClean="0">
-                <a:hlinkClick r:id="rId4"/>
-              </a:rPr>
-              <a:t>/</a:t>
-            </a:r>
-            <a:r>
-              <a:rPr lang="nl-NL" sz="1600" dirty="0" smtClean="0"/>
-              <a:t> </a:t>
-            </a:r>
-            <a:endParaRPr lang="nl-NL" sz="1600" dirty="0"/>
-          </a:p>
-        </p:txBody>
-      </p:sp>
-      <p:sp>
-        <p:nvSpPr>
           <p:cNvPr id="8" name="Tekstvak 7">
             <a:extLst>
               <a:ext uri="{FF2B5EF4-FFF2-40B4-BE49-F238E27FC236}">
@@ -13929,8 +13867,8 @@
         </p:nvSpPr>
         <p:spPr>
           <a:xfrm>
-            <a:off x="5580112" y="1295870"/>
-            <a:ext cx="3163110" cy="584775"/>
+            <a:off x="269404" y="5373216"/>
+            <a:ext cx="8047012" cy="1384995"/>
           </a:xfrm>
           <a:prstGeom prst="rect">
             <a:avLst/>
@@ -13938,38 +13876,66 @@
           <a:noFill/>
         </p:spPr>
         <p:txBody>
-          <a:bodyPr wrap="none" rtlCol="0">
+          <a:bodyPr wrap="square" rtlCol="0">
             <a:spAutoFit/>
           </a:bodyPr>
           <a:lstStyle/>
           <a:p>
             <a:r>
-              <a:rPr lang="nl-NL" sz="1600" dirty="0" err="1"/>
+              <a:rPr lang="nl-NL" sz="2800" dirty="0" err="1"/>
               <a:t>Groundforge</a:t>
             </a:r>
             <a:r>
-              <a:rPr lang="nl-NL" sz="1600" dirty="0"/>
-              <a:t>:</a:t>
-            </a:r>
-          </a:p>
-          <a:p>
-            <a:r>
-              <a:rPr lang="nl-NL" sz="1600" dirty="0">
+              <a:rPr lang="nl-NL" sz="2800" dirty="0" smtClean="0"/>
+              <a:t>: </a:t>
+            </a:r>
+            <a:r>
+              <a:rPr lang="nl-NL" sz="2800" dirty="0" smtClean="0">
+                <a:hlinkClick r:id="rId4"/>
+              </a:rPr>
+              <a:t>https</a:t>
+            </a:r>
+            <a:r>
+              <a:rPr lang="nl-NL" sz="2800" dirty="0">
+                <a:hlinkClick r:id="rId4"/>
+              </a:rPr>
+              <a:t>://</a:t>
+            </a:r>
+            <a:r>
+              <a:rPr lang="nl-NL" sz="2800" dirty="0" smtClean="0">
+                <a:hlinkClick r:id="rId4"/>
+              </a:rPr>
+              <a:t>d-bl.github.io/GroundForge</a:t>
+            </a:r>
+            <a:r>
+              <a:rPr lang="nl-NL" sz="2800" dirty="0" smtClean="0"/>
+              <a:t> </a:t>
+            </a:r>
+          </a:p>
+          <a:p>
+            <a:r>
+              <a:rPr lang="nl-NL" sz="2800" dirty="0" smtClean="0"/>
+              <a:t>Voorbeelden: </a:t>
+            </a:r>
+            <a:r>
+              <a:rPr lang="nl-NL" sz="2800" dirty="0" smtClean="0">
                 <a:hlinkClick r:id="rId5"/>
               </a:rPr>
-              <a:t>https://</a:t>
-            </a:r>
-            <a:r>
-              <a:rPr lang="nl-NL" sz="1600" dirty="0" smtClean="0">
+              <a:t>https</a:t>
+            </a:r>
+            <a:r>
+              <a:rPr lang="nl-NL" sz="2800" dirty="0">
                 <a:hlinkClick r:id="rId5"/>
               </a:rPr>
-              <a:t>d-bl.github.io/GroundForge</a:t>
-            </a:r>
-            <a:r>
-              <a:rPr lang="nl-NL" sz="1600" dirty="0" smtClean="0"/>
+              <a:t>://maetempels.github.io/MAE-gf/</a:t>
+            </a:r>
+            <a:r>
+              <a:rPr lang="nl-NL" sz="2800" dirty="0"/>
               <a:t> </a:t>
             </a:r>
-            <a:endParaRPr lang="nl-NL" sz="1600" dirty="0"/>
+          </a:p>
+          <a:p>
+            <a:endParaRPr lang="nl-NL" sz="2800" dirty="0"/>
           </a:p>
         </p:txBody>
       </p:sp>
@@ -13995,7 +13961,7 @@
         </p:blipFill>
         <p:spPr>
           <a:xfrm>
-            <a:off x="2308920" y="2054054"/>
+            <a:off x="5580113" y="1124744"/>
             <a:ext cx="1948925" cy="1575904"/>
           </a:xfrm>
           <a:prstGeom prst="rect">
@@ -14037,7 +14003,7 @@
         </p:blipFill>
         <p:spPr>
           <a:xfrm>
-            <a:off x="3131840" y="4437112"/>
+            <a:off x="4499992" y="3255769"/>
             <a:ext cx="4374616" cy="1633821"/>
           </a:xfrm>
           <a:prstGeom prst="rect">

</xml_diff>

<commit_message>
one slide became note for another
</commit_message>
<xml_diff>
--- a/docs/help/NL.pptx
+++ b/docs/help/NL.pptx
@@ -5,10 +5,10 @@
     <p:sldMasterId id="2147483864" r:id="rId1"/>
   </p:sldMasterIdLst>
   <p:notesMasterIdLst>
-    <p:notesMasterId r:id="rId20"/>
+    <p:notesMasterId r:id="rId19"/>
   </p:notesMasterIdLst>
   <p:handoutMasterIdLst>
-    <p:handoutMasterId r:id="rId21"/>
+    <p:handoutMasterId r:id="rId20"/>
   </p:handoutMasterIdLst>
   <p:sldIdLst>
     <p:sldId id="256" r:id="rId2"/>
@@ -21,14 +21,13 @@
     <p:sldId id="300" r:id="rId9"/>
     <p:sldId id="296" r:id="rId10"/>
     <p:sldId id="297" r:id="rId11"/>
-    <p:sldId id="259" r:id="rId12"/>
-    <p:sldId id="261" r:id="rId13"/>
-    <p:sldId id="281" r:id="rId14"/>
-    <p:sldId id="293" r:id="rId15"/>
-    <p:sldId id="280" r:id="rId16"/>
-    <p:sldId id="266" r:id="rId17"/>
-    <p:sldId id="268" r:id="rId18"/>
-    <p:sldId id="292" r:id="rId19"/>
+    <p:sldId id="261" r:id="rId12"/>
+    <p:sldId id="281" r:id="rId13"/>
+    <p:sldId id="293" r:id="rId14"/>
+    <p:sldId id="280" r:id="rId15"/>
+    <p:sldId id="266" r:id="rId16"/>
+    <p:sldId id="268" r:id="rId17"/>
+    <p:sldId id="292" r:id="rId18"/>
   </p:sldIdLst>
   <p:sldSz cx="9144000" cy="6858000" type="screen4x3"/>
   <p:notesSz cx="6858000" cy="9144000"/>
@@ -242,7 +241,7 @@
           <a:p>
             <a:fld id="{191DB269-8995-49D8-A4B0-9411C7010620}" type="datetimeFigureOut">
               <a:rPr lang="nl-NL" smtClean="0"/>
-              <a:t>6-5-2019</a:t>
+              <a:t>9-5-2019</a:t>
             </a:fld>
             <a:endParaRPr lang="nl-NL" dirty="0"/>
           </a:p>
@@ -407,7 +406,7 @@
           <a:p>
             <a:fld id="{A74490FB-0058-431C-B3E7-EBBA4B708E40}" type="datetimeFigureOut">
               <a:rPr lang="nl-NL" smtClean="0"/>
-              <a:t>6-5-2019</a:t>
+              <a:t>9-5-2019</a:t>
             </a:fld>
             <a:endParaRPr lang="nl-NL" dirty="0"/>
           </a:p>
@@ -1031,94 +1030,275 @@
           <a:bodyPr/>
           <a:lstStyle/>
           <a:p>
+            <a:pPr marL="0" marR="0" lvl="0" indent="0" algn="l" defTabSz="914400" rtl="0" eaLnBrk="1" fontAlgn="auto" latinLnBrk="0" hangingPunct="1">
+              <a:lnSpc>
+                <a:spcPct val="100000"/>
+              </a:lnSpc>
+              <a:spcBef>
+                <a:spcPts val="0"/>
+              </a:spcBef>
+              <a:spcAft>
+                <a:spcPts val="0"/>
+              </a:spcAft>
+              <a:buClrTx/>
+              <a:buSzTx/>
+              <a:buFontTx/>
+              <a:buNone/>
+              <a:tabLst/>
+              <a:defRPr/>
+            </a:pPr>
             <a:r>
               <a:rPr lang="nl-NL" dirty="0">
                 <a:effectLst/>
               </a:rPr>
-              <a:t>Verschillende (groepen) voorbeeld pagina’s. Links op deze pagina vullen het parameters-formulier in van de hoofdpagina.</a:t>
-            </a:r>
-          </a:p>
-          <a:p>
-            <a:endParaRPr lang="nl-NL" dirty="0">
-              <a:effectLst/>
-            </a:endParaRPr>
-          </a:p>
-          <a:p>
+              <a:t>Kantbrief/</a:t>
+            </a:r>
+            <a:r>
+              <a:rPr lang="nl-NL" dirty="0" err="1">
+                <a:effectLst/>
+              </a:rPr>
+              <a:t>pricking</a:t>
+            </a:r>
             <a:r>
               <a:rPr lang="nl-NL" dirty="0">
                 <a:effectLst/>
               </a:rPr>
-              <a:t>Elke groep heeft een eigen invalshoek.</a:t>
-            </a:r>
-          </a:p>
-          <a:p>
-            <a:endParaRPr lang="nl-NL" dirty="0">
+              <a:t>: wat je geplastificeerd</a:t>
+            </a:r>
+            <a:r>
+              <a:rPr lang="nl-NL" baseline="0" dirty="0">
+                <a:effectLst/>
+              </a:rPr>
+              <a:t> op je kussen prikt.</a:t>
+            </a:r>
+          </a:p>
+          <a:p>
+            <a:pPr marL="0" marR="0" indent="0" algn="l" defTabSz="914400" rtl="0" eaLnBrk="1" fontAlgn="auto" latinLnBrk="0" hangingPunct="1">
+              <a:lnSpc>
+                <a:spcPct val="100000"/>
+              </a:lnSpc>
+              <a:spcBef>
+                <a:spcPts val="0"/>
+              </a:spcBef>
+              <a:spcAft>
+                <a:spcPts val="0"/>
+              </a:spcAft>
+              <a:buClrTx/>
+              <a:buSzTx/>
+              <a:buFontTx/>
+              <a:buNone/>
+              <a:tabLst/>
+              <a:defRPr/>
+            </a:pPr>
+            <a:endParaRPr lang="nl-NL" baseline="0" dirty="0">
               <a:effectLst/>
             </a:endParaRPr>
           </a:p>
           <a:p>
-            <a:r>
-              <a:rPr lang="nl-NL" dirty="0"/>
-              <a:t>Droste heeft een paar voorbeelden waarvan al wel slagen zijn ingevuld.</a:t>
-            </a:r>
-          </a:p>
-          <a:p>
-            <a:endParaRPr lang="nl-NL" dirty="0">
+            <a:pPr marL="0" marR="0" indent="0" algn="l" defTabSz="914400" rtl="0" eaLnBrk="1" fontAlgn="auto" latinLnBrk="0" hangingPunct="1">
+              <a:lnSpc>
+                <a:spcPct val="100000"/>
+              </a:lnSpc>
+              <a:spcBef>
+                <a:spcPts val="0"/>
+              </a:spcBef>
+              <a:spcAft>
+                <a:spcPts val="0"/>
+              </a:spcAft>
+              <a:buClrTx/>
+              <a:buSzTx/>
+              <a:buFontTx/>
+              <a:buNone/>
+              <a:tabLst/>
+              <a:defRPr/>
+            </a:pPr>
+            <a:r>
+              <a:rPr lang="nl-NL" baseline="0" dirty="0">
+                <a:effectLst/>
+              </a:rPr>
+              <a:t>Je komt hier via “</a:t>
+            </a:r>
+            <a:r>
+              <a:rPr lang="nl-NL" baseline="0" dirty="0" err="1">
+                <a:effectLst/>
+              </a:rPr>
+              <a:t>vari</a:t>
+            </a:r>
+            <a:r>
+              <a:rPr lang="nl-NL" baseline="0" dirty="0">
+                <a:effectLst/>
+              </a:rPr>
+              <a:t>” links vanuit de </a:t>
+            </a:r>
+            <a:r>
+              <a:rPr lang="nl-NL" baseline="0" dirty="0" err="1">
+                <a:effectLst/>
+              </a:rPr>
+              <a:t>Tesselace</a:t>
+            </a:r>
+            <a:r>
+              <a:rPr lang="nl-NL" baseline="0" dirty="0">
+                <a:effectLst/>
+              </a:rPr>
+              <a:t> index, of een à twee letterige links vanuit de </a:t>
+            </a:r>
+            <a:r>
+              <a:rPr lang="nl-NL" baseline="0" dirty="0" err="1">
+                <a:effectLst/>
+              </a:rPr>
+              <a:t>Whiting</a:t>
+            </a:r>
+            <a:r>
+              <a:rPr lang="nl-NL" baseline="0" dirty="0">
+                <a:effectLst/>
+              </a:rPr>
+              <a:t> index.</a:t>
+            </a:r>
+          </a:p>
+          <a:p>
+            <a:pPr marL="0" marR="0" indent="0" algn="l" defTabSz="914400" rtl="0" eaLnBrk="1" fontAlgn="auto" latinLnBrk="0" hangingPunct="1">
+              <a:lnSpc>
+                <a:spcPct val="100000"/>
+              </a:lnSpc>
+              <a:spcBef>
+                <a:spcPts val="0"/>
+              </a:spcBef>
+              <a:spcAft>
+                <a:spcPts val="0"/>
+              </a:spcAft>
+              <a:buClrTx/>
+              <a:buSzTx/>
+              <a:buFontTx/>
+              <a:buNone/>
+              <a:tabLst/>
+              <a:defRPr/>
+            </a:pPr>
+            <a:endParaRPr lang="nl-NL" baseline="0" dirty="0">
               <a:effectLst/>
             </a:endParaRPr>
           </a:p>
           <a:p>
-            <a:r>
-              <a:rPr lang="en-US" sz="1200" b="0" i="1" u="none" strike="noStrike" kern="1200" baseline="0" dirty="0">
-                <a:solidFill>
-                  <a:schemeClr val="tx1"/>
-                </a:solidFill>
-                <a:latin typeface="+mn-lt"/>
-                <a:ea typeface="+mn-ea"/>
-                <a:cs typeface="+mn-cs"/>
+            <a:pPr marL="0" marR="0" indent="0" algn="l" defTabSz="914400" rtl="0" eaLnBrk="1" fontAlgn="auto" latinLnBrk="0" hangingPunct="1">
+              <a:lnSpc>
+                <a:spcPct val="100000"/>
+              </a:lnSpc>
+              <a:spcBef>
+                <a:spcPts val="0"/>
+              </a:spcBef>
+              <a:spcAft>
+                <a:spcPts val="0"/>
+              </a:spcAft>
+              <a:buClrTx/>
+              <a:buSzTx/>
+              <a:buFontTx/>
+              <a:buNone/>
+              <a:tabLst/>
+              <a:defRPr/>
+            </a:pPr>
+            <a:r>
+              <a:rPr lang="nl-NL" baseline="0" dirty="0">
+                <a:effectLst/>
               </a:rPr>
-              <a:t>A Lace Guide for Makers and Collectors, </a:t>
-            </a:r>
-            <a:r>
-              <a:rPr lang="en-US" sz="1200" b="0" i="0" u="none" strike="noStrike" kern="1200" baseline="0" dirty="0">
-                <a:solidFill>
-                  <a:schemeClr val="tx1"/>
-                </a:solidFill>
-                <a:latin typeface="+mn-lt"/>
-                <a:ea typeface="+mn-ea"/>
-                <a:cs typeface="+mn-cs"/>
+              <a:t>Variaties zijn beperkt door een vierkant raster.</a:t>
+            </a:r>
+          </a:p>
+          <a:p>
+            <a:pPr>
+              <a:defRPr/>
+            </a:pPr>
+            <a:r>
+              <a:rPr lang="nl-NL" baseline="0" dirty="0">
+                <a:effectLst/>
               </a:rPr>
-              <a:t>door Gertrude Whiting</a:t>
-            </a:r>
-          </a:p>
-          <a:p>
-            <a:r>
-              <a:rPr lang="nl-NL" sz="1200" b="0" i="0" u="none" strike="noStrike" kern="1200" baseline="0" dirty="0">
-                <a:solidFill>
-                  <a:schemeClr val="tx1"/>
-                </a:solidFill>
-                <a:latin typeface="+mn-lt"/>
-                <a:ea typeface="+mn-ea"/>
-                <a:cs typeface="+mn-cs"/>
+              <a:t>Zelf kun je meer vervormingen toepassen</a:t>
+            </a:r>
+            <a:r>
+              <a:rPr lang="nl-NL" dirty="0">
+                <a:effectLst/>
               </a:rPr>
-              <a:t>Kant gids voor makers en verzamelaars.</a:t>
-            </a:r>
-          </a:p>
-          <a:p>
-            <a:r>
-              <a:rPr lang="nl-NL" sz="1200" b="0" i="0" u="none" strike="noStrike" kern="1200" baseline="0" dirty="0">
-                <a:solidFill>
-                  <a:schemeClr val="tx1"/>
-                </a:solidFill>
-                <a:latin typeface="+mn-lt"/>
-                <a:ea typeface="+mn-ea"/>
-                <a:cs typeface="+mn-cs"/>
-              </a:rPr>
-              <a:t>In diverse online archieven beschikbaar, het copyright is verlopen.</a:t>
-            </a:r>
-            <a:endParaRPr lang="nl-NL" dirty="0">
+              <a:t> </a:t>
+            </a:r>
+            <a:r>
+              <a:rPr lang="nl-NL" dirty="0"/>
+              <a:t>voor de gewenste kantbrief.</a:t>
+            </a:r>
+            <a:endParaRPr lang="nl-NL" baseline="0" dirty="0">
               <a:effectLst/>
             </a:endParaRPr>
+          </a:p>
+          <a:p>
+            <a:pPr marL="0" marR="0" indent="0" algn="l" defTabSz="914400" rtl="0" eaLnBrk="1" fontAlgn="auto" latinLnBrk="0" hangingPunct="1">
+              <a:lnSpc>
+                <a:spcPct val="100000"/>
+              </a:lnSpc>
+              <a:spcBef>
+                <a:spcPts val="0"/>
+              </a:spcBef>
+              <a:spcAft>
+                <a:spcPts val="0"/>
+              </a:spcAft>
+              <a:buClrTx/>
+              <a:buSzTx/>
+              <a:buFontTx/>
+              <a:buNone/>
+              <a:tabLst/>
+              <a:defRPr/>
+            </a:pPr>
+            <a:endParaRPr lang="nl-NL" baseline="0" dirty="0">
+              <a:effectLst/>
+            </a:endParaRPr>
+          </a:p>
+          <a:p>
+            <a:pPr marL="0" marR="0" indent="0" algn="l" defTabSz="914400" rtl="0" eaLnBrk="1" fontAlgn="auto" latinLnBrk="0" hangingPunct="1">
+              <a:lnSpc>
+                <a:spcPct val="100000"/>
+              </a:lnSpc>
+              <a:spcBef>
+                <a:spcPts val="0"/>
+              </a:spcBef>
+              <a:spcAft>
+                <a:spcPts val="0"/>
+              </a:spcAft>
+              <a:buClrTx/>
+              <a:buSzTx/>
+              <a:buFontTx/>
+              <a:buNone/>
+              <a:tabLst/>
+              <a:defRPr/>
+            </a:pPr>
+            <a:r>
+              <a:rPr lang="nl-NL" b="1" dirty="0"/>
+              <a:t>Bruggetje</a:t>
+            </a:r>
+            <a:r>
+              <a:rPr lang="nl-NL" dirty="0"/>
+              <a:t>:</a:t>
+            </a:r>
+          </a:p>
+          <a:p>
+            <a:pPr marL="0" marR="0" indent="0" algn="l" defTabSz="914400" rtl="0" eaLnBrk="1" fontAlgn="auto" latinLnBrk="0" hangingPunct="1">
+              <a:lnSpc>
+                <a:spcPct val="100000"/>
+              </a:lnSpc>
+              <a:spcBef>
+                <a:spcPts val="0"/>
+              </a:spcBef>
+              <a:spcAft>
+                <a:spcPts val="0"/>
+              </a:spcAft>
+              <a:buClrTx/>
+              <a:buSzTx/>
+              <a:buFontTx/>
+              <a:buNone/>
+              <a:tabLst/>
+              <a:defRPr/>
+            </a:pPr>
+            <a:r>
+              <a:rPr lang="nl-NL" baseline="0" dirty="0">
+                <a:effectLst/>
+              </a:rPr>
+              <a:t>We zoomen verder in op het uitgelichte rapport van het rechter patroon</a:t>
+            </a:r>
           </a:p>
         </p:txBody>
       </p:sp>
@@ -1148,7 +1328,7 @@
     </p:spTree>
     <p:extLst>
       <p:ext uri="{BB962C8B-B14F-4D97-AF65-F5344CB8AC3E}">
-        <p14:creationId xmlns:p14="http://schemas.microsoft.com/office/powerpoint/2010/main" val="846069162"/>
+        <p14:creationId xmlns:p14="http://schemas.microsoft.com/office/powerpoint/2010/main" val="4263791989"/>
       </p:ext>
     </p:extLst>
   </p:cSld>
@@ -1202,46 +1382,103 @@
           <a:bodyPr/>
           <a:lstStyle/>
           <a:p>
-            <a:pPr marL="0" marR="0" lvl="0" indent="0" algn="l" defTabSz="914400" rtl="0" eaLnBrk="1" fontAlgn="auto" latinLnBrk="0" hangingPunct="1">
-              <a:lnSpc>
-                <a:spcPct val="100000"/>
-              </a:lnSpc>
-              <a:spcBef>
-                <a:spcPts val="0"/>
-              </a:spcBef>
-              <a:spcAft>
-                <a:spcPts val="0"/>
-              </a:spcAft>
-              <a:buClrTx/>
-              <a:buSzTx/>
-              <a:buFontTx/>
-              <a:buNone/>
-              <a:tabLst/>
-              <a:defRPr/>
-            </a:pPr>
             <a:r>
               <a:rPr lang="nl-NL" dirty="0">
                 <a:effectLst/>
               </a:rPr>
-              <a:t>Kantbrief/</a:t>
-            </a:r>
-            <a:r>
-              <a:rPr lang="nl-NL" dirty="0" err="1">
-                <a:effectLst/>
-              </a:rPr>
-              <a:t>pricking</a:t>
-            </a:r>
+              <a:t>Zie ook Engelse introductie in de help pagina’s</a:t>
+            </a:r>
+          </a:p>
+          <a:p>
+            <a:endParaRPr lang="nl-NL" dirty="0">
+              <a:effectLst/>
+            </a:endParaRPr>
+          </a:p>
+          <a:p>
             <a:r>
               <a:rPr lang="nl-NL" dirty="0">
                 <a:effectLst/>
               </a:rPr>
-              <a:t>: wat je geplastificeerd</a:t>
+              <a:t>Bovenste rij afbeeldingen wat je</a:t>
             </a:r>
             <a:r>
               <a:rPr lang="nl-NL" baseline="0" dirty="0">
                 <a:effectLst/>
               </a:rPr>
-              <a:t> op je kussen prikt.</a:t>
+              <a:t> van GroundForge krijgt.</a:t>
+            </a:r>
+          </a:p>
+          <a:p>
+            <a:r>
+              <a:rPr lang="nl-NL" baseline="0" dirty="0">
+                <a:effectLst/>
+              </a:rPr>
+              <a:t>Er telkens onder wat je misschien wilt hebben, of een tussenstap.</a:t>
+            </a:r>
+          </a:p>
+          <a:p>
+            <a:r>
+              <a:rPr lang="nl-NL" baseline="0" dirty="0">
+                <a:effectLst/>
+              </a:rPr>
+              <a:t>Linksonder als in: Kant uit Vlaanderen en ‘s Gravenmoer.</a:t>
+            </a:r>
+          </a:p>
+          <a:p>
+            <a:endParaRPr lang="nl-NL" baseline="0" dirty="0">
+              <a:effectLst/>
+            </a:endParaRPr>
+          </a:p>
+          <a:p>
+            <a:r>
+              <a:rPr lang="nl-NL" i="1" baseline="0" dirty="0">
+                <a:effectLst/>
+              </a:rPr>
+              <a:t>Afbeelding gemaakt op de (oude!) hoofdpagina met:</a:t>
+            </a:r>
+          </a:p>
+          <a:p>
+            <a:pPr lvl="1"/>
+            <a:r>
+              <a:rPr lang="nl-NL" i="0" dirty="0">
+                <a:effectLst/>
+                <a:latin typeface="Consolas" panose="020B0609020204030204" pitchFamily="49" charset="0"/>
+                <a:cs typeface="Consolas" panose="020B0609020204030204" pitchFamily="49" charset="0"/>
+              </a:rPr>
+              <a:t>-5--</a:t>
+            </a:r>
+          </a:p>
+          <a:p>
+            <a:pPr lvl="1"/>
+            <a:r>
+              <a:rPr lang="nl-NL" i="0" dirty="0">
+                <a:effectLst/>
+                <a:latin typeface="Consolas" panose="020B0609020204030204" pitchFamily="49" charset="0"/>
+                <a:cs typeface="Consolas" panose="020B0609020204030204" pitchFamily="49" charset="0"/>
+              </a:rPr>
+              <a:t>B-C-</a:t>
+            </a:r>
+          </a:p>
+          <a:p>
+            <a:pPr lvl="1"/>
+            <a:r>
+              <a:rPr lang="nl-NL" i="0" dirty="0">
+                <a:effectLst/>
+                <a:latin typeface="Consolas" panose="020B0609020204030204" pitchFamily="49" charset="0"/>
+                <a:cs typeface="Consolas" panose="020B0609020204030204" pitchFamily="49" charset="0"/>
+              </a:rPr>
+              <a:t>-5-5</a:t>
+            </a:r>
+          </a:p>
+          <a:p>
+            <a:pPr lvl="1"/>
+            <a:r>
+              <a:rPr lang="nl-NL" i="0" dirty="0">
+                <a:effectLst/>
+                <a:latin typeface="Consolas" panose="020B0609020204030204" pitchFamily="49" charset="0"/>
+                <a:cs typeface="Consolas" panose="020B0609020204030204" pitchFamily="49" charset="0"/>
+              </a:rPr>
+              <a:t>5-5-</a:t>
             </a:r>
           </a:p>
           <a:p>
@@ -1262,215 +1499,69 @@
               <a:tabLst/>
               <a:defRPr/>
             </a:pPr>
-            <a:endParaRPr lang="nl-NL" baseline="0" dirty="0">
+            <a:r>
+              <a:rPr lang="nl-NL" i="1" baseline="0" dirty="0">
+                <a:effectLst/>
+              </a:rPr>
+              <a:t>Brick (baksteen); Stitches (s</a:t>
+            </a:r>
+            <a:r>
+              <a:rPr lang="nl-NL" i="1" dirty="0">
+                <a:effectLst/>
+              </a:rPr>
+              <a:t>lagen): ct b1=ctptct d1=ctptct A2=ctpl C2=ctpr A4=ctl C4=ctr D1=ctptctt</a:t>
+            </a:r>
+          </a:p>
+          <a:p>
+            <a:endParaRPr lang="nl-NL" i="1" dirty="0">
               <a:effectLst/>
             </a:endParaRPr>
           </a:p>
           <a:p>
-            <a:pPr marL="0" marR="0" indent="0" algn="l" defTabSz="914400" rtl="0" eaLnBrk="1" fontAlgn="auto" latinLnBrk="0" hangingPunct="1">
-              <a:lnSpc>
-                <a:spcPct val="100000"/>
-              </a:lnSpc>
-              <a:spcBef>
-                <a:spcPts val="0"/>
-              </a:spcBef>
-              <a:spcAft>
-                <a:spcPts val="0"/>
-              </a:spcAft>
-              <a:buClrTx/>
-              <a:buSzTx/>
-              <a:buFontTx/>
-              <a:buNone/>
-              <a:tabLst/>
-              <a:defRPr/>
-            </a:pPr>
-            <a:r>
-              <a:rPr lang="nl-NL" baseline="0" dirty="0">
+            <a:r>
+              <a:rPr lang="nl-NL" i="1" dirty="0">
                 <a:effectLst/>
               </a:rPr>
-              <a:t>Je komt hier via “</a:t>
-            </a:r>
-            <a:r>
-              <a:rPr lang="nl-NL" baseline="0" dirty="0" err="1">
+              <a:t>Alle draden zwart, 7 en 10 rood</a:t>
+            </a:r>
+          </a:p>
+          <a:p>
+            <a:endParaRPr lang="nl-NL" i="1" baseline="0" dirty="0">
+              <a:effectLst/>
+            </a:endParaRPr>
+          </a:p>
+          <a:p>
+            <a:r>
+              <a:rPr lang="nl-NL" i="1" baseline="0" dirty="0">
                 <a:effectLst/>
               </a:rPr>
-              <a:t>vari</a:t>
-            </a:r>
-            <a:r>
-              <a:rPr lang="nl-NL" baseline="0" dirty="0">
+              <a:t>Probeer ook eens een dubbelle  netslag of omkeerslag in het midden</a:t>
+            </a:r>
+          </a:p>
+          <a:p>
+            <a:r>
+              <a:rPr lang="nl-NL" i="1" baseline="0" dirty="0">
                 <a:effectLst/>
               </a:rPr>
-              <a:t>” links vanuit de </a:t>
-            </a:r>
-            <a:r>
-              <a:rPr lang="nl-NL" baseline="0" dirty="0" err="1">
-                <a:effectLst/>
-              </a:rPr>
-              <a:t>Tesselace</a:t>
-            </a:r>
-            <a:r>
-              <a:rPr lang="nl-NL" baseline="0" dirty="0">
-                <a:effectLst/>
-              </a:rPr>
-              <a:t> index, of een à twee letterige links vanuit de </a:t>
-            </a:r>
-            <a:r>
-              <a:rPr lang="nl-NL" baseline="0" dirty="0" err="1">
-                <a:effectLst/>
-              </a:rPr>
-              <a:t>Whiting</a:t>
-            </a:r>
-            <a:r>
-              <a:rPr lang="nl-NL" baseline="0" dirty="0">
-                <a:effectLst/>
-              </a:rPr>
-              <a:t> index.</a:t>
-            </a:r>
-          </a:p>
-          <a:p>
-            <a:pPr marL="0" marR="0" indent="0" algn="l" defTabSz="914400" rtl="0" eaLnBrk="1" fontAlgn="auto" latinLnBrk="0" hangingPunct="1">
-              <a:lnSpc>
-                <a:spcPct val="100000"/>
-              </a:lnSpc>
-              <a:spcBef>
-                <a:spcPts val="0"/>
-              </a:spcBef>
-              <a:spcAft>
-                <a:spcPts val="0"/>
-              </a:spcAft>
-              <a:buClrTx/>
-              <a:buSzTx/>
-              <a:buFontTx/>
-              <a:buNone/>
-              <a:tabLst/>
-              <a:defRPr/>
-            </a:pPr>
-            <a:endParaRPr lang="nl-NL" baseline="0" dirty="0">
-              <a:effectLst/>
-            </a:endParaRPr>
-          </a:p>
-          <a:p>
-            <a:pPr marL="0" marR="0" indent="0" algn="l" defTabSz="914400" rtl="0" eaLnBrk="1" fontAlgn="auto" latinLnBrk="0" hangingPunct="1">
-              <a:lnSpc>
-                <a:spcPct val="100000"/>
-              </a:lnSpc>
-              <a:spcBef>
-                <a:spcPts val="0"/>
-              </a:spcBef>
-              <a:spcAft>
-                <a:spcPts val="0"/>
-              </a:spcAft>
-              <a:buClrTx/>
-              <a:buSzTx/>
-              <a:buFontTx/>
-              <a:buNone/>
-              <a:tabLst/>
-              <a:defRPr/>
-            </a:pPr>
-            <a:r>
-              <a:rPr lang="nl-NL" baseline="0" dirty="0">
-                <a:effectLst/>
-              </a:rPr>
-              <a:t>Variaties zijn beperkt door een vierkant raster.</a:t>
-            </a:r>
-          </a:p>
-          <a:p>
-            <a:pPr>
-              <a:defRPr/>
-            </a:pPr>
-            <a:r>
-              <a:rPr lang="nl-NL" baseline="0" dirty="0">
-                <a:effectLst/>
-              </a:rPr>
-              <a:t>Zelf kun je meer vervormingen toepassen</a:t>
-            </a:r>
-            <a:r>
-              <a:rPr lang="nl-NL" dirty="0">
+              <a:t>C=cross=kruisen, t=twist=draaien, p=pin=speld.</a:t>
+            </a:r>
+            <a:r>
+              <a:rPr lang="nl-NL" i="1" dirty="0">
                 <a:effectLst/>
               </a:rPr>
               <a:t> </a:t>
             </a:r>
             <a:r>
-              <a:rPr lang="nl-NL" dirty="0"/>
-              <a:t>voor de gewenste kantbrief.</a:t>
-            </a:r>
-            <a:endParaRPr lang="nl-NL" baseline="0" dirty="0">
+              <a:rPr lang="nl-NL" i="1" baseline="0" dirty="0">
+                <a:effectLst/>
+              </a:rPr>
+              <a:t>Meestal gaan spelden niet zo goed.</a:t>
+            </a:r>
+          </a:p>
+          <a:p>
+            <a:endParaRPr lang="nl-NL" i="1" dirty="0">
               <a:effectLst/>
             </a:endParaRPr>
-          </a:p>
-          <a:p>
-            <a:pPr marL="0" marR="0" indent="0" algn="l" defTabSz="914400" rtl="0" eaLnBrk="1" fontAlgn="auto" latinLnBrk="0" hangingPunct="1">
-              <a:lnSpc>
-                <a:spcPct val="100000"/>
-              </a:lnSpc>
-              <a:spcBef>
-                <a:spcPts val="0"/>
-              </a:spcBef>
-              <a:spcAft>
-                <a:spcPts val="0"/>
-              </a:spcAft>
-              <a:buClrTx/>
-              <a:buSzTx/>
-              <a:buFontTx/>
-              <a:buNone/>
-              <a:tabLst/>
-              <a:defRPr/>
-            </a:pPr>
-            <a:endParaRPr lang="nl-NL" baseline="0" dirty="0">
-              <a:effectLst/>
-            </a:endParaRPr>
-          </a:p>
-          <a:p>
-            <a:pPr marL="0" marR="0" indent="0" algn="l" defTabSz="914400" rtl="0" eaLnBrk="1" fontAlgn="auto" latinLnBrk="0" hangingPunct="1">
-              <a:lnSpc>
-                <a:spcPct val="100000"/>
-              </a:lnSpc>
-              <a:spcBef>
-                <a:spcPts val="0"/>
-              </a:spcBef>
-              <a:spcAft>
-                <a:spcPts val="0"/>
-              </a:spcAft>
-              <a:buClrTx/>
-              <a:buSzTx/>
-              <a:buFontTx/>
-              <a:buNone/>
-              <a:tabLst/>
-              <a:defRPr/>
-            </a:pPr>
-            <a:r>
-              <a:rPr lang="nl-NL" b="1" dirty="0"/>
-              <a:t>Bruggetje</a:t>
-            </a:r>
-            <a:r>
-              <a:rPr lang="nl-NL" dirty="0"/>
-              <a:t>:</a:t>
-            </a:r>
-          </a:p>
-          <a:p>
-            <a:pPr marL="0" marR="0" indent="0" algn="l" defTabSz="914400" rtl="0" eaLnBrk="1" fontAlgn="auto" latinLnBrk="0" hangingPunct="1">
-              <a:lnSpc>
-                <a:spcPct val="100000"/>
-              </a:lnSpc>
-              <a:spcBef>
-                <a:spcPts val="0"/>
-              </a:spcBef>
-              <a:spcAft>
-                <a:spcPts val="0"/>
-              </a:spcAft>
-              <a:buClrTx/>
-              <a:buSzTx/>
-              <a:buFontTx/>
-              <a:buNone/>
-              <a:tabLst/>
-              <a:defRPr/>
-            </a:pPr>
-            <a:r>
-              <a:rPr lang="nl-NL" baseline="0" dirty="0">
-                <a:effectLst/>
-              </a:rPr>
-              <a:t>We zoomen verder in op het uitgelichte rapport van het rechter patroon</a:t>
-            </a:r>
           </a:p>
         </p:txBody>
       </p:sp>
@@ -1558,42 +1649,237 @@
               <a:rPr lang="nl-NL" dirty="0">
                 <a:effectLst/>
               </a:rPr>
-              <a:t>Zie ook Engelse introductie in de help pagina’s</a:t>
-            </a:r>
-          </a:p>
-          <a:p>
-            <a:endParaRPr lang="nl-NL" dirty="0">
-              <a:effectLst/>
-            </a:endParaRPr>
-          </a:p>
-          <a:p>
+              <a:t>Concept</a:t>
+            </a:r>
+            <a:r>
+              <a:rPr lang="nl-NL" baseline="0" dirty="0">
+                <a:effectLst/>
+              </a:rPr>
+              <a:t> downloaden voor SVG editor:</a:t>
+            </a:r>
+          </a:p>
+          <a:p>
+            <a:r>
+              <a:rPr lang="nl-NL" dirty="0" err="1"/>
+              <a:t>CorelDraw</a:t>
+            </a:r>
+            <a:r>
+              <a:rPr lang="nl-NL" dirty="0"/>
+              <a:t> 💰 , Adobe Illustrator💰, </a:t>
+            </a:r>
+            <a:r>
+              <a:rPr lang="nl-NL" dirty="0" err="1"/>
+              <a:t>InkScape</a:t>
+            </a:r>
+            <a:r>
+              <a:rPr lang="nl-NL" dirty="0"/>
+              <a:t> (gratis)</a:t>
+            </a:r>
+          </a:p>
+          <a:p>
+            <a:r>
+              <a:rPr lang="nl-NL" dirty="0" err="1">
+                <a:effectLst/>
+              </a:rPr>
+              <a:t>Knipling</a:t>
+            </a:r>
             <a:r>
               <a:rPr lang="nl-NL" dirty="0">
                 <a:effectLst/>
               </a:rPr>
-              <a:t>Bovenste rij afbeeldingen wat je</a:t>
+              <a:t>/Lace</a:t>
+            </a:r>
+            <a:r>
+              <a:rPr lang="nl-NL" sz="1400" baseline="30000" dirty="0">
+                <a:effectLst/>
+              </a:rPr>
+              <a:t>8</a:t>
+            </a:r>
+            <a:r>
+              <a:rPr lang="nl-NL" sz="1400" dirty="0">
+                <a:effectLst/>
+              </a:rPr>
+              <a:t>/</a:t>
+            </a:r>
+            <a:r>
+              <a:rPr lang="nl-NL" dirty="0" err="1">
+                <a:effectLst/>
+              </a:rPr>
+              <a:t>Lace</a:t>
+            </a:r>
+            <a:r>
+              <a:rPr lang="nl-NL" sz="1200" baseline="30000" dirty="0" err="1">
+                <a:effectLst/>
+              </a:rPr>
+              <a:t>X</a:t>
+            </a:r>
+            <a:r>
+              <a:rPr lang="nl-NL" sz="1200" baseline="30000" dirty="0">
+                <a:effectLst/>
+              </a:rPr>
+              <a:t>-RP</a:t>
+            </a:r>
+            <a:r>
+              <a:rPr lang="nl-NL" dirty="0">
+                <a:effectLst/>
+              </a:rPr>
+              <a:t> begrijpen de download niet: 1 rapport natekenen</a:t>
+            </a:r>
+          </a:p>
+          <a:p>
+            <a:r>
+              <a:rPr lang="nl-NL" dirty="0">
+                <a:effectLst/>
+              </a:rPr>
+              <a:t>De </a:t>
+            </a:r>
+            <a:r>
+              <a:rPr lang="nl-NL" dirty="0" err="1">
+                <a:effectLst/>
+              </a:rPr>
+              <a:t>gekleurende</a:t>
+            </a:r>
+            <a:r>
+              <a:rPr lang="nl-NL" dirty="0">
+                <a:effectLst/>
+              </a:rPr>
+              <a:t> punten helpen</a:t>
             </a:r>
             <a:r>
               <a:rPr lang="nl-NL" baseline="0" dirty="0">
                 <a:effectLst/>
               </a:rPr>
-              <a:t> van GroundForge krijgt.</a:t>
-            </a:r>
+              <a:t> meerdere rapporten aan elkaar plakken</a:t>
+            </a:r>
+          </a:p>
+          <a:p>
+            <a:endParaRPr lang="nl-NL" dirty="0"/>
+          </a:p>
+          <a:p>
+            <a:r>
+              <a:rPr lang="nl-NL" dirty="0"/>
+              <a:t>Je kunt ook kruispunten verplaatsen.</a:t>
+            </a:r>
+          </a:p>
+          <a:p>
+            <a:r>
+              <a:rPr lang="nl-NL" dirty="0">
+                <a:effectLst/>
+              </a:rPr>
+              <a:t>Zelfde kleuren </a:t>
+            </a:r>
+            <a:r>
+              <a:rPr lang="nl-NL" dirty="0">
+                <a:effectLst/>
+                <a:sym typeface="Wingdings" panose="05000000000000000000" pitchFamily="2" charset="2"/>
+              </a:rPr>
+              <a:t> zelfde verplaatsing</a:t>
+            </a:r>
+            <a:r>
+              <a:rPr lang="nl-NL" dirty="0">
+                <a:effectLst/>
+              </a:rPr>
+              <a:t> </a:t>
+            </a:r>
+          </a:p>
+          <a:p>
+            <a:r>
+              <a:rPr lang="nl-NL" dirty="0">
+                <a:effectLst/>
+              </a:rPr>
+              <a:t>Het donkerblauwe bolletje rechtsboven zit ook midden-onder</a:t>
+            </a:r>
+          </a:p>
+          <a:p>
+            <a:r>
+              <a:rPr lang="nl-NL" dirty="0">
+                <a:effectLst/>
+              </a:rPr>
+              <a:t> en kan daardoor hooguit een half hokje verschuiven.</a:t>
+            </a:r>
+          </a:p>
+          <a:p>
+            <a:endParaRPr lang="nl-NL" baseline="0" dirty="0">
+              <a:effectLst/>
+            </a:endParaRPr>
           </a:p>
           <a:p>
             <a:r>
               <a:rPr lang="nl-NL" baseline="0" dirty="0">
                 <a:effectLst/>
               </a:rPr>
-              <a:t>Er telkens onder wat je misschien wilt hebben, of een tussenstap.</a:t>
-            </a:r>
-          </a:p>
-          <a:p>
+              <a:t>Met promotieonderzoek alle(?) combinaties tot 4x4 opgezocht</a:t>
+            </a:r>
+          </a:p>
+          <a:p>
+            <a:r>
+              <a:rPr lang="nl-NL" dirty="0">
+                <a:effectLst/>
+                <a:sym typeface="Wingdings" panose="05000000000000000000" pitchFamily="2" charset="2"/>
+              </a:rPr>
+              <a:t> enkele</a:t>
+            </a:r>
             <a:r>
               <a:rPr lang="nl-NL" baseline="0" dirty="0">
                 <a:effectLst/>
               </a:rPr>
-              <a:t>Linksonder als in: Kant uit Vlaanderen en ‘s Gravenmoer.</a:t>
+              <a:t> </a:t>
+            </a:r>
+            <a:r>
+              <a:rPr lang="nl-NL" dirty="0"/>
+              <a:t>honderden rondgetrokken tesselace</a:t>
+            </a:r>
+            <a:r>
+              <a:rPr lang="nl-NL" baseline="0" dirty="0"/>
+              <a:t> </a:t>
+            </a:r>
+            <a:r>
+              <a:rPr lang="nl-NL" dirty="0"/>
+              <a:t>diagrammen</a:t>
+            </a:r>
+          </a:p>
+          <a:p>
+            <a:r>
+              <a:rPr lang="nl-NL" dirty="0"/>
+              <a:t>5x4: zo veel dat je met een 1 sec per stuk minstens een dag bezig</a:t>
+            </a:r>
+            <a:r>
+              <a:rPr lang="nl-NL" baseline="0" dirty="0"/>
+              <a:t> bent,</a:t>
+            </a:r>
+          </a:p>
+          <a:p>
+            <a:r>
+              <a:rPr lang="nl-NL" baseline="0" dirty="0"/>
+              <a:t> veel daarvan is meer van bijna hetzelfde</a:t>
+            </a:r>
+            <a:endParaRPr lang="nl-NL" dirty="0"/>
+          </a:p>
+          <a:p>
+            <a:endParaRPr lang="nl-NL" dirty="0"/>
+          </a:p>
+          <a:p>
+            <a:r>
+              <a:rPr lang="nl-NL" dirty="0"/>
+              <a:t>Binche gronden passen niet in 4x4,</a:t>
+            </a:r>
+            <a:r>
+              <a:rPr lang="nl-NL" baseline="0" dirty="0"/>
+              <a:t> d</a:t>
+            </a:r>
+            <a:r>
+              <a:rPr lang="nl-NL" baseline="0" dirty="0">
+                <a:effectLst/>
+              </a:rPr>
+              <a:t>ie kun je wel zelf maken</a:t>
+            </a:r>
+          </a:p>
+          <a:p>
+            <a:r>
+              <a:rPr lang="nl-NL" baseline="0" dirty="0">
+                <a:effectLst/>
+              </a:rPr>
+              <a:t>Spiekbriefje in de handleiding (toegepast in MAE-gf en Whiting index)</a:t>
             </a:r>
           </a:p>
           <a:p>
@@ -1603,135 +1889,24 @@
           </a:p>
           <a:p>
             <a:r>
-              <a:rPr lang="nl-NL" i="1" baseline="0" dirty="0">
-                <a:effectLst/>
-              </a:rPr>
-              <a:t>Afbeelding gemaakt op de (oude!) hoofdpagina met:</a:t>
-            </a:r>
-          </a:p>
-          <a:p>
-            <a:pPr lvl="1"/>
-            <a:r>
-              <a:rPr lang="nl-NL" i="0" dirty="0">
-                <a:effectLst/>
-                <a:latin typeface="Consolas" panose="020B0609020204030204" pitchFamily="49" charset="0"/>
-                <a:cs typeface="Consolas" panose="020B0609020204030204" pitchFamily="49" charset="0"/>
-              </a:rPr>
-              <a:t>-5--</a:t>
-            </a:r>
-          </a:p>
-          <a:p>
-            <a:pPr lvl="1"/>
-            <a:r>
-              <a:rPr lang="nl-NL" i="0" dirty="0">
-                <a:effectLst/>
-                <a:latin typeface="Consolas" panose="020B0609020204030204" pitchFamily="49" charset="0"/>
-                <a:cs typeface="Consolas" panose="020B0609020204030204" pitchFamily="49" charset="0"/>
-              </a:rPr>
-              <a:t>B-C-</a:t>
-            </a:r>
-          </a:p>
-          <a:p>
-            <a:pPr lvl="1"/>
-            <a:r>
-              <a:rPr lang="nl-NL" i="0" dirty="0">
-                <a:effectLst/>
-                <a:latin typeface="Consolas" panose="020B0609020204030204" pitchFamily="49" charset="0"/>
-                <a:cs typeface="Consolas" panose="020B0609020204030204" pitchFamily="49" charset="0"/>
-              </a:rPr>
-              <a:t>-5-5</a:t>
-            </a:r>
-          </a:p>
-          <a:p>
-            <a:pPr lvl="1"/>
-            <a:r>
-              <a:rPr lang="nl-NL" i="0" dirty="0">
-                <a:effectLst/>
-                <a:latin typeface="Consolas" panose="020B0609020204030204" pitchFamily="49" charset="0"/>
-                <a:cs typeface="Consolas" panose="020B0609020204030204" pitchFamily="49" charset="0"/>
-              </a:rPr>
-              <a:t>5-5-</a:t>
-            </a:r>
-          </a:p>
-          <a:p>
-            <a:pPr marL="0" marR="0" indent="0" algn="l" defTabSz="914400" rtl="0" eaLnBrk="1" fontAlgn="auto" latinLnBrk="0" hangingPunct="1">
-              <a:lnSpc>
-                <a:spcPct val="100000"/>
-              </a:lnSpc>
-              <a:spcBef>
-                <a:spcPts val="0"/>
-              </a:spcBef>
-              <a:spcAft>
-                <a:spcPts val="0"/>
-              </a:spcAft>
-              <a:buClrTx/>
-              <a:buSzTx/>
-              <a:buFontTx/>
-              <a:buNone/>
-              <a:tabLst/>
-              <a:defRPr/>
-            </a:pPr>
-            <a:r>
-              <a:rPr lang="nl-NL" i="1" baseline="0" dirty="0">
-                <a:effectLst/>
-              </a:rPr>
-              <a:t>Brick (baksteen); Stitches (s</a:t>
-            </a:r>
-            <a:r>
-              <a:rPr lang="nl-NL" i="1" dirty="0">
-                <a:effectLst/>
-              </a:rPr>
-              <a:t>lagen): ct b1=ctptct d1=ctptct A2=ctpl C2=ctpr A4=ctl C4=ctr D1=ctptctt</a:t>
-            </a:r>
-          </a:p>
-          <a:p>
-            <a:endParaRPr lang="nl-NL" i="1" dirty="0">
-              <a:effectLst/>
-            </a:endParaRPr>
-          </a:p>
-          <a:p>
-            <a:r>
-              <a:rPr lang="nl-NL" i="1" dirty="0">
-                <a:effectLst/>
-              </a:rPr>
-              <a:t>Alle draden zwart, 7 en 10 rood</a:t>
-            </a:r>
-          </a:p>
-          <a:p>
-            <a:endParaRPr lang="nl-NL" i="1" baseline="0" dirty="0">
-              <a:effectLst/>
-            </a:endParaRPr>
-          </a:p>
-          <a:p>
-            <a:r>
-              <a:rPr lang="nl-NL" i="1" baseline="0" dirty="0">
-                <a:effectLst/>
-              </a:rPr>
-              <a:t>Probeer ook eens een dubbelle  netslag of omkeerslag in het midden</a:t>
-            </a:r>
-          </a:p>
-          <a:p>
-            <a:r>
-              <a:rPr lang="nl-NL" i="1" baseline="0" dirty="0">
-                <a:effectLst/>
-              </a:rPr>
-              <a:t>C=cross=kruisen, t=twist=draaien, p=pin=speld.</a:t>
-            </a:r>
-            <a:r>
-              <a:rPr lang="nl-NL" i="1" dirty="0">
-                <a:effectLst/>
-              </a:rPr>
-              <a:t> </a:t>
-            </a:r>
-            <a:r>
-              <a:rPr lang="nl-NL" i="1" baseline="0" dirty="0">
-                <a:effectLst/>
-              </a:rPr>
-              <a:t>Meestal gaan spelden niet zo goed.</a:t>
-            </a:r>
-          </a:p>
-          <a:p>
-            <a:endParaRPr lang="nl-NL" i="1" dirty="0">
+              <a:rPr lang="nl-NL" i="0" dirty="0"/>
+              <a:t>Horizontale of verticale verbinding zijn één of twee hokjes lang.</a:t>
+            </a:r>
+          </a:p>
+          <a:p>
+            <a:r>
+              <a:rPr lang="nl-NL" i="0" dirty="0"/>
+              <a:t>Diagonale verbindingen zijn altijd één hokje.</a:t>
+            </a:r>
+          </a:p>
+          <a:p>
+            <a:r>
+              <a:rPr lang="nl-NL" i="0" dirty="0"/>
+              <a:t>Boven (C) en (B) is eigenlijk ook nog een (-) nodig</a:t>
+            </a:r>
+          </a:p>
+          <a:p>
+            <a:endParaRPr lang="nl-NL" baseline="0" dirty="0">
               <a:effectLst/>
             </a:endParaRPr>
           </a:p>
@@ -1817,270 +1992,37 @@
           <a:bodyPr/>
           <a:lstStyle/>
           <a:p>
+            <a:endParaRPr lang="nl-NL" dirty="0">
+              <a:effectLst/>
+            </a:endParaRPr>
+          </a:p>
+          <a:p>
+            <a:r>
+              <a:rPr lang="nl-NL" b="1" dirty="0">
+                <a:effectLst/>
+              </a:rPr>
+              <a:t>bruggetje</a:t>
+            </a:r>
+          </a:p>
+          <a:p>
             <a:r>
               <a:rPr lang="nl-NL" dirty="0">
                 <a:effectLst/>
               </a:rPr>
-              <a:t>Concept</a:t>
-            </a:r>
-            <a:r>
-              <a:rPr lang="nl-NL" baseline="0" dirty="0">
+              <a:t>gebruik het dradenschema voor een 2</a:t>
+            </a:r>
+            <a:r>
+              <a:rPr lang="nl-NL" baseline="30000" dirty="0">
                 <a:effectLst/>
               </a:rPr>
-              <a:t> downloaden voor SVG editor:</a:t>
-            </a:r>
-          </a:p>
-          <a:p>
-            <a:r>
-              <a:rPr lang="nl-NL" dirty="0" err="1"/>
-              <a:t>CorelDraw</a:t>
-            </a:r>
-            <a:r>
-              <a:rPr lang="nl-NL" dirty="0"/>
-              <a:t> 💰 , Adobe Illustrator💰, </a:t>
-            </a:r>
-            <a:r>
-              <a:rPr lang="nl-NL" dirty="0" err="1"/>
-              <a:t>InkScape</a:t>
-            </a:r>
-            <a:r>
-              <a:rPr lang="nl-NL" dirty="0"/>
-              <a:t> (gratis)</a:t>
-            </a:r>
-          </a:p>
-          <a:p>
-            <a:r>
-              <a:rPr lang="nl-NL" dirty="0" err="1">
-                <a:effectLst/>
-              </a:rPr>
-              <a:t>Knipling</a:t>
+              <a:t>e</a:t>
             </a:r>
             <a:r>
               <a:rPr lang="nl-NL" dirty="0">
                 <a:effectLst/>
               </a:rPr>
-              <a:t>/Lace</a:t>
-            </a:r>
-            <a:r>
-              <a:rPr lang="nl-NL" sz="1400" baseline="30000" dirty="0">
-                <a:effectLst/>
-              </a:rPr>
-              <a:t>8</a:t>
-            </a:r>
-            <a:r>
-              <a:rPr lang="nl-NL" sz="1400" dirty="0">
-                <a:effectLst/>
-              </a:rPr>
-              <a:t>/</a:t>
-            </a:r>
-            <a:r>
-              <a:rPr lang="nl-NL" dirty="0" err="1">
-                <a:effectLst/>
-              </a:rPr>
-              <a:t>Lace</a:t>
-            </a:r>
-            <a:r>
-              <a:rPr lang="nl-NL" sz="1200" baseline="30000" dirty="0" err="1">
-                <a:effectLst/>
-              </a:rPr>
-              <a:t>X</a:t>
-            </a:r>
-            <a:r>
-              <a:rPr lang="nl-NL" sz="1200" baseline="30000" dirty="0">
-                <a:effectLst/>
-              </a:rPr>
-              <a:t>-RP</a:t>
-            </a:r>
-            <a:r>
-              <a:rPr lang="nl-NL" dirty="0">
-                <a:effectLst/>
-              </a:rPr>
-              <a:t> begrijpen de download niet: 1 rapport natekenen</a:t>
-            </a:r>
-          </a:p>
-          <a:p>
-            <a:r>
-              <a:rPr lang="nl-NL" dirty="0">
-                <a:effectLst/>
-              </a:rPr>
-              <a:t>De </a:t>
-            </a:r>
-            <a:r>
-              <a:rPr lang="nl-NL" dirty="0" err="1">
-                <a:effectLst/>
-              </a:rPr>
-              <a:t>gekleurende</a:t>
-            </a:r>
-            <a:r>
-              <a:rPr lang="nl-NL" dirty="0">
-                <a:effectLst/>
-              </a:rPr>
-              <a:t> punten helpen</a:t>
-            </a:r>
-            <a:r>
-              <a:rPr lang="nl-NL" baseline="0" dirty="0">
-                <a:effectLst/>
-              </a:rPr>
-              <a:t> meerdere rapporten aan elkaar plakken</a:t>
-            </a:r>
-          </a:p>
-          <a:p>
-            <a:endParaRPr lang="nl-NL" dirty="0"/>
-          </a:p>
-          <a:p>
-            <a:r>
-              <a:rPr lang="nl-NL" dirty="0"/>
-              <a:t>Je kunt ook kruispunten verplaatsen.</a:t>
-            </a:r>
-          </a:p>
-          <a:p>
-            <a:r>
-              <a:rPr lang="nl-NL" dirty="0">
-                <a:effectLst/>
-              </a:rPr>
-              <a:t>Zelfde kleuren </a:t>
-            </a:r>
-            <a:r>
-              <a:rPr lang="nl-NL" dirty="0">
-                <a:effectLst/>
-                <a:sym typeface="Wingdings" panose="05000000000000000000" pitchFamily="2" charset="2"/>
-              </a:rPr>
-              <a:t> zelfde verplaatsing</a:t>
-            </a:r>
-            <a:r>
-              <a:rPr lang="nl-NL" dirty="0">
-                <a:effectLst/>
-              </a:rPr>
-              <a:t> </a:t>
-            </a:r>
-          </a:p>
-          <a:p>
-            <a:r>
-              <a:rPr lang="nl-NL" dirty="0">
-                <a:effectLst/>
-              </a:rPr>
-              <a:t>Het donkerblauwe bolletje rechtsboven zit ook midden-onder</a:t>
-            </a:r>
-          </a:p>
-          <a:p>
-            <a:r>
-              <a:rPr lang="nl-NL" dirty="0">
-                <a:effectLst/>
-              </a:rPr>
-              <a:t> en kan daardoor hooguit een half hokje verschuiven.</a:t>
-            </a:r>
-          </a:p>
-          <a:p>
-            <a:endParaRPr lang="nl-NL" baseline="0" dirty="0">
-              <a:effectLst/>
-            </a:endParaRPr>
-          </a:p>
-          <a:p>
-            <a:r>
-              <a:rPr lang="nl-NL" baseline="0" dirty="0">
-                <a:effectLst/>
-              </a:rPr>
-              <a:t>Met promotieonderzoek alle(?) combinaties tot 4x4 opgezocht</a:t>
-            </a:r>
-          </a:p>
-          <a:p>
-            <a:r>
-              <a:rPr lang="nl-NL" dirty="0">
-                <a:effectLst/>
-                <a:sym typeface="Wingdings" panose="05000000000000000000" pitchFamily="2" charset="2"/>
-              </a:rPr>
-              <a:t> enkele</a:t>
-            </a:r>
-            <a:r>
-              <a:rPr lang="nl-NL" baseline="0" dirty="0">
-                <a:effectLst/>
-              </a:rPr>
-              <a:t> </a:t>
-            </a:r>
-            <a:r>
-              <a:rPr lang="nl-NL" dirty="0"/>
-              <a:t>honderden rondgetrokken tesselace</a:t>
-            </a:r>
-            <a:r>
-              <a:rPr lang="nl-NL" baseline="0" dirty="0"/>
-              <a:t> </a:t>
-            </a:r>
-            <a:r>
-              <a:rPr lang="nl-NL" dirty="0"/>
-              <a:t>diagrammen</a:t>
-            </a:r>
-          </a:p>
-          <a:p>
-            <a:r>
-              <a:rPr lang="nl-NL" dirty="0"/>
-              <a:t>5x4: zo veel dat je met een 1 sec per stuk minstens een dag bezig</a:t>
-            </a:r>
-            <a:r>
-              <a:rPr lang="nl-NL" baseline="0" dirty="0"/>
-              <a:t> bent,</a:t>
-            </a:r>
-          </a:p>
-          <a:p>
-            <a:r>
-              <a:rPr lang="nl-NL" baseline="0" dirty="0"/>
-              <a:t> veel daarvan is meer van bijna hetzelfde</a:t>
-            </a:r>
-            <a:endParaRPr lang="nl-NL" dirty="0"/>
-          </a:p>
-          <a:p>
-            <a:endParaRPr lang="nl-NL" dirty="0"/>
-          </a:p>
-          <a:p>
-            <a:r>
-              <a:rPr lang="nl-NL" dirty="0"/>
-              <a:t>Binche gronden passen niet in 4x4,</a:t>
-            </a:r>
-            <a:r>
-              <a:rPr lang="nl-NL" baseline="0" dirty="0"/>
-              <a:t> d</a:t>
-            </a:r>
-            <a:r>
-              <a:rPr lang="nl-NL" baseline="0" dirty="0">
-                <a:effectLst/>
-              </a:rPr>
-              <a:t>ie kun je wel zelf maken</a:t>
-            </a:r>
-          </a:p>
-          <a:p>
-            <a:r>
-              <a:rPr lang="nl-NL" baseline="0" dirty="0">
-                <a:effectLst/>
-              </a:rPr>
-              <a:t>Spiekbriefje in de handleiding (toegepast in MAE-gf en Whiting index)</a:t>
-            </a:r>
-          </a:p>
-          <a:p>
-            <a:endParaRPr lang="nl-NL" baseline="0" dirty="0">
-              <a:effectLst/>
-            </a:endParaRPr>
-          </a:p>
-          <a:p>
-            <a:r>
-              <a:rPr lang="nl-NL" i="0" dirty="0"/>
-              <a:t>Horizontale of verticale verbinding zijn één of twee hokjes lang.</a:t>
-            </a:r>
-          </a:p>
-          <a:p>
-            <a:r>
-              <a:rPr lang="nl-NL" i="0" dirty="0"/>
-              <a:t>Diagonale verbindingen zijn altijd één hokje.</a:t>
-            </a:r>
-          </a:p>
-          <a:p>
-            <a:r>
-              <a:rPr lang="nl-NL" i="0" dirty="0"/>
-              <a:t>Boven (C) en (B) is eigenlijk ook nog een (-) nodig</a:t>
-            </a:r>
-          </a:p>
-          <a:p>
-            <a:endParaRPr lang="nl-NL" baseline="0" dirty="0">
-              <a:effectLst/>
-            </a:endParaRPr>
+              <a:t> parenschema</a:t>
+            </a:r>
           </a:p>
         </p:txBody>
       </p:sp>
@@ -2110,7 +2052,7 @@
     </p:spTree>
     <p:extLst>
       <p:ext uri="{BB962C8B-B14F-4D97-AF65-F5344CB8AC3E}">
-        <p14:creationId xmlns:p14="http://schemas.microsoft.com/office/powerpoint/2010/main" val="4263791989"/>
+        <p14:creationId xmlns:p14="http://schemas.microsoft.com/office/powerpoint/2010/main" val="846069162"/>
       </p:ext>
     </p:extLst>
   </p:cSld>
@@ -2164,37 +2106,85 @@
           <a:bodyPr/>
           <a:lstStyle/>
           <a:p>
+            <a:r>
+              <a:rPr lang="nl-NL" dirty="0">
+                <a:effectLst/>
+              </a:rPr>
+              <a:t>Spelden kunnen</a:t>
+            </a:r>
+            <a:r>
+              <a:rPr lang="nl-NL" baseline="0" dirty="0">
+                <a:effectLst/>
+              </a:rPr>
+              <a:t> als in een Trollengrond</a:t>
+            </a:r>
+            <a:r>
+              <a:rPr lang="nl-NL" dirty="0">
+                <a:effectLst/>
+              </a:rPr>
+              <a:t> gestoken worden</a:t>
+            </a:r>
+          </a:p>
+          <a:p>
+            <a:r>
+              <a:rPr lang="nl-NL" dirty="0">
+                <a:effectLst/>
+              </a:rPr>
+              <a:t>of als in een Vlaanderse grond</a:t>
+            </a:r>
+          </a:p>
+          <a:p>
             <a:endParaRPr lang="nl-NL" dirty="0">
               <a:effectLst/>
             </a:endParaRPr>
           </a:p>
           <a:p>
             <a:r>
-              <a:rPr lang="nl-NL" b="1" dirty="0">
-                <a:effectLst/>
-              </a:rPr>
-              <a:t>bruggetje</a:t>
-            </a:r>
-          </a:p>
-          <a:p>
-            <a:r>
               <a:rPr lang="nl-NL" dirty="0">
                 <a:effectLst/>
               </a:rPr>
-              <a:t>gebruik het dradenschema voor een 2</a:t>
-            </a:r>
-            <a:r>
-              <a:rPr lang="nl-NL" baseline="30000" dirty="0">
+              <a:t>---------</a:t>
+            </a:r>
+          </a:p>
+          <a:p>
+            <a:endParaRPr lang="nl-NL" dirty="0">
+              <a:effectLst/>
+            </a:endParaRPr>
+          </a:p>
+          <a:p>
+            <a:r>
+              <a:rPr lang="nl-NL" dirty="0">
                 <a:effectLst/>
+                <a:hlinkClick r:id="rId3"/>
               </a:rPr>
-              <a:t>e</a:t>
+              <a:t>http://www.lokk.nl/techniek/trollengrond.php</a:t>
             </a:r>
             <a:r>
               <a:rPr lang="nl-NL" dirty="0">
                 <a:effectLst/>
               </a:rPr>
-              <a:t> parenschema</a:t>
-            </a:r>
+              <a:t> </a:t>
+            </a:r>
+          </a:p>
+          <a:p>
+            <a:r>
+              <a:rPr lang="nl-NL" dirty="0">
+                <a:effectLst/>
+                <a:hlinkClick r:id="rId4"/>
+              </a:rPr>
+              <a:t>http://www.lokk.nl/techniek/vlaandersetralie.php</a:t>
+            </a:r>
+            <a:r>
+              <a:rPr lang="nl-NL" dirty="0">
+                <a:effectLst/>
+              </a:rPr>
+              <a:t> </a:t>
+            </a:r>
+          </a:p>
+          <a:p>
+            <a:endParaRPr lang="nl-NL" baseline="0" dirty="0">
+              <a:effectLst/>
+            </a:endParaRPr>
           </a:p>
         </p:txBody>
       </p:sp>
@@ -2278,85 +2268,58 @@
           <a:bodyPr/>
           <a:lstStyle/>
           <a:p>
-            <a:r>
-              <a:rPr lang="nl-NL" dirty="0">
-                <a:effectLst/>
-              </a:rPr>
-              <a:t>Spelden kunnen</a:t>
-            </a:r>
-            <a:r>
-              <a:rPr lang="nl-NL" baseline="0" dirty="0">
-                <a:effectLst/>
-              </a:rPr>
-              <a:t> als in een Trollengrond</a:t>
-            </a:r>
-            <a:r>
-              <a:rPr lang="nl-NL" dirty="0">
-                <a:effectLst/>
-              </a:rPr>
-              <a:t> gestoken worden</a:t>
-            </a:r>
-          </a:p>
-          <a:p>
-            <a:r>
-              <a:rPr lang="nl-NL" dirty="0">
-                <a:effectLst/>
-              </a:rPr>
-              <a:t>of als in een Vlaanderse grond</a:t>
-            </a:r>
-          </a:p>
-          <a:p>
-            <a:endParaRPr lang="nl-NL" dirty="0">
-              <a:effectLst/>
-            </a:endParaRPr>
-          </a:p>
-          <a:p>
-            <a:r>
-              <a:rPr lang="nl-NL" dirty="0">
-                <a:effectLst/>
-              </a:rPr>
-              <a:t>---------</a:t>
-            </a:r>
-          </a:p>
-          <a:p>
-            <a:endParaRPr lang="nl-NL" dirty="0">
-              <a:effectLst/>
-            </a:endParaRPr>
-          </a:p>
-          <a:p>
-            <a:r>
-              <a:rPr lang="nl-NL" dirty="0">
-                <a:effectLst/>
-                <a:hlinkClick r:id="rId3"/>
-              </a:rPr>
-              <a:t>http://www.lokk.nl/techniek/trollengrond.php</a:t>
-            </a:r>
-            <a:r>
-              <a:rPr lang="nl-NL" dirty="0">
-                <a:effectLst/>
-              </a:rPr>
-              <a:t> </a:t>
-            </a:r>
-          </a:p>
-          <a:p>
-            <a:r>
-              <a:rPr lang="nl-NL" dirty="0">
-                <a:effectLst/>
-                <a:hlinkClick r:id="rId4"/>
-              </a:rPr>
-              <a:t>http://www.lokk.nl/techniek/vlaandersetralie.php</a:t>
-            </a:r>
-            <a:r>
-              <a:rPr lang="nl-NL" dirty="0">
-                <a:effectLst/>
-              </a:rPr>
-              <a:t> </a:t>
-            </a:r>
-          </a:p>
-          <a:p>
-            <a:endParaRPr lang="nl-NL" baseline="0" dirty="0">
-              <a:effectLst/>
-            </a:endParaRPr>
+            <a:pPr marL="0" marR="0" indent="0" algn="l" defTabSz="914400" rtl="0" eaLnBrk="1" fontAlgn="auto" latinLnBrk="0" hangingPunct="1">
+              <a:lnSpc>
+                <a:spcPct val="100000"/>
+              </a:lnSpc>
+              <a:spcBef>
+                <a:spcPts val="0"/>
+              </a:spcBef>
+              <a:spcAft>
+                <a:spcPts val="0"/>
+              </a:spcAft>
+              <a:buClrTx/>
+              <a:buSzTx/>
+              <a:buFontTx/>
+              <a:buNone/>
+              <a:tabLst/>
+              <a:defRPr/>
+            </a:pPr>
+            <a:r>
+              <a:rPr lang="nl-NL" baseline="0" dirty="0"/>
+              <a:t>De software maakt de gaten zo rond mogelijk. </a:t>
+            </a:r>
+          </a:p>
+          <a:p>
+            <a:endParaRPr lang="nl-NL" dirty="0"/>
+          </a:p>
+          <a:p>
+            <a:r>
+              <a:rPr lang="nl-NL" dirty="0"/>
+              <a:t>Met spelden</a:t>
+            </a:r>
+          </a:p>
+          <a:p>
+            <a:r>
+              <a:rPr lang="nl-NL" dirty="0"/>
+              <a:t> kun je vierkantjes maken</a:t>
+            </a:r>
+          </a:p>
+          <a:p>
+            <a:r>
+              <a:rPr lang="nl-NL" dirty="0"/>
+              <a:t> of een mix van vierkantjes en rondjes</a:t>
+            </a:r>
+          </a:p>
+          <a:p>
+            <a:r>
+              <a:rPr lang="nl-NL" baseline="0" dirty="0"/>
+              <a:t> (niet met GroundForge)</a:t>
+            </a:r>
+            <a:endParaRPr lang="nl-NL" dirty="0"/>
+          </a:p>
+          <a:p>
+            <a:endParaRPr lang="nl-NL" dirty="0"/>
           </a:p>
         </p:txBody>
       </p:sp>
@@ -2440,141 +2403,6 @@
           <a:bodyPr/>
           <a:lstStyle/>
           <a:p>
-            <a:pPr marL="0" marR="0" indent="0" algn="l" defTabSz="914400" rtl="0" eaLnBrk="1" fontAlgn="auto" latinLnBrk="0" hangingPunct="1">
-              <a:lnSpc>
-                <a:spcPct val="100000"/>
-              </a:lnSpc>
-              <a:spcBef>
-                <a:spcPts val="0"/>
-              </a:spcBef>
-              <a:spcAft>
-                <a:spcPts val="0"/>
-              </a:spcAft>
-              <a:buClrTx/>
-              <a:buSzTx/>
-              <a:buFontTx/>
-              <a:buNone/>
-              <a:tabLst/>
-              <a:defRPr/>
-            </a:pPr>
-            <a:r>
-              <a:rPr lang="nl-NL" baseline="0" dirty="0"/>
-              <a:t>De software maakt de gaten zo rond mogelijk. </a:t>
-            </a:r>
-          </a:p>
-          <a:p>
-            <a:endParaRPr lang="nl-NL" dirty="0"/>
-          </a:p>
-          <a:p>
-            <a:r>
-              <a:rPr lang="nl-NL" dirty="0"/>
-              <a:t>Met spelden</a:t>
-            </a:r>
-          </a:p>
-          <a:p>
-            <a:r>
-              <a:rPr lang="nl-NL" dirty="0"/>
-              <a:t> kun je vierkantjes maken</a:t>
-            </a:r>
-          </a:p>
-          <a:p>
-            <a:r>
-              <a:rPr lang="nl-NL" dirty="0"/>
-              <a:t> of een mix van vierkantjes en rondjes</a:t>
-            </a:r>
-          </a:p>
-          <a:p>
-            <a:r>
-              <a:rPr lang="nl-NL" baseline="0" dirty="0"/>
-              <a:t> (niet met GroundForge)</a:t>
-            </a:r>
-            <a:endParaRPr lang="nl-NL" dirty="0"/>
-          </a:p>
-          <a:p>
-            <a:endParaRPr lang="nl-NL" dirty="0"/>
-          </a:p>
-        </p:txBody>
-      </p:sp>
-      <p:sp>
-        <p:nvSpPr>
-          <p:cNvPr id="4" name="Tijdelijke aanduiding voor dianummer 3"/>
-          <p:cNvSpPr>
-            <a:spLocks noGrp="1"/>
-          </p:cNvSpPr>
-          <p:nvPr>
-            <p:ph type="sldNum" sz="quarter" idx="10"/>
-          </p:nvPr>
-        </p:nvSpPr>
-        <p:spPr/>
-        <p:txBody>
-          <a:bodyPr/>
-          <a:lstStyle/>
-          <a:p>
-            <a:fld id="{7EC7493F-9CE3-4AD5-8254-4B462DC5112C}" type="slidenum">
-              <a:rPr lang="nl-NL" smtClean="0"/>
-              <a:t>17</a:t>
-            </a:fld>
-            <a:endParaRPr lang="nl-NL" dirty="0"/>
-          </a:p>
-        </p:txBody>
-      </p:sp>
-    </p:spTree>
-    <p:extLst>
-      <p:ext uri="{BB962C8B-B14F-4D97-AF65-F5344CB8AC3E}">
-        <p14:creationId xmlns:p14="http://schemas.microsoft.com/office/powerpoint/2010/main" val="846069162"/>
-      </p:ext>
-    </p:extLst>
-  </p:cSld>
-  <p:clrMapOvr>
-    <a:masterClrMapping/>
-  </p:clrMapOvr>
-</p:notes>
-</file>
-
-<file path=ppt/notesSlides/notesSlide18.xml><?xml version="1.0" encoding="utf-8"?>
-<p:notes xmlns:a="http://schemas.openxmlformats.org/drawingml/2006/main" xmlns:r="http://schemas.openxmlformats.org/officeDocument/2006/relationships" xmlns:p="http://schemas.openxmlformats.org/presentationml/2006/main">
-  <p:cSld>
-    <p:spTree>
-      <p:nvGrpSpPr>
-        <p:cNvPr id="1" name=""/>
-        <p:cNvGrpSpPr/>
-        <p:nvPr/>
-      </p:nvGrpSpPr>
-      <p:grpSpPr>
-        <a:xfrm>
-          <a:off x="0" y="0"/>
-          <a:ext cx="0" cy="0"/>
-          <a:chOff x="0" y="0"/>
-          <a:chExt cx="0" cy="0"/>
-        </a:xfrm>
-      </p:grpSpPr>
-      <p:sp>
-        <p:nvSpPr>
-          <p:cNvPr id="2" name="Tijdelijke aanduiding voor dia-afbeelding 1"/>
-          <p:cNvSpPr>
-            <a:spLocks noGrp="1" noRot="1" noChangeAspect="1"/>
-          </p:cNvSpPr>
-          <p:nvPr>
-            <p:ph type="sldImg"/>
-          </p:nvPr>
-        </p:nvSpPr>
-        <p:spPr/>
-      </p:sp>
-      <p:sp>
-        <p:nvSpPr>
-          <p:cNvPr id="3" name="Tijdelijke aanduiding voor notities 2"/>
-          <p:cNvSpPr>
-            <a:spLocks noGrp="1"/>
-          </p:cNvSpPr>
-          <p:nvPr>
-            <p:ph type="body" idx="1"/>
-          </p:nvPr>
-        </p:nvSpPr>
-        <p:spPr/>
-        <p:txBody>
-          <a:bodyPr/>
-          <a:lstStyle/>
-          <a:p>
             <a:pPr>
               <a:defRPr/>
             </a:pPr>
@@ -2674,7 +2502,7 @@
           <a:p>
             <a:fld id="{7EC7493F-9CE3-4AD5-8254-4B462DC5112C}" type="slidenum">
               <a:rPr lang="nl-NL" smtClean="0"/>
-              <a:t>18</a:t>
+              <a:t>17</a:t>
             </a:fld>
             <a:endParaRPr lang="nl-NL" dirty="0"/>
           </a:p>
@@ -2984,15 +2812,18 @@
               <a:rPr lang="nl-NL" sz="1200" dirty="0">
                 <a:hlinkClick r:id="rId3"/>
               </a:rPr>
-              <a:t>https://d-bl.github.io/GroundForge</a:t>
+              <a:t>https://d-bl.github.io/GroundForge/tiles</a:t>
             </a:r>
             <a:r>
               <a:rPr lang="nl-NL" sz="1200" dirty="0"/>
               <a:t> </a:t>
             </a:r>
-            <a:br>
-              <a:rPr lang="nl-NL" sz="1200" dirty="0"/>
-            </a:br>
+          </a:p>
+          <a:p>
+            <a:pPr marL="171450" indent="-171450">
+              <a:buFont typeface="Arial" panose="020B0604020202020204" pitchFamily="34" charset="0"/>
+              <a:buChar char="•"/>
+            </a:pPr>
             <a:r>
               <a:rPr lang="nl-NL" sz="1200" dirty="0"/>
               <a:t>Heeft zelf al een aantal catalogi met</a:t>
@@ -3330,28 +3161,78 @@
               </a:spcAft>
               <a:buClrTx/>
               <a:buSzTx/>
-              <a:buFont typeface="Arial" panose="020B0604020202020204" pitchFamily="34" charset="0"/>
+              <a:buFontTx/>
               <a:buNone/>
               <a:tabLst/>
               <a:defRPr/>
             </a:pPr>
             <a:r>
-              <a:rPr lang="nl-NL" i="0" baseline="0" dirty="0">
+              <a:rPr lang="nl-NL" dirty="0">
                 <a:effectLst/>
               </a:rPr>
-              <a:t>Als voorbeeld catalogus de </a:t>
-            </a:r>
-            <a:r>
-              <a:rPr lang="nl-NL" i="0" baseline="0" dirty="0" err="1">
-                <a:effectLst/>
-              </a:rPr>
+              <a:t>Diverse catalogi met basis patronen, elke groep heeft een eigen invalshoek en er is overlap.</a:t>
+            </a:r>
+          </a:p>
+          <a:p>
+            <a:r>
+              <a:rPr lang="nl-NL" dirty="0"/>
+              <a:t>Slagen al ingevuld</a:t>
+            </a:r>
+          </a:p>
+          <a:p>
+            <a:pPr lvl="1"/>
+            <a:r>
+              <a:rPr lang="nl-NL" dirty="0"/>
+              <a:t>MAE-</a:t>
+            </a:r>
+            <a:r>
+              <a:rPr lang="nl-NL" dirty="0" err="1"/>
+              <a:t>gf</a:t>
+            </a:r>
+            <a:r>
+              <a:rPr lang="nl-NL" dirty="0"/>
+              <a:t> (persoonlijke verzameling)</a:t>
+            </a:r>
+          </a:p>
+          <a:p>
+            <a:pPr lvl="1"/>
+            <a:r>
+              <a:rPr lang="nl-NL" dirty="0" err="1"/>
+              <a:t>Whiting</a:t>
+            </a:r>
+            <a:r>
+              <a:rPr lang="nl-NL" dirty="0"/>
+              <a:t> index (online boek uit 1920)</a:t>
+            </a:r>
+          </a:p>
+          <a:p>
+            <a:r>
+              <a:rPr lang="nl-NL" dirty="0"/>
+              <a:t>Slagen zelf kiezen</a:t>
+            </a:r>
+          </a:p>
+          <a:p>
+            <a:pPr lvl="1"/>
+            <a:r>
+              <a:rPr lang="nl-NL" dirty="0" err="1"/>
               <a:t>Tesselace</a:t>
             </a:r>
             <a:r>
-              <a:rPr lang="nl-NL" i="0" baseline="0" dirty="0">
-                <a:effectLst/>
-              </a:rPr>
-              <a:t> index gekozen.</a:t>
+              <a:rPr lang="nl-NL" dirty="0"/>
+              <a:t> index  (computer gegenereerd)</a:t>
+            </a:r>
+          </a:p>
+          <a:p>
+            <a:pPr lvl="1"/>
+            <a:r>
+              <a:rPr lang="nl-NL" dirty="0"/>
+              <a:t>Droste effect (draad schema’s als paar schema’s)</a:t>
+            </a:r>
+          </a:p>
+          <a:p>
+            <a:r>
+              <a:rPr lang="nl-NL" dirty="0"/>
+              <a:t>Overlap tussen de groepen</a:t>
             </a:r>
           </a:p>
           <a:p>
@@ -3372,7 +3253,7 @@
               <a:tabLst/>
               <a:defRPr/>
             </a:pPr>
-            <a:endParaRPr lang="nl-NL" i="1" baseline="0" dirty="0">
+            <a:endParaRPr lang="nl-NL" i="0" baseline="0" dirty="0">
               <a:effectLst/>
             </a:endParaRPr>
           </a:p>
@@ -3395,32 +3276,22 @@
               <a:defRPr/>
             </a:pPr>
             <a:r>
-              <a:rPr lang="nl-NL" baseline="0" dirty="0">
+              <a:rPr lang="nl-NL" i="0" baseline="0" dirty="0">
                 <a:effectLst/>
               </a:rPr>
-              <a:t>Dit zijn </a:t>
-            </a:r>
-            <a:r>
-              <a:rPr lang="nl-NL" baseline="0" dirty="0" err="1">
+              <a:t>Als voorbeeld catalogus de </a:t>
+            </a:r>
+            <a:r>
+              <a:rPr lang="nl-NL" i="0" baseline="0" dirty="0" err="1">
                 <a:effectLst/>
               </a:rPr>
-              <a:t>computergegenereerde</a:t>
-            </a:r>
-            <a:r>
-              <a:rPr lang="nl-NL" baseline="0" dirty="0">
+              <a:t>Tesselace</a:t>
+            </a:r>
+            <a:r>
+              <a:rPr lang="nl-NL" i="0" baseline="0" dirty="0">
                 <a:effectLst/>
               </a:rPr>
-              <a:t> patronen, tussenresultaat van promotie onderzoek door Veronika Irvine </a:t>
-            </a:r>
-            <a:r>
-              <a:rPr lang="nl-NL" dirty="0"/>
-              <a:t>uit </a:t>
-            </a:r>
-            <a:r>
-              <a:rPr lang="nl-NL" baseline="0" dirty="0">
-                <a:effectLst/>
-              </a:rPr>
-              <a:t>Canada.</a:t>
+              <a:t> index gekozen. </a:t>
             </a:r>
           </a:p>
           <a:p>
@@ -3441,29 +3312,66 @@
               <a:tabLst/>
               <a:defRPr/>
             </a:pPr>
-            <a:endParaRPr lang="nl-NL" baseline="0" dirty="0">
+            <a:endParaRPr lang="nl-NL" dirty="0"/>
+          </a:p>
+          <a:p>
+            <a:r>
+              <a:rPr lang="en-US" sz="1200" b="0" i="1" u="none" strike="noStrike" kern="1200" baseline="0" dirty="0">
+                <a:solidFill>
+                  <a:schemeClr val="tx1"/>
+                </a:solidFill>
+                <a:latin typeface="+mn-lt"/>
+                <a:ea typeface="+mn-ea"/>
+                <a:cs typeface="+mn-cs"/>
+              </a:rPr>
+              <a:t>A Lace Guide for Makers and Collectors, </a:t>
+            </a:r>
+            <a:r>
+              <a:rPr lang="en-US" sz="1200" b="0" i="0" u="none" strike="noStrike" kern="1200" baseline="0" dirty="0">
+                <a:solidFill>
+                  <a:schemeClr val="tx1"/>
+                </a:solidFill>
+                <a:latin typeface="+mn-lt"/>
+                <a:ea typeface="+mn-ea"/>
+                <a:cs typeface="+mn-cs"/>
+              </a:rPr>
+              <a:t>door Gertrude Whiting</a:t>
+            </a:r>
+          </a:p>
+          <a:p>
+            <a:r>
+              <a:rPr lang="nl-NL" sz="1200" b="0" i="0" u="none" strike="noStrike" kern="1200" baseline="0" dirty="0">
+                <a:solidFill>
+                  <a:schemeClr val="tx1"/>
+                </a:solidFill>
+                <a:latin typeface="+mn-lt"/>
+                <a:ea typeface="+mn-ea"/>
+                <a:cs typeface="+mn-cs"/>
+              </a:rPr>
+              <a:t>Kant gids voor makers en verzamelaars.</a:t>
+            </a:r>
+          </a:p>
+          <a:p>
+            <a:r>
+              <a:rPr lang="nl-NL" sz="1200" b="0" i="0" u="none" strike="noStrike" kern="1200" baseline="0" dirty="0">
+                <a:solidFill>
+                  <a:schemeClr val="tx1"/>
+                </a:solidFill>
+                <a:latin typeface="+mn-lt"/>
+                <a:ea typeface="+mn-ea"/>
+                <a:cs typeface="+mn-cs"/>
+              </a:rPr>
+              <a:t>In diverse online archieven beschikbaar, het copyright is verlopen.</a:t>
+            </a:r>
+            <a:endParaRPr lang="nl-NL" dirty="0">
               <a:effectLst/>
             </a:endParaRPr>
           </a:p>
           <a:p>
-            <a:r>
-              <a:rPr lang="nl-NL" baseline="0" dirty="0" err="1">
-                <a:effectLst/>
-              </a:rPr>
-              <a:t>GroundForge</a:t>
-            </a:r>
-            <a:r>
-              <a:rPr lang="nl-NL" baseline="0" dirty="0">
-                <a:effectLst/>
-              </a:rPr>
-              <a:t> maakt de gaten in de schema’s zo rond mogelijk.</a:t>
-            </a:r>
-          </a:p>
-          <a:p>
-            <a:r>
-              <a:rPr lang="nl-NL" dirty="0"/>
-              <a:t>Daardoor kunnen meerdere computer gegenereerde gronden bij een diagram horen.</a:t>
-            </a:r>
+            <a:endParaRPr lang="nl-NL" dirty="0"/>
+          </a:p>
+          <a:p>
+            <a:endParaRPr lang="nl-NL" dirty="0"/>
           </a:p>
           <a:p>
             <a:pPr marL="0" marR="0" lvl="0" indent="0" algn="l" defTabSz="914400" rtl="0" eaLnBrk="1" fontAlgn="auto" latinLnBrk="0" hangingPunct="1">
@@ -4303,7 +4211,7 @@
           <a:p>
             <a:fld id="{E342A075-9761-4F6D-8E62-693B12E2A93F}" type="datetime1">
               <a:rPr lang="nl-NL" smtClean="0"/>
-              <a:t>6-5-2019</a:t>
+              <a:t>9-5-2019</a:t>
             </a:fld>
             <a:endParaRPr lang="nl-NL" dirty="0"/>
           </a:p>
@@ -4471,7 +4379,7 @@
           <a:p>
             <a:fld id="{95274BD6-6047-4BE7-A11A-799C5C07C1B9}" type="datetime1">
               <a:rPr lang="nl-NL" smtClean="0"/>
-              <a:t>6-5-2019</a:t>
+              <a:t>9-5-2019</a:t>
             </a:fld>
             <a:endParaRPr lang="nl-NL" dirty="0"/>
           </a:p>
@@ -4649,7 +4557,7 @@
           <a:p>
             <a:fld id="{6C2C6073-FF99-4CA4-ADF2-53D139284B0F}" type="datetime1">
               <a:rPr lang="nl-NL" smtClean="0"/>
-              <a:t>6-5-2019</a:t>
+              <a:t>9-5-2019</a:t>
             </a:fld>
             <a:endParaRPr lang="nl-NL" dirty="0"/>
           </a:p>
@@ -4817,7 +4725,7 @@
           <a:p>
             <a:fld id="{BB83D81E-96EF-4290-8170-748ADAD06D81}" type="datetime1">
               <a:rPr lang="nl-NL" smtClean="0"/>
-              <a:t>6-5-2019</a:t>
+              <a:t>9-5-2019</a:t>
             </a:fld>
             <a:endParaRPr lang="nl-NL" dirty="0"/>
           </a:p>
@@ -5062,7 +4970,7 @@
           <a:p>
             <a:fld id="{C0420608-9111-4307-BDC9-D2BB0906472C}" type="datetime1">
               <a:rPr lang="nl-NL" smtClean="0"/>
-              <a:t>6-5-2019</a:t>
+              <a:t>9-5-2019</a:t>
             </a:fld>
             <a:endParaRPr lang="nl-NL" dirty="0"/>
           </a:p>
@@ -5347,7 +5255,7 @@
           <a:p>
             <a:fld id="{A84E908B-0185-4D61-A5D9-DBFFD136706E}" type="datetime1">
               <a:rPr lang="nl-NL" smtClean="0"/>
-              <a:t>6-5-2019</a:t>
+              <a:t>9-5-2019</a:t>
             </a:fld>
             <a:endParaRPr lang="nl-NL" dirty="0"/>
           </a:p>
@@ -5766,7 +5674,7 @@
           <a:p>
             <a:fld id="{AF24CBA6-5F96-4BD7-976F-CDF48F991EB6}" type="datetime1">
               <a:rPr lang="nl-NL" smtClean="0"/>
-              <a:t>6-5-2019</a:t>
+              <a:t>9-5-2019</a:t>
             </a:fld>
             <a:endParaRPr lang="nl-NL" dirty="0"/>
           </a:p>
@@ -5883,7 +5791,7 @@
           <a:p>
             <a:fld id="{8CA878B4-84FD-4284-B7D0-09A954965A10}" type="datetime1">
               <a:rPr lang="nl-NL" smtClean="0"/>
-              <a:t>6-5-2019</a:t>
+              <a:t>9-5-2019</a:t>
             </a:fld>
             <a:endParaRPr lang="nl-NL" dirty="0"/>
           </a:p>
@@ -5978,7 +5886,7 @@
           <a:p>
             <a:fld id="{8F1648B1-A544-4058-8476-7C7A9902FE15}" type="datetime1">
               <a:rPr lang="nl-NL" smtClean="0"/>
-              <a:t>6-5-2019</a:t>
+              <a:t>9-5-2019</a:t>
             </a:fld>
             <a:endParaRPr lang="nl-NL" dirty="0"/>
           </a:p>
@@ -6253,7 +6161,7 @@
           <a:p>
             <a:fld id="{D039C4CF-B57B-4F53-B350-F1468F1E8012}" type="datetime1">
               <a:rPr lang="nl-NL" smtClean="0"/>
-              <a:t>6-5-2019</a:t>
+              <a:t>9-5-2019</a:t>
             </a:fld>
             <a:endParaRPr lang="nl-NL" dirty="0"/>
           </a:p>
@@ -6508,7 +6416,7 @@
           <a:p>
             <a:fld id="{CF8B7C30-20C8-4009-AD9C-ED95D216EDC4}" type="datetime1">
               <a:rPr lang="nl-NL" smtClean="0"/>
-              <a:t>6-5-2019</a:t>
+              <a:t>9-5-2019</a:t>
             </a:fld>
             <a:endParaRPr lang="nl-NL" dirty="0"/>
           </a:p>
@@ -6719,7 +6627,7 @@
           <a:p>
             <a:fld id="{9D082795-9F52-4849-A817-AF0180A2A2B3}" type="datetime1">
               <a:rPr lang="nl-NL" smtClean="0"/>
-              <a:t>6-5-2019</a:t>
+              <a:t>9-5-2019</a:t>
             </a:fld>
             <a:endParaRPr lang="nl-NL" dirty="0"/>
           </a:p>
@@ -7275,7 +7183,7 @@
           <a:p>
             <a:fld id="{C6166A56-2601-4E37-8D8D-05C0420DE125}" type="datetime1">
               <a:rPr lang="nl-NL" smtClean="0"/>
-              <a:t>6-5-2019</a:t>
+              <a:t>9-5-2019</a:t>
             </a:fld>
             <a:endParaRPr lang="nl-NL" dirty="0"/>
           </a:p>
@@ -7596,80 +7504,34 @@
         </p:nvSpPr>
         <p:spPr/>
         <p:txBody>
-          <a:bodyPr>
-            <a:normAutofit/>
-          </a:bodyPr>
+          <a:bodyPr/>
           <a:lstStyle/>
           <a:p>
             <a:pPr marL="0" indent="0">
               <a:buNone/>
             </a:pPr>
             <a:r>
-              <a:rPr lang="nl-NL" dirty="0">
-                <a:effectLst/>
-              </a:rPr>
-              <a:t>Voorbeeld pagina’s</a:t>
-            </a:r>
-          </a:p>
-          <a:p>
-            <a:r>
               <a:rPr lang="nl-NL" dirty="0"/>
-              <a:t>Slagen al ingevuld</a:t>
-            </a:r>
-          </a:p>
-          <a:p>
-            <a:pPr lvl="1"/>
+              <a:t>Voorbeeld pagina’s: Concept kantbrieven</a:t>
+            </a:r>
+          </a:p>
+          <a:p>
             <a:r>
               <a:rPr lang="nl-NL" dirty="0"/>
-              <a:t>MAE-gf (persoonlijke verzameling)</a:t>
-            </a:r>
-          </a:p>
-          <a:p>
-            <a:pPr lvl="1"/>
-            <a:r>
-              <a:rPr lang="nl-NL" dirty="0"/>
-              <a:t>Whiting index (online boek uit 1920)</a:t>
-            </a:r>
-          </a:p>
-          <a:p>
-            <a:r>
-              <a:rPr lang="nl-NL" dirty="0"/>
-              <a:t>Slagen zelf kiezen (</a:t>
-            </a:r>
-            <a:r>
-              <a:rPr lang="nl-NL" strike="sngStrike" dirty="0"/>
-              <a:t>tablet</a:t>
-            </a:r>
-            <a:r>
-              <a:rPr lang="nl-NL" dirty="0"/>
-              <a:t>)</a:t>
-            </a:r>
-          </a:p>
-          <a:p>
-            <a:pPr lvl="1"/>
-            <a:r>
-              <a:rPr lang="nl-NL" dirty="0"/>
-              <a:t>Tesselace index  (computer gegenereerd)</a:t>
-            </a:r>
-          </a:p>
-          <a:p>
-            <a:pPr lvl="1"/>
-            <a:r>
-              <a:rPr lang="nl-NL" dirty="0"/>
-              <a:t>Droste effect (draad schema’s als paar schema’s)</a:t>
-            </a:r>
-          </a:p>
-          <a:p>
-            <a:r>
-              <a:rPr lang="nl-NL" dirty="0"/>
-              <a:t>Overlap tussen de groepen</a:t>
-            </a:r>
-          </a:p>
-        </p:txBody>
-      </p:sp>
-      <p:sp>
-        <p:nvSpPr>
-          <p:cNvPr id="4" name="Tijdelijke aanduiding voor dianummer 3"/>
+              <a:t>Blauwe link gaat terug naar de hoofdpagina</a:t>
+            </a:r>
+          </a:p>
+          <a:p>
+            <a:endParaRPr lang="nl-NL" dirty="0"/>
+          </a:p>
+          <a:p>
+            <a:endParaRPr lang="nl-NL" dirty="0"/>
+          </a:p>
+        </p:txBody>
+      </p:sp>
+      <p:sp>
+        <p:nvSpPr>
+          <p:cNvPr id="5" name="Tijdelijke aanduiding voor dianummer 4"/>
           <p:cNvSpPr>
             <a:spLocks noGrp="1"/>
           </p:cNvSpPr>
@@ -7685,118 +7547,6 @@
             <a:fld id="{A5775961-95EC-4D4B-9423-EAE103D81E9E}" type="slidenum">
               <a:rPr lang="nl-NL" smtClean="0"/>
               <a:t>11</a:t>
-            </a:fld>
-            <a:endParaRPr lang="nl-NL" dirty="0"/>
-          </a:p>
-        </p:txBody>
-      </p:sp>
-    </p:spTree>
-    <p:extLst>
-      <p:ext uri="{BB962C8B-B14F-4D97-AF65-F5344CB8AC3E}">
-        <p14:creationId xmlns:p14="http://schemas.microsoft.com/office/powerpoint/2010/main" val="723173163"/>
-      </p:ext>
-    </p:extLst>
-  </p:cSld>
-  <p:clrMapOvr>
-    <a:masterClrMapping/>
-  </p:clrMapOvr>
-</p:sld>
-</file>
-
-<file path=ppt/slides/slide12.xml><?xml version="1.0" encoding="utf-8"?>
-<p:sld xmlns:a="http://schemas.openxmlformats.org/drawingml/2006/main" xmlns:r="http://schemas.openxmlformats.org/officeDocument/2006/relationships" xmlns:p="http://schemas.openxmlformats.org/presentationml/2006/main">
-  <p:cSld>
-    <p:spTree>
-      <p:nvGrpSpPr>
-        <p:cNvPr id="1" name=""/>
-        <p:cNvGrpSpPr/>
-        <p:nvPr/>
-      </p:nvGrpSpPr>
-      <p:grpSpPr>
-        <a:xfrm>
-          <a:off x="0" y="0"/>
-          <a:ext cx="0" cy="0"/>
-          <a:chOff x="0" y="0"/>
-          <a:chExt cx="0" cy="0"/>
-        </a:xfrm>
-      </p:grpSpPr>
-      <p:sp>
-        <p:nvSpPr>
-          <p:cNvPr id="2" name="Titel 1"/>
-          <p:cNvSpPr>
-            <a:spLocks noGrp="1"/>
-          </p:cNvSpPr>
-          <p:nvPr>
-            <p:ph type="title"/>
-          </p:nvPr>
-        </p:nvSpPr>
-        <p:spPr/>
-        <p:txBody>
-          <a:bodyPr/>
-          <a:lstStyle/>
-          <a:p>
-            <a:r>
-              <a:rPr lang="nl-NL" dirty="0"/>
-              <a:t>GroundForge</a:t>
-            </a:r>
-          </a:p>
-        </p:txBody>
-      </p:sp>
-      <p:sp>
-        <p:nvSpPr>
-          <p:cNvPr id="3" name="Tijdelijke aanduiding voor inhoud 2"/>
-          <p:cNvSpPr>
-            <a:spLocks noGrp="1"/>
-          </p:cNvSpPr>
-          <p:nvPr>
-            <p:ph idx="1"/>
-          </p:nvPr>
-        </p:nvSpPr>
-        <p:spPr/>
-        <p:txBody>
-          <a:bodyPr/>
-          <a:lstStyle/>
-          <a:p>
-            <a:pPr marL="0" indent="0">
-              <a:buNone/>
-            </a:pPr>
-            <a:r>
-              <a:rPr lang="nl-NL" dirty="0"/>
-              <a:t>Voorbeeld pagina’s: Concept kantbrieven</a:t>
-            </a:r>
-          </a:p>
-          <a:p>
-            <a:r>
-              <a:rPr lang="nl-NL" dirty="0"/>
-              <a:t>Blauwe link gaat terug naar de hoofdpagina</a:t>
-            </a:r>
-          </a:p>
-          <a:p>
-            <a:endParaRPr lang="nl-NL" dirty="0"/>
-          </a:p>
-          <a:p>
-            <a:endParaRPr lang="nl-NL" dirty="0"/>
-          </a:p>
-        </p:txBody>
-      </p:sp>
-      <p:sp>
-        <p:nvSpPr>
-          <p:cNvPr id="5" name="Tijdelijke aanduiding voor dianummer 4"/>
-          <p:cNvSpPr>
-            <a:spLocks noGrp="1"/>
-          </p:cNvSpPr>
-          <p:nvPr>
-            <p:ph type="sldNum" sz="quarter" idx="12"/>
-          </p:nvPr>
-        </p:nvSpPr>
-        <p:spPr/>
-        <p:txBody>
-          <a:bodyPr/>
-          <a:lstStyle/>
-          <a:p>
-            <a:fld id="{A5775961-95EC-4D4B-9423-EAE103D81E9E}" type="slidenum">
-              <a:rPr lang="nl-NL" smtClean="0"/>
-              <a:t>12</a:t>
             </a:fld>
             <a:endParaRPr lang="nl-NL" dirty="0"/>
           </a:p>
@@ -7923,7 +7673,7 @@
 </p:sld>
 </file>
 
-<file path=ppt/slides/slide13.xml><?xml version="1.0" encoding="utf-8"?>
+<file path=ppt/slides/slide12.xml><?xml version="1.0" encoding="utf-8"?>
 <p:sld xmlns:a="http://schemas.openxmlformats.org/drawingml/2006/main" xmlns:r="http://schemas.openxmlformats.org/officeDocument/2006/relationships" xmlns:p="http://schemas.openxmlformats.org/presentationml/2006/main">
   <p:cSld>
     <p:spTree>
@@ -8013,7 +7763,7 @@
           <a:p>
             <a:fld id="{A5775961-95EC-4D4B-9423-EAE103D81E9E}" type="slidenum">
               <a:rPr lang="nl-NL" smtClean="0"/>
-              <a:t>13</a:t>
+              <a:t>12</a:t>
             </a:fld>
             <a:endParaRPr lang="nl-NL" dirty="0"/>
           </a:p>
@@ -8349,7 +8099,7 @@
 </p:sld>
 </file>
 
-<file path=ppt/slides/slide14.xml><?xml version="1.0" encoding="utf-8"?>
+<file path=ppt/slides/slide13.xml><?xml version="1.0" encoding="utf-8"?>
 <p:sld xmlns:a="http://schemas.openxmlformats.org/drawingml/2006/main" xmlns:r="http://schemas.openxmlformats.org/officeDocument/2006/relationships" xmlns:p="http://schemas.openxmlformats.org/presentationml/2006/main">
   <p:cSld>
     <p:spTree>
@@ -8442,7 +8192,7 @@
           <a:p>
             <a:fld id="{A5775961-95EC-4D4B-9423-EAE103D81E9E}" type="slidenum">
               <a:rPr lang="nl-NL" smtClean="0"/>
-              <a:t>14</a:t>
+              <a:t>13</a:t>
             </a:fld>
             <a:endParaRPr lang="nl-NL" dirty="0"/>
           </a:p>
@@ -9271,7 +9021,7 @@
 </p:sld>
 </file>
 
-<file path=ppt/slides/slide15.xml><?xml version="1.0" encoding="utf-8"?>
+<file path=ppt/slides/slide14.xml><?xml version="1.0" encoding="utf-8"?>
 <p:sld xmlns:a="http://schemas.openxmlformats.org/drawingml/2006/main" xmlns:r="http://schemas.openxmlformats.org/officeDocument/2006/relationships" xmlns:p="http://schemas.openxmlformats.org/presentationml/2006/main">
   <p:cSld>
     <p:spTree>
@@ -9327,7 +9077,7 @@
           <a:p>
             <a:fld id="{A5775961-95EC-4D4B-9423-EAE103D81E9E}" type="slidenum">
               <a:rPr lang="nl-NL" smtClean="0"/>
-              <a:t>15</a:t>
+              <a:t>14</a:t>
             </a:fld>
             <a:endParaRPr lang="nl-NL" dirty="0"/>
           </a:p>
@@ -9511,7 +9261,7 @@
 </p:sld>
 </file>
 
-<file path=ppt/slides/slide16.xml><?xml version="1.0" encoding="utf-8"?>
+<file path=ppt/slides/slide15.xml><?xml version="1.0" encoding="utf-8"?>
 <p:sld xmlns:a="http://schemas.openxmlformats.org/drawingml/2006/main" xmlns:r="http://schemas.openxmlformats.org/officeDocument/2006/relationships" xmlns:p="http://schemas.openxmlformats.org/presentationml/2006/main">
   <p:cSld>
     <p:spTree>
@@ -9625,7 +9375,7 @@
           <a:p>
             <a:fld id="{A5775961-95EC-4D4B-9423-EAE103D81E9E}" type="slidenum">
               <a:rPr lang="nl-NL" smtClean="0"/>
-              <a:t>16</a:t>
+              <a:t>15</a:t>
             </a:fld>
             <a:endParaRPr lang="nl-NL" dirty="0"/>
           </a:p>
@@ -9752,7 +9502,7 @@
 </p:sld>
 </file>
 
-<file path=ppt/slides/slide17.xml><?xml version="1.0" encoding="utf-8"?>
+<file path=ppt/slides/slide16.xml><?xml version="1.0" encoding="utf-8"?>
 <p:sld xmlns:a="http://schemas.openxmlformats.org/drawingml/2006/main" xmlns:r="http://schemas.openxmlformats.org/officeDocument/2006/relationships" xmlns:p="http://schemas.openxmlformats.org/presentationml/2006/main">
   <p:cSld>
     <p:spTree>
@@ -9862,7 +9612,7 @@
           <a:p>
             <a:fld id="{A5775961-95EC-4D4B-9423-EAE103D81E9E}" type="slidenum">
               <a:rPr lang="nl-NL" smtClean="0"/>
-              <a:t>17</a:t>
+              <a:t>16</a:t>
             </a:fld>
             <a:endParaRPr lang="nl-NL" dirty="0"/>
           </a:p>
@@ -9989,7 +9739,7 @@
 </p:sld>
 </file>
 
-<file path=ppt/slides/slide18.xml><?xml version="1.0" encoding="utf-8"?>
+<file path=ppt/slides/slide17.xml><?xml version="1.0" encoding="utf-8"?>
 <p:sld xmlns:a="http://schemas.openxmlformats.org/drawingml/2006/main" xmlns:r="http://schemas.openxmlformats.org/officeDocument/2006/relationships" xmlns:p="http://schemas.openxmlformats.org/presentationml/2006/main">
   <p:cSld>
     <p:spTree>
@@ -10157,7 +9907,7 @@
           <a:p>
             <a:fld id="{A5775961-95EC-4D4B-9423-EAE103D81E9E}" type="slidenum">
               <a:rPr lang="nl-NL" smtClean="0"/>
-              <a:t>18</a:t>
+              <a:t>17</a:t>
             </a:fld>
             <a:endParaRPr lang="nl-NL" dirty="0"/>
           </a:p>
@@ -10270,7 +10020,7 @@
           <a:p>
             <a:fld id="{C6166A56-2601-4E37-8D8D-05C0420DE125}" type="datetime1">
               <a:rPr lang="nl-NL" smtClean="0"/>
-              <a:t>6-5-2019</a:t>
+              <a:t>9-5-2019</a:t>
             </a:fld>
             <a:endParaRPr lang="nl-NL" dirty="0"/>
           </a:p>
@@ -11763,7 +11513,7 @@
           <a:p>
             <a:fld id="{B71AFF58-8559-4CE0-AA20-9C6B842D93B4}" type="datetime1">
               <a:rPr lang="nl-NL" smtClean="0"/>
-              <a:t>6-5-2019</a:t>
+              <a:t>9-5-2019</a:t>
             </a:fld>
             <a:endParaRPr lang="nl-NL"/>
           </a:p>
@@ -11870,11 +11620,11 @@
               <a:rPr lang="nl-NL" sz="2800" dirty="0">
                 <a:hlinkClick r:id="rId4"/>
               </a:rPr>
-              <a:t>https://d-bl.github.io/GroundForge</a:t>
+              <a:t>https://d-bl.github.io/GroundForge/tiles</a:t>
             </a:r>
             <a:r>
               <a:rPr lang="nl-NL" sz="2800" dirty="0"/>
-              <a:t> </a:t>
+              <a:t>  </a:t>
             </a:r>
           </a:p>
           <a:p>

</xml_diff>